<commit_message>
agrego explicaciones faltantes al paper.
</commit_message>
<xml_diff>
--- a/doc/informe/pictures.pptx
+++ b/doc/informe/pictures.pptx
@@ -5,7 +5,7 @@
     <p:sldMasterId id="2147483648" r:id="rId1"/>
   </p:sldMasterIdLst>
   <p:notesMasterIdLst>
-    <p:notesMasterId r:id="rId7"/>
+    <p:notesMasterId r:id="rId8"/>
   </p:notesMasterIdLst>
   <p:sldIdLst>
     <p:sldId id="256" r:id="rId2"/>
@@ -13,6 +13,7 @@
     <p:sldId id="258" r:id="rId4"/>
     <p:sldId id="259" r:id="rId5"/>
     <p:sldId id="260" r:id="rId6"/>
+    <p:sldId id="261" r:id="rId7"/>
   </p:sldIdLst>
   <p:sldSz cx="9144000" cy="6858000" type="screen4x3"/>
   <p:notesSz cx="6858000" cy="9144000"/>
@@ -196,7 +197,8 @@
           <a:p>
             <a:fld id="{845A57F8-9FFB-4742-8CFD-3414C37FBF35}" type="datetimeFigureOut">
               <a:rPr lang="en-US" smtClean="0"/>
-              <a:t>11/23/2014</a:t>
+              <a:pPr/>
+              <a:t>12/4/2014</a:t>
             </a:fld>
             <a:endParaRPr lang="en-US"/>
           </a:p>
@@ -357,6 +359,7 @@
           <a:p>
             <a:fld id="{7D97FC9E-4CEA-462C-95AC-29F39B39D0EF}" type="slidenum">
               <a:rPr lang="en-US" smtClean="0"/>
+              <a:pPr/>
               <a:t>‹#›</a:t>
             </a:fld>
             <a:endParaRPr lang="en-US"/>
@@ -528,6 +531,7 @@
           <a:p>
             <a:fld id="{7D97FC9E-4CEA-462C-95AC-29F39B39D0EF}" type="slidenum">
               <a:rPr lang="en-US" smtClean="0"/>
+              <a:pPr/>
               <a:t>2</a:t>
             </a:fld>
             <a:endParaRPr lang="en-US"/>
@@ -609,6 +613,7 @@
           <a:p>
             <a:fld id="{7D97FC9E-4CEA-462C-95AC-29F39B39D0EF}" type="slidenum">
               <a:rPr lang="en-US" smtClean="0"/>
+              <a:pPr/>
               <a:t>4</a:t>
             </a:fld>
             <a:endParaRPr lang="en-US"/>
@@ -690,6 +695,7 @@
           <a:p>
             <a:fld id="{7D97FC9E-4CEA-462C-95AC-29F39B39D0EF}" type="slidenum">
               <a:rPr lang="en-US" smtClean="0"/>
+              <a:pPr/>
               <a:t>5</a:t>
             </a:fld>
             <a:endParaRPr lang="en-US"/>
@@ -885,7 +891,8 @@
           <a:p>
             <a:fld id="{0BF94AD7-59A1-45F9-ACA2-67E78D40517C}" type="datetimeFigureOut">
               <a:rPr lang="en-US" smtClean="0"/>
-              <a:t>11/23/2014</a:t>
+              <a:pPr/>
+              <a:t>12/4/2014</a:t>
             </a:fld>
             <a:endParaRPr lang="en-US"/>
           </a:p>
@@ -927,6 +934,7 @@
           <a:p>
             <a:fld id="{3E6B769C-16DC-410E-BF95-1050F73C066F}" type="slidenum">
               <a:rPr lang="en-US" smtClean="0"/>
+              <a:pPr/>
               <a:t>‹#›</a:t>
             </a:fld>
             <a:endParaRPr lang="en-US"/>
@@ -1050,7 +1058,8 @@
           <a:p>
             <a:fld id="{0BF94AD7-59A1-45F9-ACA2-67E78D40517C}" type="datetimeFigureOut">
               <a:rPr lang="en-US" smtClean="0"/>
-              <a:t>11/23/2014</a:t>
+              <a:pPr/>
+              <a:t>12/4/2014</a:t>
             </a:fld>
             <a:endParaRPr lang="en-US"/>
           </a:p>
@@ -1092,6 +1101,7 @@
           <a:p>
             <a:fld id="{3E6B769C-16DC-410E-BF95-1050F73C066F}" type="slidenum">
               <a:rPr lang="en-US" smtClean="0"/>
+              <a:pPr/>
               <a:t>‹#›</a:t>
             </a:fld>
             <a:endParaRPr lang="en-US"/>
@@ -1225,7 +1235,8 @@
           <a:p>
             <a:fld id="{0BF94AD7-59A1-45F9-ACA2-67E78D40517C}" type="datetimeFigureOut">
               <a:rPr lang="en-US" smtClean="0"/>
-              <a:t>11/23/2014</a:t>
+              <a:pPr/>
+              <a:t>12/4/2014</a:t>
             </a:fld>
             <a:endParaRPr lang="en-US"/>
           </a:p>
@@ -1267,6 +1278,7 @@
           <a:p>
             <a:fld id="{3E6B769C-16DC-410E-BF95-1050F73C066F}" type="slidenum">
               <a:rPr lang="en-US" smtClean="0"/>
+              <a:pPr/>
               <a:t>‹#›</a:t>
             </a:fld>
             <a:endParaRPr lang="en-US"/>
@@ -1390,7 +1402,8 @@
           <a:p>
             <a:fld id="{0BF94AD7-59A1-45F9-ACA2-67E78D40517C}" type="datetimeFigureOut">
               <a:rPr lang="en-US" smtClean="0"/>
-              <a:t>11/23/2014</a:t>
+              <a:pPr/>
+              <a:t>12/4/2014</a:t>
             </a:fld>
             <a:endParaRPr lang="en-US"/>
           </a:p>
@@ -1432,6 +1445,7 @@
           <a:p>
             <a:fld id="{3E6B769C-16DC-410E-BF95-1050F73C066F}" type="slidenum">
               <a:rPr lang="en-US" smtClean="0"/>
+              <a:pPr/>
               <a:t>‹#›</a:t>
             </a:fld>
             <a:endParaRPr lang="en-US"/>
@@ -1631,7 +1645,8 @@
           <a:p>
             <a:fld id="{0BF94AD7-59A1-45F9-ACA2-67E78D40517C}" type="datetimeFigureOut">
               <a:rPr lang="en-US" smtClean="0"/>
-              <a:t>11/23/2014</a:t>
+              <a:pPr/>
+              <a:t>12/4/2014</a:t>
             </a:fld>
             <a:endParaRPr lang="en-US"/>
           </a:p>
@@ -1673,6 +1688,7 @@
           <a:p>
             <a:fld id="{3E6B769C-16DC-410E-BF95-1050F73C066F}" type="slidenum">
               <a:rPr lang="en-US" smtClean="0"/>
+              <a:pPr/>
               <a:t>‹#›</a:t>
             </a:fld>
             <a:endParaRPr lang="en-US"/>
@@ -1914,7 +1930,8 @@
           <a:p>
             <a:fld id="{0BF94AD7-59A1-45F9-ACA2-67E78D40517C}" type="datetimeFigureOut">
               <a:rPr lang="en-US" smtClean="0"/>
-              <a:t>11/23/2014</a:t>
+              <a:pPr/>
+              <a:t>12/4/2014</a:t>
             </a:fld>
             <a:endParaRPr lang="en-US"/>
           </a:p>
@@ -1956,6 +1973,7 @@
           <a:p>
             <a:fld id="{3E6B769C-16DC-410E-BF95-1050F73C066F}" type="slidenum">
               <a:rPr lang="en-US" smtClean="0"/>
+              <a:pPr/>
               <a:t>‹#›</a:t>
             </a:fld>
             <a:endParaRPr lang="en-US"/>
@@ -2331,7 +2349,8 @@
           <a:p>
             <a:fld id="{0BF94AD7-59A1-45F9-ACA2-67E78D40517C}" type="datetimeFigureOut">
               <a:rPr lang="en-US" smtClean="0"/>
-              <a:t>11/23/2014</a:t>
+              <a:pPr/>
+              <a:t>12/4/2014</a:t>
             </a:fld>
             <a:endParaRPr lang="en-US"/>
           </a:p>
@@ -2373,6 +2392,7 @@
           <a:p>
             <a:fld id="{3E6B769C-16DC-410E-BF95-1050F73C066F}" type="slidenum">
               <a:rPr lang="en-US" smtClean="0"/>
+              <a:pPr/>
               <a:t>‹#›</a:t>
             </a:fld>
             <a:endParaRPr lang="en-US"/>
@@ -2444,7 +2464,8 @@
           <a:p>
             <a:fld id="{0BF94AD7-59A1-45F9-ACA2-67E78D40517C}" type="datetimeFigureOut">
               <a:rPr lang="en-US" smtClean="0"/>
-              <a:t>11/23/2014</a:t>
+              <a:pPr/>
+              <a:t>12/4/2014</a:t>
             </a:fld>
             <a:endParaRPr lang="en-US"/>
           </a:p>
@@ -2486,6 +2507,7 @@
           <a:p>
             <a:fld id="{3E6B769C-16DC-410E-BF95-1050F73C066F}" type="slidenum">
               <a:rPr lang="en-US" smtClean="0"/>
+              <a:pPr/>
               <a:t>‹#›</a:t>
             </a:fld>
             <a:endParaRPr lang="en-US"/>
@@ -2534,7 +2556,8 @@
           <a:p>
             <a:fld id="{0BF94AD7-59A1-45F9-ACA2-67E78D40517C}" type="datetimeFigureOut">
               <a:rPr lang="en-US" smtClean="0"/>
-              <a:t>11/23/2014</a:t>
+              <a:pPr/>
+              <a:t>12/4/2014</a:t>
             </a:fld>
             <a:endParaRPr lang="en-US"/>
           </a:p>
@@ -2576,6 +2599,7 @@
           <a:p>
             <a:fld id="{3E6B769C-16DC-410E-BF95-1050F73C066F}" type="slidenum">
               <a:rPr lang="en-US" smtClean="0"/>
+              <a:pPr/>
               <a:t>‹#›</a:t>
             </a:fld>
             <a:endParaRPr lang="en-US"/>
@@ -2806,7 +2830,8 @@
           <a:p>
             <a:fld id="{0BF94AD7-59A1-45F9-ACA2-67E78D40517C}" type="datetimeFigureOut">
               <a:rPr lang="en-US" smtClean="0"/>
-              <a:t>11/23/2014</a:t>
+              <a:pPr/>
+              <a:t>12/4/2014</a:t>
             </a:fld>
             <a:endParaRPr lang="en-US"/>
           </a:p>
@@ -2848,6 +2873,7 @@
           <a:p>
             <a:fld id="{3E6B769C-16DC-410E-BF95-1050F73C066F}" type="slidenum">
               <a:rPr lang="en-US" smtClean="0"/>
+              <a:pPr/>
               <a:t>‹#›</a:t>
             </a:fld>
             <a:endParaRPr lang="en-US"/>
@@ -3054,7 +3080,8 @@
           <a:p>
             <a:fld id="{0BF94AD7-59A1-45F9-ACA2-67E78D40517C}" type="datetimeFigureOut">
               <a:rPr lang="en-US" smtClean="0"/>
-              <a:t>11/23/2014</a:t>
+              <a:pPr/>
+              <a:t>12/4/2014</a:t>
             </a:fld>
             <a:endParaRPr lang="en-US"/>
           </a:p>
@@ -3096,6 +3123,7 @@
           <a:p>
             <a:fld id="{3E6B769C-16DC-410E-BF95-1050F73C066F}" type="slidenum">
               <a:rPr lang="en-US" smtClean="0"/>
+              <a:pPr/>
               <a:t>‹#›</a:t>
             </a:fld>
             <a:endParaRPr lang="en-US"/>
@@ -3262,7 +3290,8 @@
           <a:p>
             <a:fld id="{0BF94AD7-59A1-45F9-ACA2-67E78D40517C}" type="datetimeFigureOut">
               <a:rPr lang="en-US" smtClean="0"/>
-              <a:t>11/23/2014</a:t>
+              <a:pPr/>
+              <a:t>12/4/2014</a:t>
             </a:fld>
             <a:endParaRPr lang="en-US"/>
           </a:p>
@@ -3340,6 +3369,7 @@
           <a:p>
             <a:fld id="{3E6B769C-16DC-410E-BF95-1050F73C066F}" type="slidenum">
               <a:rPr lang="en-US" smtClean="0"/>
+              <a:pPr/>
               <a:t>‹#›</a:t>
             </a:fld>
             <a:endParaRPr lang="en-US"/>
@@ -5613,11 +5643,7 @@
           <a:p>
             <a:r>
               <a:rPr lang="es-AR" dirty="0" smtClean="0"/>
-              <a:t>F(</a:t>
-            </a:r>
-            <a:r>
-              <a:rPr lang="es-AR" dirty="0" smtClean="0"/>
-              <a:t>i</a:t>
+              <a:t>F(i</a:t>
             </a:r>
             <a:r>
               <a:rPr lang="en-US" dirty="0" smtClean="0"/>
@@ -5688,11 +5714,7 @@
           <a:p>
             <a:r>
               <a:rPr lang="es-AR" dirty="0" smtClean="0"/>
-              <a:t>F(</a:t>
-            </a:r>
-            <a:r>
-              <a:rPr lang="es-AR" dirty="0" smtClean="0"/>
-              <a:t>i</a:t>
+              <a:t>F(i</a:t>
             </a:r>
             <a:r>
               <a:rPr lang="en-US" dirty="0" smtClean="0"/>
@@ -5774,6 +5796,463 @@
             <a:r>
               <a:rPr lang="es-AR" dirty="0" err="1" smtClean="0"/>
               <a:t>desire</a:t>
+            </a:r>
+            <a:endParaRPr lang="en-US" dirty="0"/>
+          </a:p>
+        </p:txBody>
+      </p:sp>
+    </p:spTree>
+  </p:cSld>
+  <p:clrMapOvr>
+    <a:masterClrMapping/>
+  </p:clrMapOvr>
+</p:sld>
+</file>
+
+<file path=ppt/slides/slide6.xml><?xml version="1.0" encoding="utf-8"?>
+<p:sld xmlns:a="http://schemas.openxmlformats.org/drawingml/2006/main" xmlns:r="http://schemas.openxmlformats.org/officeDocument/2006/relationships" xmlns:p="http://schemas.openxmlformats.org/presentationml/2006/main">
+  <p:cSld>
+    <p:spTree>
+      <p:nvGrpSpPr>
+        <p:cNvPr id="1" name=""/>
+        <p:cNvGrpSpPr/>
+        <p:nvPr/>
+      </p:nvGrpSpPr>
+      <p:grpSpPr>
+        <a:xfrm>
+          <a:off x="0" y="0"/>
+          <a:ext cx="0" cy="0"/>
+          <a:chOff x="0" y="0"/>
+          <a:chExt cx="0" cy="0"/>
+        </a:xfrm>
+      </p:grpSpPr>
+      <p:sp>
+        <p:nvSpPr>
+          <p:cNvPr id="14" name="Oval 13"/>
+          <p:cNvSpPr/>
+          <p:nvPr/>
+        </p:nvSpPr>
+        <p:spPr>
+          <a:xfrm>
+            <a:off x="4572000" y="4876800"/>
+            <a:ext cx="152400" cy="152400"/>
+          </a:xfrm>
+          <a:prstGeom prst="ellipse">
+            <a:avLst/>
+          </a:prstGeom>
+          <a:noFill/>
+        </p:spPr>
+        <p:style>
+          <a:lnRef idx="2">
+            <a:schemeClr val="accent1"/>
+          </a:lnRef>
+          <a:fillRef idx="1">
+            <a:schemeClr val="lt1"/>
+          </a:fillRef>
+          <a:effectRef idx="0">
+            <a:schemeClr val="accent1"/>
+          </a:effectRef>
+          <a:fontRef idx="minor">
+            <a:schemeClr val="dk1"/>
+          </a:fontRef>
+        </p:style>
+        <p:txBody>
+          <a:bodyPr rtlCol="0" anchor="ctr"/>
+          <a:lstStyle/>
+          <a:p>
+            <a:pPr algn="ctr"/>
+            <a:endParaRPr lang="en-US"/>
+          </a:p>
+        </p:txBody>
+      </p:sp>
+      <p:sp>
+        <p:nvSpPr>
+          <p:cNvPr id="15" name="Oval 14"/>
+          <p:cNvSpPr/>
+          <p:nvPr/>
+        </p:nvSpPr>
+        <p:spPr>
+          <a:xfrm>
+            <a:off x="2057400" y="4736068"/>
+            <a:ext cx="1219200" cy="1219200"/>
+          </a:xfrm>
+          <a:prstGeom prst="ellipse">
+            <a:avLst/>
+          </a:prstGeom>
+          <a:noFill/>
+        </p:spPr>
+        <p:style>
+          <a:lnRef idx="2">
+            <a:schemeClr val="accent1"/>
+          </a:lnRef>
+          <a:fillRef idx="1">
+            <a:schemeClr val="lt1"/>
+          </a:fillRef>
+          <a:effectRef idx="0">
+            <a:schemeClr val="accent1"/>
+          </a:effectRef>
+          <a:fontRef idx="minor">
+            <a:schemeClr val="dk1"/>
+          </a:fontRef>
+        </p:style>
+        <p:txBody>
+          <a:bodyPr rtlCol="0" anchor="ctr"/>
+          <a:lstStyle/>
+          <a:p>
+            <a:pPr algn="ctr"/>
+            <a:endParaRPr lang="en-US"/>
+          </a:p>
+        </p:txBody>
+      </p:sp>
+      <p:cxnSp>
+        <p:nvCxnSpPr>
+          <p:cNvPr id="16" name="Straight Connector 15"/>
+          <p:cNvCxnSpPr>
+            <a:endCxn id="14" idx="2"/>
+          </p:cNvCxnSpPr>
+          <p:nvPr/>
+        </p:nvCxnSpPr>
+        <p:spPr>
+          <a:xfrm flipV="1">
+            <a:off x="3276600" y="4953000"/>
+            <a:ext cx="1298448" cy="233172"/>
+          </a:xfrm>
+          <a:prstGeom prst="line">
+            <a:avLst/>
+          </a:prstGeom>
+          <a:ln>
+            <a:solidFill>
+              <a:schemeClr val="tx1"/>
+            </a:solidFill>
+            <a:prstDash val="sysDash"/>
+          </a:ln>
+        </p:spPr>
+        <p:style>
+          <a:lnRef idx="1">
+            <a:schemeClr val="accent1"/>
+          </a:lnRef>
+          <a:fillRef idx="0">
+            <a:schemeClr val="accent1"/>
+          </a:fillRef>
+          <a:effectRef idx="0">
+            <a:schemeClr val="accent1"/>
+          </a:effectRef>
+          <a:fontRef idx="minor">
+            <a:schemeClr val="tx1"/>
+          </a:fontRef>
+        </p:style>
+      </p:cxnSp>
+      <p:sp>
+        <p:nvSpPr>
+          <p:cNvPr id="20" name="TextBox 19"/>
+          <p:cNvSpPr txBox="1"/>
+          <p:nvPr/>
+        </p:nvSpPr>
+        <p:spPr>
+          <a:xfrm>
+            <a:off x="3124200" y="5726668"/>
+            <a:ext cx="237566" cy="369332"/>
+          </a:xfrm>
+          <a:prstGeom prst="rect">
+            <a:avLst/>
+          </a:prstGeom>
+          <a:noFill/>
+        </p:spPr>
+        <p:txBody>
+          <a:bodyPr wrap="none" rtlCol="0">
+            <a:spAutoFit/>
+          </a:bodyPr>
+          <a:lstStyle/>
+          <a:p>
+            <a:r>
+              <a:rPr lang="es-AR" dirty="0" smtClean="0"/>
+              <a:t>i</a:t>
+            </a:r>
+            <a:endParaRPr lang="en-US" dirty="0"/>
+          </a:p>
+        </p:txBody>
+      </p:sp>
+      <p:cxnSp>
+        <p:nvCxnSpPr>
+          <p:cNvPr id="21" name="Straight Connector 20"/>
+          <p:cNvCxnSpPr/>
+          <p:nvPr/>
+        </p:nvCxnSpPr>
+        <p:spPr>
+          <a:xfrm rot="16200000" flipH="1">
+            <a:off x="4065134" y="1649868"/>
+            <a:ext cx="3233055" cy="2828922"/>
+          </a:xfrm>
+          <a:prstGeom prst="line">
+            <a:avLst/>
+          </a:prstGeom>
+          <a:ln w="19050">
+            <a:solidFill>
+              <a:schemeClr val="tx1"/>
+            </a:solidFill>
+            <a:prstDash val="dash"/>
+          </a:ln>
+        </p:spPr>
+        <p:style>
+          <a:lnRef idx="1">
+            <a:schemeClr val="accent1"/>
+          </a:lnRef>
+          <a:fillRef idx="0">
+            <a:schemeClr val="accent1"/>
+          </a:fillRef>
+          <a:effectRef idx="0">
+            <a:schemeClr val="accent1"/>
+          </a:effectRef>
+          <a:fontRef idx="minor">
+            <a:schemeClr val="tx1"/>
+          </a:fontRef>
+        </p:style>
+      </p:cxnSp>
+      <p:cxnSp>
+        <p:nvCxnSpPr>
+          <p:cNvPr id="22" name="Straight Connector 21"/>
+          <p:cNvCxnSpPr>
+            <a:stCxn id="15" idx="7"/>
+          </p:cNvCxnSpPr>
+          <p:nvPr/>
+        </p:nvCxnSpPr>
+        <p:spPr>
+          <a:xfrm rot="5400000" flipH="1" flipV="1">
+            <a:off x="3222069" y="2695383"/>
+            <a:ext cx="2095216" cy="2343250"/>
+          </a:xfrm>
+          <a:prstGeom prst="line">
+            <a:avLst/>
+          </a:prstGeom>
+          <a:ln>
+            <a:solidFill>
+              <a:schemeClr val="tx1"/>
+            </a:solidFill>
+            <a:prstDash val="dash"/>
+          </a:ln>
+        </p:spPr>
+        <p:style>
+          <a:lnRef idx="1">
+            <a:schemeClr val="accent1"/>
+          </a:lnRef>
+          <a:fillRef idx="0">
+            <a:schemeClr val="accent1"/>
+          </a:fillRef>
+          <a:effectRef idx="0">
+            <a:schemeClr val="accent1"/>
+          </a:effectRef>
+          <a:fontRef idx="minor">
+            <a:schemeClr val="tx1"/>
+          </a:fontRef>
+        </p:style>
+      </p:cxnSp>
+      <p:sp>
+        <p:nvSpPr>
+          <p:cNvPr id="23" name="TextBox 22"/>
+          <p:cNvSpPr txBox="1"/>
+          <p:nvPr/>
+        </p:nvSpPr>
+        <p:spPr>
+          <a:xfrm>
+            <a:off x="5486400" y="2590800"/>
+            <a:ext cx="1179490" cy="369332"/>
+          </a:xfrm>
+          <a:prstGeom prst="rect">
+            <a:avLst/>
+          </a:prstGeom>
+          <a:noFill/>
+        </p:spPr>
+        <p:txBody>
+          <a:bodyPr wrap="none" rtlCol="0">
+            <a:spAutoFit/>
+          </a:bodyPr>
+          <a:lstStyle/>
+          <a:p>
+            <a:r>
+              <a:rPr lang="es-AR" dirty="0" err="1" smtClean="0"/>
+              <a:t>Objective</a:t>
+            </a:r>
+            <a:r>
+              <a:rPr lang="es-AR" dirty="0" smtClean="0"/>
+              <a:t> i</a:t>
+            </a:r>
+            <a:endParaRPr lang="en-US" dirty="0"/>
+          </a:p>
+        </p:txBody>
+      </p:sp>
+      <p:sp>
+        <p:nvSpPr>
+          <p:cNvPr id="28" name="TextBox 27"/>
+          <p:cNvSpPr txBox="1"/>
+          <p:nvPr/>
+        </p:nvSpPr>
+        <p:spPr>
+          <a:xfrm>
+            <a:off x="4648200" y="4953000"/>
+            <a:ext cx="288862" cy="369332"/>
+          </a:xfrm>
+          <a:prstGeom prst="rect">
+            <a:avLst/>
+          </a:prstGeom>
+          <a:noFill/>
+        </p:spPr>
+        <p:txBody>
+          <a:bodyPr wrap="none" rtlCol="0">
+            <a:spAutoFit/>
+          </a:bodyPr>
+          <a:lstStyle/>
+          <a:p>
+            <a:r>
+              <a:rPr lang="es-AR" dirty="0" smtClean="0"/>
+              <a:t>i</a:t>
+            </a:r>
+            <a:r>
+              <a:rPr lang="en-US" dirty="0" smtClean="0"/>
+              <a:t>'</a:t>
+            </a:r>
+            <a:endParaRPr lang="en-US" dirty="0"/>
+          </a:p>
+        </p:txBody>
+      </p:sp>
+      <p:cxnSp>
+        <p:nvCxnSpPr>
+          <p:cNvPr id="30" name="Straight Arrow Connector 29"/>
+          <p:cNvCxnSpPr/>
+          <p:nvPr/>
+        </p:nvCxnSpPr>
+        <p:spPr>
+          <a:xfrm rot="5400000" flipH="1" flipV="1">
+            <a:off x="4419600" y="4343400"/>
+            <a:ext cx="838200" cy="381000"/>
+          </a:xfrm>
+          <a:prstGeom prst="straightConnector1">
+            <a:avLst/>
+          </a:prstGeom>
+          <a:ln w="19050">
+            <a:solidFill>
+              <a:srgbClr val="00B050"/>
+            </a:solidFill>
+            <a:tailEnd type="arrow"/>
+          </a:ln>
+        </p:spPr>
+        <p:style>
+          <a:lnRef idx="1">
+            <a:schemeClr val="accent1"/>
+          </a:lnRef>
+          <a:fillRef idx="0">
+            <a:schemeClr val="accent1"/>
+          </a:fillRef>
+          <a:effectRef idx="0">
+            <a:schemeClr val="accent1"/>
+          </a:effectRef>
+          <a:fontRef idx="minor">
+            <a:schemeClr val="tx1"/>
+          </a:fontRef>
+        </p:style>
+      </p:cxnSp>
+      <p:sp>
+        <p:nvSpPr>
+          <p:cNvPr id="31" name="TextBox 30"/>
+          <p:cNvSpPr txBox="1"/>
+          <p:nvPr/>
+        </p:nvSpPr>
+        <p:spPr>
+          <a:xfrm>
+            <a:off x="4953000" y="4191000"/>
+            <a:ext cx="615810" cy="369332"/>
+          </a:xfrm>
+          <a:prstGeom prst="rect">
+            <a:avLst/>
+          </a:prstGeom>
+          <a:noFill/>
+        </p:spPr>
+        <p:txBody>
+          <a:bodyPr wrap="none" rtlCol="0">
+            <a:spAutoFit/>
+          </a:bodyPr>
+          <a:lstStyle/>
+          <a:p>
+            <a:r>
+              <a:rPr lang="es-AR" dirty="0" smtClean="0"/>
+              <a:t>F</a:t>
+            </a:r>
+            <a:r>
+              <a:rPr lang="en-US" dirty="0" smtClean="0"/>
+              <a:t>S2 </a:t>
+            </a:r>
+            <a:r>
+              <a:rPr lang="en-US" dirty="0" err="1" smtClean="0"/>
+              <a:t>i</a:t>
+            </a:r>
+            <a:endParaRPr lang="en-US" dirty="0" smtClean="0"/>
+          </a:p>
+        </p:txBody>
+      </p:sp>
+      <p:cxnSp>
+        <p:nvCxnSpPr>
+          <p:cNvPr id="32" name="Straight Arrow Connector 31"/>
+          <p:cNvCxnSpPr/>
+          <p:nvPr/>
+        </p:nvCxnSpPr>
+        <p:spPr>
+          <a:xfrm flipV="1">
+            <a:off x="4648200" y="4836153"/>
+            <a:ext cx="684381" cy="116847"/>
+          </a:xfrm>
+          <a:prstGeom prst="straightConnector1">
+            <a:avLst/>
+          </a:prstGeom>
+          <a:ln w="19050">
+            <a:solidFill>
+              <a:schemeClr val="accent6"/>
+            </a:solidFill>
+            <a:tailEnd type="arrow"/>
+          </a:ln>
+        </p:spPr>
+        <p:style>
+          <a:lnRef idx="1">
+            <a:schemeClr val="accent1"/>
+          </a:lnRef>
+          <a:fillRef idx="0">
+            <a:schemeClr val="accent1"/>
+          </a:fillRef>
+          <a:effectRef idx="0">
+            <a:schemeClr val="accent1"/>
+          </a:effectRef>
+          <a:fontRef idx="minor">
+            <a:schemeClr val="tx1"/>
+          </a:fontRef>
+        </p:style>
+      </p:cxnSp>
+      <p:sp>
+        <p:nvSpPr>
+          <p:cNvPr id="33" name="TextBox 32"/>
+          <p:cNvSpPr txBox="1"/>
+          <p:nvPr/>
+        </p:nvSpPr>
+        <p:spPr>
+          <a:xfrm>
+            <a:off x="5105400" y="4876800"/>
+            <a:ext cx="615810" cy="369332"/>
+          </a:xfrm>
+          <a:prstGeom prst="rect">
+            <a:avLst/>
+          </a:prstGeom>
+          <a:noFill/>
+        </p:spPr>
+        <p:txBody>
+          <a:bodyPr wrap="none" rtlCol="0">
+            <a:spAutoFit/>
+          </a:bodyPr>
+          <a:lstStyle/>
+          <a:p>
+            <a:r>
+              <a:rPr lang="en-US" dirty="0" smtClean="0"/>
+              <a:t>FS1 </a:t>
+            </a:r>
+            <a:r>
+              <a:rPr lang="en-US" dirty="0" err="1" smtClean="0"/>
+              <a:t>i</a:t>
             </a:r>
             <a:endParaRPr lang="en-US" dirty="0"/>
           </a:p>

</xml_diff>

<commit_message>
me olvide subir la ultima foto de pictures.pptx arreglo errores menores en el paper.tex. actualizo pdf.
</commit_message>
<xml_diff>
--- a/doc/informe/pictures.pptx
+++ b/doc/informe/pictures.pptx
@@ -6255,6 +6255,36 @@
               <a:t>i</a:t>
             </a:r>
             <a:endParaRPr lang="en-US" dirty="0"/>
+          </a:p>
+        </p:txBody>
+      </p:sp>
+      <p:sp>
+        <p:nvSpPr>
+          <p:cNvPr id="48" name="TextBox 47"/>
+          <p:cNvSpPr txBox="1"/>
+          <p:nvPr/>
+        </p:nvSpPr>
+        <p:spPr>
+          <a:xfrm>
+            <a:off x="0" y="11668"/>
+            <a:ext cx="3048000" cy="369332"/>
+          </a:xfrm>
+          <a:prstGeom prst="rect">
+            <a:avLst/>
+          </a:prstGeom>
+          <a:noFill/>
+        </p:spPr>
+        <p:txBody>
+          <a:bodyPr wrap="square" rtlCol="0">
+            <a:spAutoFit/>
+          </a:bodyPr>
+          <a:lstStyle/>
+          <a:p>
+            <a:r>
+              <a:rPr lang="en-US" dirty="0" smtClean="0"/>
+              <a:t>pedestrian-internal-forces.png</a:t>
+            </a:r>
+            <a:endParaRPr lang="en-US" dirty="0" smtClean="0"/>
           </a:p>
         </p:txBody>
       </p:sp>

</xml_diff>

<commit_message>
agrego secciones habladas con daniel en la ultima reunion. correciones varias.
</commit_message>
<xml_diff>
--- a/doc/informe/pictures.pptx
+++ b/doc/informe/pictures.pptx
@@ -5,7 +5,7 @@
     <p:sldMasterId id="2147483648" r:id="rId1"/>
   </p:sldMasterIdLst>
   <p:notesMasterIdLst>
-    <p:notesMasterId r:id="rId8"/>
+    <p:notesMasterId r:id="rId9"/>
   </p:notesMasterIdLst>
   <p:sldIdLst>
     <p:sldId id="256" r:id="rId2"/>
@@ -14,6 +14,7 @@
     <p:sldId id="259" r:id="rId5"/>
     <p:sldId id="260" r:id="rId6"/>
     <p:sldId id="261" r:id="rId7"/>
+    <p:sldId id="262" r:id="rId8"/>
   </p:sldIdLst>
   <p:sldSz cx="9144000" cy="6858000" type="screen4x3"/>
   <p:notesSz cx="6858000" cy="9144000"/>
@@ -198,7 +199,7 @@
             <a:fld id="{845A57F8-9FFB-4742-8CFD-3414C37FBF35}" type="datetimeFigureOut">
               <a:rPr lang="en-US" smtClean="0"/>
               <a:pPr/>
-              <a:t>12/4/2014</a:t>
+              <a:t>12/7/2014</a:t>
             </a:fld>
             <a:endParaRPr lang="en-US"/>
           </a:p>
@@ -710,6 +711,88 @@
 </p:notes>
 </file>
 
+<file path=ppt/notesSlides/notesSlide4.xml><?xml version="1.0" encoding="utf-8"?>
+<p:notes xmlns:a="http://schemas.openxmlformats.org/drawingml/2006/main" xmlns:r="http://schemas.openxmlformats.org/officeDocument/2006/relationships" xmlns:p="http://schemas.openxmlformats.org/presentationml/2006/main">
+  <p:cSld>
+    <p:spTree>
+      <p:nvGrpSpPr>
+        <p:cNvPr id="1" name=""/>
+        <p:cNvGrpSpPr/>
+        <p:nvPr/>
+      </p:nvGrpSpPr>
+      <p:grpSpPr>
+        <a:xfrm>
+          <a:off x="0" y="0"/>
+          <a:ext cx="0" cy="0"/>
+          <a:chOff x="0" y="0"/>
+          <a:chExt cx="0" cy="0"/>
+        </a:xfrm>
+      </p:grpSpPr>
+      <p:sp>
+        <p:nvSpPr>
+          <p:cNvPr id="2" name="Slide Image Placeholder 1"/>
+          <p:cNvSpPr>
+            <a:spLocks noGrp="1" noRot="1" noChangeAspect="1"/>
+          </p:cNvSpPr>
+          <p:nvPr>
+            <p:ph type="sldImg"/>
+          </p:nvPr>
+        </p:nvSpPr>
+        <p:spPr/>
+      </p:sp>
+      <p:sp>
+        <p:nvSpPr>
+          <p:cNvPr id="3" name="Notes Placeholder 2"/>
+          <p:cNvSpPr>
+            <a:spLocks noGrp="1"/>
+          </p:cNvSpPr>
+          <p:nvPr>
+            <p:ph type="body" idx="1"/>
+          </p:nvPr>
+        </p:nvSpPr>
+        <p:spPr/>
+        <p:txBody>
+          <a:bodyPr>
+            <a:normAutofit/>
+          </a:bodyPr>
+          <a:lstStyle/>
+          <a:p>
+            <a:endParaRPr lang="en-US" dirty="0"/>
+          </a:p>
+        </p:txBody>
+      </p:sp>
+      <p:sp>
+        <p:nvSpPr>
+          <p:cNvPr id="4" name="Slide Number Placeholder 3"/>
+          <p:cNvSpPr>
+            <a:spLocks noGrp="1"/>
+          </p:cNvSpPr>
+          <p:nvPr>
+            <p:ph type="sldNum" sz="quarter" idx="10"/>
+          </p:nvPr>
+        </p:nvSpPr>
+        <p:spPr/>
+        <p:txBody>
+          <a:bodyPr/>
+          <a:lstStyle/>
+          <a:p>
+            <a:fld id="{7D97FC9E-4CEA-462C-95AC-29F39B39D0EF}" type="slidenum">
+              <a:rPr lang="en-US" smtClean="0"/>
+              <a:pPr/>
+              <a:t>7</a:t>
+            </a:fld>
+            <a:endParaRPr lang="en-US"/>
+          </a:p>
+        </p:txBody>
+      </p:sp>
+    </p:spTree>
+  </p:cSld>
+  <p:clrMapOvr>
+    <a:masterClrMapping/>
+  </p:clrMapOvr>
+</p:notes>
+</file>
+
 <file path=ppt/slideLayouts/slideLayout1.xml><?xml version="1.0" encoding="utf-8"?>
 <p:sldLayout xmlns:a="http://schemas.openxmlformats.org/drawingml/2006/main" xmlns:r="http://schemas.openxmlformats.org/officeDocument/2006/relationships" xmlns:p="http://schemas.openxmlformats.org/presentationml/2006/main" type="title" preserve="1">
   <p:cSld name="Title Slide">
@@ -892,7 +975,7 @@
             <a:fld id="{0BF94AD7-59A1-45F9-ACA2-67E78D40517C}" type="datetimeFigureOut">
               <a:rPr lang="en-US" smtClean="0"/>
               <a:pPr/>
-              <a:t>12/4/2014</a:t>
+              <a:t>12/7/2014</a:t>
             </a:fld>
             <a:endParaRPr lang="en-US"/>
           </a:p>
@@ -1059,7 +1142,7 @@
             <a:fld id="{0BF94AD7-59A1-45F9-ACA2-67E78D40517C}" type="datetimeFigureOut">
               <a:rPr lang="en-US" smtClean="0"/>
               <a:pPr/>
-              <a:t>12/4/2014</a:t>
+              <a:t>12/7/2014</a:t>
             </a:fld>
             <a:endParaRPr lang="en-US"/>
           </a:p>
@@ -1236,7 +1319,7 @@
             <a:fld id="{0BF94AD7-59A1-45F9-ACA2-67E78D40517C}" type="datetimeFigureOut">
               <a:rPr lang="en-US" smtClean="0"/>
               <a:pPr/>
-              <a:t>12/4/2014</a:t>
+              <a:t>12/7/2014</a:t>
             </a:fld>
             <a:endParaRPr lang="en-US"/>
           </a:p>
@@ -1403,7 +1486,7 @@
             <a:fld id="{0BF94AD7-59A1-45F9-ACA2-67E78D40517C}" type="datetimeFigureOut">
               <a:rPr lang="en-US" smtClean="0"/>
               <a:pPr/>
-              <a:t>12/4/2014</a:t>
+              <a:t>12/7/2014</a:t>
             </a:fld>
             <a:endParaRPr lang="en-US"/>
           </a:p>
@@ -1646,7 +1729,7 @@
             <a:fld id="{0BF94AD7-59A1-45F9-ACA2-67E78D40517C}" type="datetimeFigureOut">
               <a:rPr lang="en-US" smtClean="0"/>
               <a:pPr/>
-              <a:t>12/4/2014</a:t>
+              <a:t>12/7/2014</a:t>
             </a:fld>
             <a:endParaRPr lang="en-US"/>
           </a:p>
@@ -1931,7 +2014,7 @@
             <a:fld id="{0BF94AD7-59A1-45F9-ACA2-67E78D40517C}" type="datetimeFigureOut">
               <a:rPr lang="en-US" smtClean="0"/>
               <a:pPr/>
-              <a:t>12/4/2014</a:t>
+              <a:t>12/7/2014</a:t>
             </a:fld>
             <a:endParaRPr lang="en-US"/>
           </a:p>
@@ -2350,7 +2433,7 @@
             <a:fld id="{0BF94AD7-59A1-45F9-ACA2-67E78D40517C}" type="datetimeFigureOut">
               <a:rPr lang="en-US" smtClean="0"/>
               <a:pPr/>
-              <a:t>12/4/2014</a:t>
+              <a:t>12/7/2014</a:t>
             </a:fld>
             <a:endParaRPr lang="en-US"/>
           </a:p>
@@ -2465,7 +2548,7 @@
             <a:fld id="{0BF94AD7-59A1-45F9-ACA2-67E78D40517C}" type="datetimeFigureOut">
               <a:rPr lang="en-US" smtClean="0"/>
               <a:pPr/>
-              <a:t>12/4/2014</a:t>
+              <a:t>12/7/2014</a:t>
             </a:fld>
             <a:endParaRPr lang="en-US"/>
           </a:p>
@@ -2557,7 +2640,7 @@
             <a:fld id="{0BF94AD7-59A1-45F9-ACA2-67E78D40517C}" type="datetimeFigureOut">
               <a:rPr lang="en-US" smtClean="0"/>
               <a:pPr/>
-              <a:t>12/4/2014</a:t>
+              <a:t>12/7/2014</a:t>
             </a:fld>
             <a:endParaRPr lang="en-US"/>
           </a:p>
@@ -2831,7 +2914,7 @@
             <a:fld id="{0BF94AD7-59A1-45F9-ACA2-67E78D40517C}" type="datetimeFigureOut">
               <a:rPr lang="en-US" smtClean="0"/>
               <a:pPr/>
-              <a:t>12/4/2014</a:t>
+              <a:t>12/7/2014</a:t>
             </a:fld>
             <a:endParaRPr lang="en-US"/>
           </a:p>
@@ -3081,7 +3164,7 @@
             <a:fld id="{0BF94AD7-59A1-45F9-ACA2-67E78D40517C}" type="datetimeFigureOut">
               <a:rPr lang="en-US" smtClean="0"/>
               <a:pPr/>
-              <a:t>12/4/2014</a:t>
+              <a:t>12/7/2014</a:t>
             </a:fld>
             <a:endParaRPr lang="en-US"/>
           </a:p>
@@ -3291,7 +3374,7 @@
             <a:fld id="{0BF94AD7-59A1-45F9-ACA2-67E78D40517C}" type="datetimeFigureOut">
               <a:rPr lang="en-US" smtClean="0"/>
               <a:pPr/>
-              <a:t>12/4/2014</a:t>
+              <a:t>12/7/2014</a:t>
             </a:fld>
             <a:endParaRPr lang="en-US"/>
           </a:p>
@@ -6284,7 +6367,820 @@
               <a:rPr lang="en-US" dirty="0" smtClean="0"/>
               <a:t>pedestrian-internal-forces.png</a:t>
             </a:r>
+          </a:p>
+        </p:txBody>
+      </p:sp>
+    </p:spTree>
+  </p:cSld>
+  <p:clrMapOvr>
+    <a:masterClrMapping/>
+  </p:clrMapOvr>
+</p:sld>
+</file>
+
+<file path=ppt/slides/slide7.xml><?xml version="1.0" encoding="utf-8"?>
+<p:sld xmlns:a="http://schemas.openxmlformats.org/drawingml/2006/main" xmlns:r="http://schemas.openxmlformats.org/officeDocument/2006/relationships" xmlns:p="http://schemas.openxmlformats.org/presentationml/2006/main">
+  <p:cSld>
+    <p:spTree>
+      <p:nvGrpSpPr>
+        <p:cNvPr id="1" name=""/>
+        <p:cNvGrpSpPr/>
+        <p:nvPr/>
+      </p:nvGrpSpPr>
+      <p:grpSpPr>
+        <a:xfrm>
+          <a:off x="0" y="0"/>
+          <a:ext cx="0" cy="0"/>
+          <a:chOff x="0" y="0"/>
+          <a:chExt cx="0" cy="0"/>
+        </a:xfrm>
+      </p:grpSpPr>
+      <p:sp>
+        <p:nvSpPr>
+          <p:cNvPr id="5" name="Oval 4"/>
+          <p:cNvSpPr/>
+          <p:nvPr/>
+        </p:nvSpPr>
+        <p:spPr>
+          <a:xfrm>
+            <a:off x="3352800" y="3276600"/>
+            <a:ext cx="152400" cy="152400"/>
+          </a:xfrm>
+          <a:prstGeom prst="ellipse">
+            <a:avLst/>
+          </a:prstGeom>
+          <a:noFill/>
+        </p:spPr>
+        <p:style>
+          <a:lnRef idx="2">
+            <a:schemeClr val="accent1"/>
+          </a:lnRef>
+          <a:fillRef idx="1">
+            <a:schemeClr val="lt1"/>
+          </a:fillRef>
+          <a:effectRef idx="0">
+            <a:schemeClr val="accent1"/>
+          </a:effectRef>
+          <a:fontRef idx="minor">
+            <a:schemeClr val="dk1"/>
+          </a:fontRef>
+        </p:style>
+        <p:txBody>
+          <a:bodyPr rtlCol="0" anchor="ctr"/>
+          <a:lstStyle/>
+          <a:p>
+            <a:pPr algn="ctr"/>
+            <a:endParaRPr lang="en-US"/>
+          </a:p>
+        </p:txBody>
+      </p:sp>
+      <p:sp>
+        <p:nvSpPr>
+          <p:cNvPr id="6" name="Oval 5"/>
+          <p:cNvSpPr/>
+          <p:nvPr/>
+        </p:nvSpPr>
+        <p:spPr>
+          <a:xfrm>
+            <a:off x="1066797" y="2297668"/>
+            <a:ext cx="1219200" cy="1219200"/>
+          </a:xfrm>
+          <a:prstGeom prst="ellipse">
+            <a:avLst/>
+          </a:prstGeom>
+          <a:noFill/>
+        </p:spPr>
+        <p:style>
+          <a:lnRef idx="2">
+            <a:schemeClr val="accent1"/>
+          </a:lnRef>
+          <a:fillRef idx="1">
+            <a:schemeClr val="lt1"/>
+          </a:fillRef>
+          <a:effectRef idx="0">
+            <a:schemeClr val="accent1"/>
+          </a:effectRef>
+          <a:fontRef idx="minor">
+            <a:schemeClr val="dk1"/>
+          </a:fontRef>
+        </p:style>
+        <p:txBody>
+          <a:bodyPr rtlCol="0" anchor="ctr"/>
+          <a:lstStyle/>
+          <a:p>
+            <a:pPr algn="ctr"/>
+            <a:endParaRPr lang="en-US"/>
+          </a:p>
+        </p:txBody>
+      </p:sp>
+      <p:sp>
+        <p:nvSpPr>
+          <p:cNvPr id="11" name="TextBox 10"/>
+          <p:cNvSpPr txBox="1"/>
+          <p:nvPr/>
+        </p:nvSpPr>
+        <p:spPr>
+          <a:xfrm>
+            <a:off x="0" y="11668"/>
+            <a:ext cx="3048000" cy="369332"/>
+          </a:xfrm>
+          <a:prstGeom prst="rect">
+            <a:avLst/>
+          </a:prstGeom>
+          <a:noFill/>
+        </p:spPr>
+        <p:txBody>
+          <a:bodyPr wrap="square" rtlCol="0">
+            <a:spAutoFit/>
+          </a:bodyPr>
+          <a:lstStyle/>
+          <a:p>
+            <a:r>
+              <a:rPr lang="en-US" dirty="0" smtClean="0"/>
+              <a:t>geometry.png</a:t>
+            </a:r>
             <a:endParaRPr lang="en-US" dirty="0" smtClean="0"/>
+          </a:p>
+        </p:txBody>
+      </p:sp>
+      <p:cxnSp>
+        <p:nvCxnSpPr>
+          <p:cNvPr id="13" name="Straight Connector 12"/>
+          <p:cNvCxnSpPr/>
+          <p:nvPr/>
+        </p:nvCxnSpPr>
+        <p:spPr>
+          <a:xfrm>
+            <a:off x="2286000" y="3048000"/>
+            <a:ext cx="1089115" cy="294150"/>
+          </a:xfrm>
+          <a:prstGeom prst="line">
+            <a:avLst/>
+          </a:prstGeom>
+          <a:ln>
+            <a:solidFill>
+              <a:schemeClr val="tx1"/>
+            </a:solidFill>
+            <a:prstDash val="solid"/>
+          </a:ln>
+        </p:spPr>
+        <p:style>
+          <a:lnRef idx="1">
+            <a:schemeClr val="accent1"/>
+          </a:lnRef>
+          <a:fillRef idx="0">
+            <a:schemeClr val="accent1"/>
+          </a:fillRef>
+          <a:effectRef idx="0">
+            <a:schemeClr val="accent1"/>
+          </a:effectRef>
+          <a:fontRef idx="minor">
+            <a:schemeClr val="tx1"/>
+          </a:fontRef>
+        </p:style>
+      </p:cxnSp>
+      <p:sp>
+        <p:nvSpPr>
+          <p:cNvPr id="23" name="Oval 22"/>
+          <p:cNvSpPr/>
+          <p:nvPr/>
+        </p:nvSpPr>
+        <p:spPr>
+          <a:xfrm>
+            <a:off x="2743200" y="4583668"/>
+            <a:ext cx="152400" cy="152400"/>
+          </a:xfrm>
+          <a:prstGeom prst="ellipse">
+            <a:avLst/>
+          </a:prstGeom>
+          <a:noFill/>
+        </p:spPr>
+        <p:style>
+          <a:lnRef idx="2">
+            <a:schemeClr val="accent1"/>
+          </a:lnRef>
+          <a:fillRef idx="1">
+            <a:schemeClr val="lt1"/>
+          </a:fillRef>
+          <a:effectRef idx="0">
+            <a:schemeClr val="accent1"/>
+          </a:effectRef>
+          <a:fontRef idx="minor">
+            <a:schemeClr val="dk1"/>
+          </a:fontRef>
+        </p:style>
+        <p:txBody>
+          <a:bodyPr rtlCol="0" anchor="ctr"/>
+          <a:lstStyle/>
+          <a:p>
+            <a:pPr algn="ctr"/>
+            <a:endParaRPr lang="en-US"/>
+          </a:p>
+        </p:txBody>
+      </p:sp>
+      <p:sp>
+        <p:nvSpPr>
+          <p:cNvPr id="24" name="Oval 23"/>
+          <p:cNvSpPr/>
+          <p:nvPr/>
+        </p:nvSpPr>
+        <p:spPr>
+          <a:xfrm>
+            <a:off x="4114800" y="4050268"/>
+            <a:ext cx="1219200" cy="1219200"/>
+          </a:xfrm>
+          <a:prstGeom prst="ellipse">
+            <a:avLst/>
+          </a:prstGeom>
+          <a:noFill/>
+        </p:spPr>
+        <p:style>
+          <a:lnRef idx="2">
+            <a:schemeClr val="accent1"/>
+          </a:lnRef>
+          <a:fillRef idx="1">
+            <a:schemeClr val="lt1"/>
+          </a:fillRef>
+          <a:effectRef idx="0">
+            <a:schemeClr val="accent1"/>
+          </a:effectRef>
+          <a:fontRef idx="minor">
+            <a:schemeClr val="dk1"/>
+          </a:fontRef>
+        </p:style>
+        <p:txBody>
+          <a:bodyPr rtlCol="0" anchor="ctr"/>
+          <a:lstStyle/>
+          <a:p>
+            <a:pPr algn="ctr"/>
+            <a:endParaRPr lang="en-US"/>
+          </a:p>
+        </p:txBody>
+      </p:sp>
+      <p:cxnSp>
+        <p:nvCxnSpPr>
+          <p:cNvPr id="25" name="Straight Connector 24"/>
+          <p:cNvCxnSpPr>
+            <a:stCxn id="24" idx="2"/>
+            <a:endCxn id="23" idx="6"/>
+          </p:cNvCxnSpPr>
+          <p:nvPr/>
+        </p:nvCxnSpPr>
+        <p:spPr>
+          <a:xfrm rot="10800000">
+            <a:off x="2895600" y="4659868"/>
+            <a:ext cx="1219200" cy="1588"/>
+          </a:xfrm>
+          <a:prstGeom prst="line">
+            <a:avLst/>
+          </a:prstGeom>
+          <a:ln>
+            <a:solidFill>
+              <a:schemeClr val="tx1"/>
+            </a:solidFill>
+            <a:prstDash val="solid"/>
+          </a:ln>
+        </p:spPr>
+        <p:style>
+          <a:lnRef idx="1">
+            <a:schemeClr val="accent1"/>
+          </a:lnRef>
+          <a:fillRef idx="0">
+            <a:schemeClr val="accent1"/>
+          </a:fillRef>
+          <a:effectRef idx="0">
+            <a:schemeClr val="accent1"/>
+          </a:effectRef>
+          <a:fontRef idx="minor">
+            <a:schemeClr val="tx1"/>
+          </a:fontRef>
+        </p:style>
+      </p:cxnSp>
+      <p:sp>
+        <p:nvSpPr>
+          <p:cNvPr id="57" name="TextBox 56"/>
+          <p:cNvSpPr txBox="1"/>
+          <p:nvPr/>
+        </p:nvSpPr>
+        <p:spPr>
+          <a:xfrm>
+            <a:off x="1563624" y="2743200"/>
+            <a:ext cx="237566" cy="369332"/>
+          </a:xfrm>
+          <a:prstGeom prst="rect">
+            <a:avLst/>
+          </a:prstGeom>
+          <a:noFill/>
+        </p:spPr>
+        <p:txBody>
+          <a:bodyPr wrap="none" rtlCol="0">
+            <a:spAutoFit/>
+          </a:bodyPr>
+          <a:lstStyle/>
+          <a:p>
+            <a:r>
+              <a:rPr lang="es-AR" dirty="0" smtClean="0"/>
+              <a:t>i</a:t>
+            </a:r>
+            <a:endParaRPr lang="en-US" dirty="0"/>
+          </a:p>
+        </p:txBody>
+      </p:sp>
+      <p:cxnSp>
+        <p:nvCxnSpPr>
+          <p:cNvPr id="66" name="Straight Connector 65"/>
+          <p:cNvCxnSpPr/>
+          <p:nvPr/>
+        </p:nvCxnSpPr>
+        <p:spPr>
+          <a:xfrm rot="16200000" flipH="1">
+            <a:off x="7048501" y="3009899"/>
+            <a:ext cx="1447800" cy="2"/>
+          </a:xfrm>
+          <a:prstGeom prst="line">
+            <a:avLst/>
+          </a:prstGeom>
+          <a:ln w="19050">
+            <a:solidFill>
+              <a:schemeClr val="tx1"/>
+            </a:solidFill>
+            <a:prstDash val="dash"/>
+          </a:ln>
+        </p:spPr>
+        <p:style>
+          <a:lnRef idx="1">
+            <a:schemeClr val="accent1"/>
+          </a:lnRef>
+          <a:fillRef idx="0">
+            <a:schemeClr val="accent1"/>
+          </a:fillRef>
+          <a:effectRef idx="0">
+            <a:schemeClr val="accent1"/>
+          </a:effectRef>
+          <a:fontRef idx="minor">
+            <a:schemeClr val="tx1"/>
+          </a:fontRef>
+        </p:style>
+      </p:cxnSp>
+      <p:cxnSp>
+        <p:nvCxnSpPr>
+          <p:cNvPr id="79" name="Straight Connector 78"/>
+          <p:cNvCxnSpPr>
+            <a:stCxn id="6" idx="6"/>
+          </p:cNvCxnSpPr>
+          <p:nvPr/>
+        </p:nvCxnSpPr>
+        <p:spPr>
+          <a:xfrm>
+            <a:off x="2285997" y="2907268"/>
+            <a:ext cx="5486400" cy="1588"/>
+          </a:xfrm>
+          <a:prstGeom prst="line">
+            <a:avLst/>
+          </a:prstGeom>
+          <a:ln>
+            <a:solidFill>
+              <a:schemeClr val="tx1"/>
+            </a:solidFill>
+            <a:prstDash val="dash"/>
+          </a:ln>
+        </p:spPr>
+        <p:style>
+          <a:lnRef idx="1">
+            <a:schemeClr val="accent1"/>
+          </a:lnRef>
+          <a:fillRef idx="0">
+            <a:schemeClr val="accent1"/>
+          </a:fillRef>
+          <a:effectRef idx="0">
+            <a:schemeClr val="accent1"/>
+          </a:effectRef>
+          <a:fontRef idx="minor">
+            <a:schemeClr val="tx1"/>
+          </a:fontRef>
+        </p:style>
+      </p:cxnSp>
+      <p:sp>
+        <p:nvSpPr>
+          <p:cNvPr id="82" name="TextBox 81"/>
+          <p:cNvSpPr txBox="1"/>
+          <p:nvPr/>
+        </p:nvSpPr>
+        <p:spPr>
+          <a:xfrm>
+            <a:off x="7542106" y="2602468"/>
+            <a:ext cx="306494" cy="369332"/>
+          </a:xfrm>
+          <a:prstGeom prst="rect">
+            <a:avLst/>
+          </a:prstGeom>
+          <a:noFill/>
+        </p:spPr>
+        <p:txBody>
+          <a:bodyPr wrap="none" rtlCol="0">
+            <a:spAutoFit/>
+          </a:bodyPr>
+          <a:lstStyle/>
+          <a:p>
+            <a:r>
+              <a:rPr lang="es-AR" dirty="0" smtClean="0"/>
+              <a:t>o</a:t>
+            </a:r>
+            <a:endParaRPr lang="en-US" dirty="0"/>
+          </a:p>
+        </p:txBody>
+      </p:sp>
+      <p:sp>
+        <p:nvSpPr>
+          <p:cNvPr id="90" name="TextBox 89"/>
+          <p:cNvSpPr txBox="1"/>
+          <p:nvPr/>
+        </p:nvSpPr>
+        <p:spPr>
+          <a:xfrm>
+            <a:off x="4617720" y="4480560"/>
+            <a:ext cx="239168" cy="369332"/>
+          </a:xfrm>
+          <a:prstGeom prst="rect">
+            <a:avLst/>
+          </a:prstGeom>
+          <a:noFill/>
+        </p:spPr>
+        <p:txBody>
+          <a:bodyPr wrap="none" rtlCol="0">
+            <a:spAutoFit/>
+          </a:bodyPr>
+          <a:lstStyle/>
+          <a:p>
+            <a:r>
+              <a:rPr lang="es-AR" dirty="0" smtClean="0"/>
+              <a:t>j</a:t>
+            </a:r>
+            <a:endParaRPr lang="en-US" dirty="0"/>
+          </a:p>
+        </p:txBody>
+      </p:sp>
+      <p:sp>
+        <p:nvSpPr>
+          <p:cNvPr id="91" name="TextBox 90"/>
+          <p:cNvSpPr txBox="1"/>
+          <p:nvPr/>
+        </p:nvSpPr>
+        <p:spPr>
+          <a:xfrm>
+            <a:off x="2819400" y="4659868"/>
+            <a:ext cx="290464" cy="369332"/>
+          </a:xfrm>
+          <a:prstGeom prst="rect">
+            <a:avLst/>
+          </a:prstGeom>
+          <a:noFill/>
+        </p:spPr>
+        <p:txBody>
+          <a:bodyPr wrap="none" rtlCol="0">
+            <a:spAutoFit/>
+          </a:bodyPr>
+          <a:lstStyle/>
+          <a:p>
+            <a:r>
+              <a:rPr lang="en-US" dirty="0" smtClean="0"/>
+              <a:t>j'</a:t>
+            </a:r>
+            <a:endParaRPr lang="en-US" dirty="0"/>
+          </a:p>
+        </p:txBody>
+      </p:sp>
+      <p:sp>
+        <p:nvSpPr>
+          <p:cNvPr id="92" name="TextBox 91"/>
+          <p:cNvSpPr txBox="1"/>
+          <p:nvPr/>
+        </p:nvSpPr>
+        <p:spPr>
+          <a:xfrm>
+            <a:off x="3444938" y="3212068"/>
+            <a:ext cx="288862" cy="369332"/>
+          </a:xfrm>
+          <a:prstGeom prst="rect">
+            <a:avLst/>
+          </a:prstGeom>
+          <a:noFill/>
+        </p:spPr>
+        <p:txBody>
+          <a:bodyPr wrap="none" rtlCol="0">
+            <a:spAutoFit/>
+          </a:bodyPr>
+          <a:lstStyle/>
+          <a:p>
+            <a:r>
+              <a:rPr lang="es-AR" dirty="0" smtClean="0"/>
+              <a:t>i</a:t>
+            </a:r>
+            <a:r>
+              <a:rPr lang="en-US" dirty="0" smtClean="0"/>
+              <a:t>'</a:t>
+            </a:r>
+            <a:endParaRPr lang="en-US" dirty="0"/>
+          </a:p>
+        </p:txBody>
+      </p:sp>
+      <p:sp>
+        <p:nvSpPr>
+          <p:cNvPr id="45" name="TextBox 44"/>
+          <p:cNvSpPr txBox="1"/>
+          <p:nvPr/>
+        </p:nvSpPr>
+        <p:spPr>
+          <a:xfrm>
+            <a:off x="2895600" y="2971800"/>
+            <a:ext cx="304800" cy="369332"/>
+          </a:xfrm>
+          <a:prstGeom prst="rect">
+            <a:avLst/>
+          </a:prstGeom>
+          <a:noFill/>
+        </p:spPr>
+        <p:txBody>
+          <a:bodyPr wrap="square" rtlCol="0">
+            <a:spAutoFit/>
+          </a:bodyPr>
+          <a:lstStyle/>
+          <a:p>
+            <a:r>
+              <a:rPr lang="en-US" b="1" dirty="0" smtClean="0"/>
+              <a:t>r</a:t>
+            </a:r>
+            <a:endParaRPr lang="en-US" b="1" dirty="0"/>
+          </a:p>
+        </p:txBody>
+      </p:sp>
+      <p:sp>
+        <p:nvSpPr>
+          <p:cNvPr id="46" name="TextBox 45"/>
+          <p:cNvSpPr txBox="1"/>
+          <p:nvPr/>
+        </p:nvSpPr>
+        <p:spPr>
+          <a:xfrm>
+            <a:off x="4114800" y="2590800"/>
+            <a:ext cx="306494" cy="369332"/>
+          </a:xfrm>
+          <a:prstGeom prst="rect">
+            <a:avLst/>
+          </a:prstGeom>
+          <a:noFill/>
+        </p:spPr>
+        <p:txBody>
+          <a:bodyPr wrap="none" rtlCol="0">
+            <a:spAutoFit/>
+          </a:bodyPr>
+          <a:lstStyle/>
+          <a:p>
+            <a:r>
+              <a:rPr lang="en-US" b="1" dirty="0" smtClean="0"/>
+              <a:t>u</a:t>
+            </a:r>
+            <a:endParaRPr lang="en-US" b="1" dirty="0"/>
+          </a:p>
+        </p:txBody>
+      </p:sp>
+      <p:cxnSp>
+        <p:nvCxnSpPr>
+          <p:cNvPr id="47" name="Straight Connector 46"/>
+          <p:cNvCxnSpPr>
+            <a:stCxn id="5" idx="6"/>
+          </p:cNvCxnSpPr>
+          <p:nvPr/>
+        </p:nvCxnSpPr>
+        <p:spPr>
+          <a:xfrm flipV="1">
+            <a:off x="3505200" y="2895600"/>
+            <a:ext cx="4267200" cy="457200"/>
+          </a:xfrm>
+          <a:prstGeom prst="line">
+            <a:avLst/>
+          </a:prstGeom>
+          <a:ln>
+            <a:solidFill>
+              <a:schemeClr val="tx1"/>
+            </a:solidFill>
+            <a:prstDash val="dash"/>
+          </a:ln>
+        </p:spPr>
+        <p:style>
+          <a:lnRef idx="1">
+            <a:schemeClr val="accent1"/>
+          </a:lnRef>
+          <a:fillRef idx="0">
+            <a:schemeClr val="accent1"/>
+          </a:fillRef>
+          <a:effectRef idx="0">
+            <a:schemeClr val="accent1"/>
+          </a:effectRef>
+          <a:fontRef idx="minor">
+            <a:schemeClr val="tx1"/>
+          </a:fontRef>
+        </p:style>
+      </p:cxnSp>
+      <p:sp>
+        <p:nvSpPr>
+          <p:cNvPr id="50" name="TextBox 49"/>
+          <p:cNvSpPr txBox="1"/>
+          <p:nvPr/>
+        </p:nvSpPr>
+        <p:spPr>
+          <a:xfrm>
+            <a:off x="4267200" y="2971800"/>
+            <a:ext cx="356188" cy="369332"/>
+          </a:xfrm>
+          <a:prstGeom prst="rect">
+            <a:avLst/>
+          </a:prstGeom>
+          <a:noFill/>
+        </p:spPr>
+        <p:txBody>
+          <a:bodyPr wrap="none" rtlCol="0">
+            <a:spAutoFit/>
+          </a:bodyPr>
+          <a:lstStyle/>
+          <a:p>
+            <a:r>
+              <a:rPr lang="en-US" b="1" dirty="0" smtClean="0"/>
+              <a:t>w</a:t>
+            </a:r>
+            <a:endParaRPr lang="en-US" b="1" dirty="0"/>
+          </a:p>
+        </p:txBody>
+      </p:sp>
+      <p:cxnSp>
+        <p:nvCxnSpPr>
+          <p:cNvPr id="51" name="Straight Connector 50"/>
+          <p:cNvCxnSpPr>
+            <a:stCxn id="23" idx="0"/>
+            <a:endCxn id="5" idx="4"/>
+          </p:cNvCxnSpPr>
+          <p:nvPr/>
+        </p:nvCxnSpPr>
+        <p:spPr>
+          <a:xfrm rot="5400000" flipH="1" flipV="1">
+            <a:off x="2546866" y="3701534"/>
+            <a:ext cx="1154668" cy="609600"/>
+          </a:xfrm>
+          <a:prstGeom prst="line">
+            <a:avLst/>
+          </a:prstGeom>
+          <a:ln>
+            <a:solidFill>
+              <a:schemeClr val="tx1"/>
+            </a:solidFill>
+            <a:prstDash val="dash"/>
+          </a:ln>
+        </p:spPr>
+        <p:style>
+          <a:lnRef idx="1">
+            <a:schemeClr val="accent1"/>
+          </a:lnRef>
+          <a:fillRef idx="0">
+            <a:schemeClr val="accent1"/>
+          </a:fillRef>
+          <a:effectRef idx="0">
+            <a:schemeClr val="accent1"/>
+          </a:effectRef>
+          <a:fontRef idx="minor">
+            <a:schemeClr val="tx1"/>
+          </a:fontRef>
+        </p:style>
+      </p:cxnSp>
+      <p:cxnSp>
+        <p:nvCxnSpPr>
+          <p:cNvPr id="55" name="Straight Connector 54"/>
+          <p:cNvCxnSpPr>
+            <a:stCxn id="24" idx="1"/>
+            <a:endCxn id="5" idx="4"/>
+          </p:cNvCxnSpPr>
+          <p:nvPr/>
+        </p:nvCxnSpPr>
+        <p:spPr>
+          <a:xfrm rot="16200000" flipV="1">
+            <a:off x="3461266" y="3396734"/>
+            <a:ext cx="799816" cy="864348"/>
+          </a:xfrm>
+          <a:prstGeom prst="line">
+            <a:avLst/>
+          </a:prstGeom>
+          <a:ln>
+            <a:solidFill>
+              <a:schemeClr val="tx1"/>
+            </a:solidFill>
+            <a:prstDash val="dash"/>
+          </a:ln>
+        </p:spPr>
+        <p:style>
+          <a:lnRef idx="1">
+            <a:schemeClr val="accent1"/>
+          </a:lnRef>
+          <a:fillRef idx="0">
+            <a:schemeClr val="accent1"/>
+          </a:fillRef>
+          <a:effectRef idx="0">
+            <a:schemeClr val="accent1"/>
+          </a:effectRef>
+          <a:fontRef idx="minor">
+            <a:schemeClr val="tx1"/>
+          </a:fontRef>
+        </p:style>
+      </p:cxnSp>
+      <p:sp>
+        <p:nvSpPr>
+          <p:cNvPr id="61" name="TextBox 60"/>
+          <p:cNvSpPr txBox="1"/>
+          <p:nvPr/>
+        </p:nvSpPr>
+        <p:spPr>
+          <a:xfrm>
+            <a:off x="2971800" y="3657600"/>
+            <a:ext cx="304800" cy="369332"/>
+          </a:xfrm>
+          <a:prstGeom prst="rect">
+            <a:avLst/>
+          </a:prstGeom>
+          <a:noFill/>
+        </p:spPr>
+        <p:txBody>
+          <a:bodyPr wrap="square" rtlCol="0">
+            <a:spAutoFit/>
+          </a:bodyPr>
+          <a:lstStyle/>
+          <a:p>
+            <a:r>
+              <a:rPr lang="en-US" b="1" dirty="0" smtClean="0"/>
+              <a:t>s</a:t>
+            </a:r>
+            <a:endParaRPr lang="en-US" b="1" dirty="0"/>
+          </a:p>
+        </p:txBody>
+      </p:sp>
+      <p:sp>
+        <p:nvSpPr>
+          <p:cNvPr id="62" name="TextBox 61"/>
+          <p:cNvSpPr txBox="1"/>
+          <p:nvPr/>
+        </p:nvSpPr>
+        <p:spPr>
+          <a:xfrm>
+            <a:off x="3886200" y="3593068"/>
+            <a:ext cx="304800" cy="369332"/>
+          </a:xfrm>
+          <a:prstGeom prst="rect">
+            <a:avLst/>
+          </a:prstGeom>
+          <a:noFill/>
+        </p:spPr>
+        <p:txBody>
+          <a:bodyPr wrap="square" rtlCol="0">
+            <a:spAutoFit/>
+          </a:bodyPr>
+          <a:lstStyle/>
+          <a:p>
+            <a:r>
+              <a:rPr lang="en-US" b="1" dirty="0" smtClean="0"/>
+              <a:t>t</a:t>
+            </a:r>
+            <a:endParaRPr lang="en-US" b="1" dirty="0"/>
+          </a:p>
+        </p:txBody>
+      </p:sp>
+      <p:sp>
+        <p:nvSpPr>
+          <p:cNvPr id="77" name="TextBox 76"/>
+          <p:cNvSpPr txBox="1"/>
+          <p:nvPr/>
+        </p:nvSpPr>
+        <p:spPr>
+          <a:xfrm>
+            <a:off x="6821510" y="3581400"/>
+            <a:ext cx="1179490" cy="369332"/>
+          </a:xfrm>
+          <a:prstGeom prst="rect">
+            <a:avLst/>
+          </a:prstGeom>
+          <a:noFill/>
+        </p:spPr>
+        <p:txBody>
+          <a:bodyPr wrap="none" rtlCol="0">
+            <a:spAutoFit/>
+          </a:bodyPr>
+          <a:lstStyle/>
+          <a:p>
+            <a:r>
+              <a:rPr lang="en-US" dirty="0" smtClean="0"/>
+              <a:t>Objective </a:t>
+            </a:r>
+            <a:r>
+              <a:rPr lang="en-US" dirty="0" err="1" smtClean="0"/>
+              <a:t>i</a:t>
+            </a:r>
+            <a:endParaRPr lang="en-US" dirty="0"/>
           </a:p>
         </p:txBody>
       </p:sp>

</xml_diff>

<commit_message>
cambio imagen que estaba mal
</commit_message>
<xml_diff>
--- a/doc/informe/pictures.pptx
+++ b/doc/informe/pictures.pptx
@@ -12,9 +12,9 @@
     <p:sldId id="257" r:id="rId3"/>
     <p:sldId id="258" r:id="rId4"/>
     <p:sldId id="259" r:id="rId5"/>
-    <p:sldId id="260" r:id="rId6"/>
-    <p:sldId id="261" r:id="rId7"/>
-    <p:sldId id="262" r:id="rId8"/>
+    <p:sldId id="262" r:id="rId6"/>
+    <p:sldId id="260" r:id="rId7"/>
+    <p:sldId id="261" r:id="rId8"/>
   </p:sldIdLst>
   <p:sldSz cx="9144000" cy="6858000" type="screen4x3"/>
   <p:notesSz cx="6858000" cy="9144000"/>
@@ -199,7 +199,7 @@
             <a:fld id="{845A57F8-9FFB-4742-8CFD-3414C37FBF35}" type="datetimeFigureOut">
               <a:rPr lang="en-US" smtClean="0"/>
               <a:pPr/>
-              <a:t>12/7/2014</a:t>
+              <a:t>11/12/2014</a:t>
             </a:fld>
             <a:endParaRPr lang="en-US"/>
           </a:p>
@@ -779,7 +779,7 @@
             <a:fld id="{7D97FC9E-4CEA-462C-95AC-29F39B39D0EF}" type="slidenum">
               <a:rPr lang="en-US" smtClean="0"/>
               <a:pPr/>
-              <a:t>7</a:t>
+              <a:t>6</a:t>
             </a:fld>
             <a:endParaRPr lang="en-US"/>
           </a:p>
@@ -975,7 +975,7 @@
             <a:fld id="{0BF94AD7-59A1-45F9-ACA2-67E78D40517C}" type="datetimeFigureOut">
               <a:rPr lang="en-US" smtClean="0"/>
               <a:pPr/>
-              <a:t>12/7/2014</a:t>
+              <a:t>11/12/2014</a:t>
             </a:fld>
             <a:endParaRPr lang="en-US"/>
           </a:p>
@@ -1142,7 +1142,7 @@
             <a:fld id="{0BF94AD7-59A1-45F9-ACA2-67E78D40517C}" type="datetimeFigureOut">
               <a:rPr lang="en-US" smtClean="0"/>
               <a:pPr/>
-              <a:t>12/7/2014</a:t>
+              <a:t>11/12/2014</a:t>
             </a:fld>
             <a:endParaRPr lang="en-US"/>
           </a:p>
@@ -1319,7 +1319,7 @@
             <a:fld id="{0BF94AD7-59A1-45F9-ACA2-67E78D40517C}" type="datetimeFigureOut">
               <a:rPr lang="en-US" smtClean="0"/>
               <a:pPr/>
-              <a:t>12/7/2014</a:t>
+              <a:t>11/12/2014</a:t>
             </a:fld>
             <a:endParaRPr lang="en-US"/>
           </a:p>
@@ -1486,7 +1486,7 @@
             <a:fld id="{0BF94AD7-59A1-45F9-ACA2-67E78D40517C}" type="datetimeFigureOut">
               <a:rPr lang="en-US" smtClean="0"/>
               <a:pPr/>
-              <a:t>12/7/2014</a:t>
+              <a:t>11/12/2014</a:t>
             </a:fld>
             <a:endParaRPr lang="en-US"/>
           </a:p>
@@ -1729,7 +1729,7 @@
             <a:fld id="{0BF94AD7-59A1-45F9-ACA2-67E78D40517C}" type="datetimeFigureOut">
               <a:rPr lang="en-US" smtClean="0"/>
               <a:pPr/>
-              <a:t>12/7/2014</a:t>
+              <a:t>11/12/2014</a:t>
             </a:fld>
             <a:endParaRPr lang="en-US"/>
           </a:p>
@@ -2014,7 +2014,7 @@
             <a:fld id="{0BF94AD7-59A1-45F9-ACA2-67E78D40517C}" type="datetimeFigureOut">
               <a:rPr lang="en-US" smtClean="0"/>
               <a:pPr/>
-              <a:t>12/7/2014</a:t>
+              <a:t>11/12/2014</a:t>
             </a:fld>
             <a:endParaRPr lang="en-US"/>
           </a:p>
@@ -2433,7 +2433,7 @@
             <a:fld id="{0BF94AD7-59A1-45F9-ACA2-67E78D40517C}" type="datetimeFigureOut">
               <a:rPr lang="en-US" smtClean="0"/>
               <a:pPr/>
-              <a:t>12/7/2014</a:t>
+              <a:t>11/12/2014</a:t>
             </a:fld>
             <a:endParaRPr lang="en-US"/>
           </a:p>
@@ -2548,7 +2548,7 @@
             <a:fld id="{0BF94AD7-59A1-45F9-ACA2-67E78D40517C}" type="datetimeFigureOut">
               <a:rPr lang="en-US" smtClean="0"/>
               <a:pPr/>
-              <a:t>12/7/2014</a:t>
+              <a:t>11/12/2014</a:t>
             </a:fld>
             <a:endParaRPr lang="en-US"/>
           </a:p>
@@ -2640,7 +2640,7 @@
             <a:fld id="{0BF94AD7-59A1-45F9-ACA2-67E78D40517C}" type="datetimeFigureOut">
               <a:rPr lang="en-US" smtClean="0"/>
               <a:pPr/>
-              <a:t>12/7/2014</a:t>
+              <a:t>11/12/2014</a:t>
             </a:fld>
             <a:endParaRPr lang="en-US"/>
           </a:p>
@@ -2914,7 +2914,7 @@
             <a:fld id="{0BF94AD7-59A1-45F9-ACA2-67E78D40517C}" type="datetimeFigureOut">
               <a:rPr lang="en-US" smtClean="0"/>
               <a:pPr/>
-              <a:t>12/7/2014</a:t>
+              <a:t>11/12/2014</a:t>
             </a:fld>
             <a:endParaRPr lang="en-US"/>
           </a:p>
@@ -3164,7 +3164,7 @@
             <a:fld id="{0BF94AD7-59A1-45F9-ACA2-67E78D40517C}" type="datetimeFigureOut">
               <a:rPr lang="en-US" smtClean="0"/>
               <a:pPr/>
-              <a:t>12/7/2014</a:t>
+              <a:t>11/12/2014</a:t>
             </a:fld>
             <a:endParaRPr lang="en-US"/>
           </a:p>
@@ -3374,7 +3374,7 @@
             <a:fld id="{0BF94AD7-59A1-45F9-ACA2-67E78D40517C}" type="datetimeFigureOut">
               <a:rPr lang="en-US" smtClean="0"/>
               <a:pPr/>
-              <a:t>12/7/2014</a:t>
+              <a:t>11/12/2014</a:t>
             </a:fld>
             <a:endParaRPr lang="en-US"/>
           </a:p>
@@ -5139,7 +5139,7 @@
         </p:nvSpPr>
         <p:spPr>
           <a:xfrm>
-            <a:off x="4572000" y="4876800"/>
+            <a:off x="3352800" y="3276600"/>
             <a:ext cx="152400" cy="152400"/>
           </a:xfrm>
           <a:prstGeom prst="ellipse">
@@ -5178,7 +5178,7 @@
         </p:nvSpPr>
         <p:spPr>
           <a:xfrm>
-            <a:off x="2057400" y="4736068"/>
+            <a:off x="1066797" y="2297668"/>
             <a:ext cx="1219200" cy="1219200"/>
           </a:xfrm>
           <a:prstGeom prst="ellipse">
@@ -5233,7 +5233,7 @@
           <a:p>
             <a:r>
               <a:rPr lang="en-US" dirty="0" smtClean="0"/>
-              <a:t>pedestrian-top-forces.png</a:t>
+              <a:t>geometry.png</a:t>
             </a:r>
           </a:p>
         </p:txBody>
@@ -5241,15 +5241,13 @@
       <p:cxnSp>
         <p:nvCxnSpPr>
           <p:cNvPr id="13" name="Straight Connector 12"/>
-          <p:cNvCxnSpPr>
-            <a:endCxn id="5" idx="2"/>
-          </p:cNvCxnSpPr>
+          <p:cNvCxnSpPr/>
           <p:nvPr/>
         </p:nvCxnSpPr>
         <p:spPr>
-          <a:xfrm flipV="1">
-            <a:off x="3276600" y="4953000"/>
-            <a:ext cx="1298448" cy="233172"/>
+          <a:xfrm>
+            <a:off x="2286000" y="3048000"/>
+            <a:ext cx="1089115" cy="294150"/>
           </a:xfrm>
           <a:prstGeom prst="line">
             <a:avLst/>
@@ -5258,7 +5256,7 @@
             <a:solidFill>
               <a:schemeClr val="tx1"/>
             </a:solidFill>
-            <a:prstDash val="sysDash"/>
+            <a:prstDash val="solid"/>
           </a:ln>
         </p:spPr>
         <p:style>
@@ -5284,7 +5282,7 @@
         </p:nvSpPr>
         <p:spPr>
           <a:xfrm>
-            <a:off x="4724400" y="2971800"/>
+            <a:off x="2743200" y="4583668"/>
             <a:ext cx="152400" cy="152400"/>
           </a:xfrm>
           <a:prstGeom prst="ellipse">
@@ -5323,7 +5321,7 @@
         </p:nvSpPr>
         <p:spPr>
           <a:xfrm>
-            <a:off x="2971800" y="1219200"/>
+            <a:off x="4114800" y="4050268"/>
             <a:ext cx="1219200" cy="1219200"/>
           </a:xfrm>
           <a:prstGeom prst="ellipse">
@@ -5358,15 +5356,15 @@
         <p:nvCxnSpPr>
           <p:cNvPr id="25" name="Straight Connector 24"/>
           <p:cNvCxnSpPr>
-            <a:stCxn id="24" idx="5"/>
-            <a:endCxn id="23" idx="1"/>
+            <a:stCxn id="24" idx="2"/>
+            <a:endCxn id="23" idx="6"/>
           </p:cNvCxnSpPr>
           <p:nvPr/>
         </p:nvCxnSpPr>
         <p:spPr>
-          <a:xfrm rot="16200000" flipH="1">
-            <a:off x="4012452" y="2259852"/>
-            <a:ext cx="734266" cy="734266"/>
+          <a:xfrm rot="10800000">
+            <a:off x="2895600" y="4659868"/>
+            <a:ext cx="1219200" cy="1588"/>
           </a:xfrm>
           <a:prstGeom prst="line">
             <a:avLst/>
@@ -5375,7 +5373,7 @@
             <a:solidFill>
               <a:schemeClr val="tx1"/>
             </a:solidFill>
-            <a:prstDash val="sysDash"/>
+            <a:prstDash val="solid"/>
           </a:ln>
         </p:spPr>
         <p:style>
@@ -5401,7 +5399,7 @@
         </p:nvSpPr>
         <p:spPr>
           <a:xfrm>
-            <a:off x="3124200" y="5726668"/>
+            <a:off x="1563624" y="2743200"/>
             <a:ext cx="237566" cy="369332"/>
           </a:xfrm>
           <a:prstGeom prst="rect">
@@ -5431,8 +5429,8 @@
         </p:nvCxnSpPr>
         <p:spPr>
           <a:xfrm rot="16200000" flipH="1">
-            <a:off x="4446136" y="1160011"/>
-            <a:ext cx="3233055" cy="2828922"/>
+            <a:off x="7048501" y="3009899"/>
+            <a:ext cx="1447800" cy="2"/>
           </a:xfrm>
           <a:prstGeom prst="line">
             <a:avLst/>
@@ -5463,14 +5461,14 @@
         <p:nvCxnSpPr>
           <p:cNvPr id="79" name="Straight Connector 78"/>
           <p:cNvCxnSpPr>
-            <a:stCxn id="6" idx="7"/>
+            <a:stCxn id="6" idx="6"/>
           </p:cNvCxnSpPr>
           <p:nvPr/>
         </p:nvCxnSpPr>
         <p:spPr>
-          <a:xfrm rot="5400000" flipH="1" flipV="1">
-            <a:off x="3244619" y="2291833"/>
-            <a:ext cx="2476216" cy="2769350"/>
+          <a:xfrm>
+            <a:off x="2285997" y="2907268"/>
+            <a:ext cx="5486400" cy="1588"/>
           </a:xfrm>
           <a:prstGeom prst="line">
             <a:avLst/>
@@ -5505,8 +5503,8 @@
         </p:nvSpPr>
         <p:spPr>
           <a:xfrm>
-            <a:off x="5715000" y="1828800"/>
-            <a:ext cx="1179490" cy="369332"/>
+            <a:off x="7542106" y="2602468"/>
+            <a:ext cx="306494" cy="369332"/>
           </a:xfrm>
           <a:prstGeom prst="rect">
             <a:avLst/>
@@ -5520,39 +5518,257 @@
           <a:lstStyle/>
           <a:p>
             <a:r>
-              <a:rPr lang="es-AR" dirty="0" err="1" smtClean="0"/>
-              <a:t>Objective</a:t>
-            </a:r>
-            <a:r>
               <a:rPr lang="es-AR" dirty="0" smtClean="0"/>
-              <a:t> i</a:t>
+              <a:t>o</a:t>
             </a:r>
             <a:endParaRPr lang="en-US" dirty="0"/>
+          </a:p>
+        </p:txBody>
+      </p:sp>
+      <p:sp>
+        <p:nvSpPr>
+          <p:cNvPr id="90" name="TextBox 89"/>
+          <p:cNvSpPr txBox="1"/>
+          <p:nvPr/>
+        </p:nvSpPr>
+        <p:spPr>
+          <a:xfrm>
+            <a:off x="4617720" y="4480560"/>
+            <a:ext cx="239168" cy="369332"/>
+          </a:xfrm>
+          <a:prstGeom prst="rect">
+            <a:avLst/>
+          </a:prstGeom>
+          <a:noFill/>
+        </p:spPr>
+        <p:txBody>
+          <a:bodyPr wrap="none" rtlCol="0">
+            <a:spAutoFit/>
+          </a:bodyPr>
+          <a:lstStyle/>
+          <a:p>
+            <a:r>
+              <a:rPr lang="es-AR" dirty="0" smtClean="0"/>
+              <a:t>j</a:t>
+            </a:r>
+            <a:endParaRPr lang="en-US" dirty="0"/>
+          </a:p>
+        </p:txBody>
+      </p:sp>
+      <p:sp>
+        <p:nvSpPr>
+          <p:cNvPr id="91" name="TextBox 90"/>
+          <p:cNvSpPr txBox="1"/>
+          <p:nvPr/>
+        </p:nvSpPr>
+        <p:spPr>
+          <a:xfrm>
+            <a:off x="2819400" y="4659868"/>
+            <a:ext cx="290464" cy="369332"/>
+          </a:xfrm>
+          <a:prstGeom prst="rect">
+            <a:avLst/>
+          </a:prstGeom>
+          <a:noFill/>
+        </p:spPr>
+        <p:txBody>
+          <a:bodyPr wrap="none" rtlCol="0">
+            <a:spAutoFit/>
+          </a:bodyPr>
+          <a:lstStyle/>
+          <a:p>
+            <a:r>
+              <a:rPr lang="en-US" dirty="0" smtClean="0"/>
+              <a:t>j'</a:t>
+            </a:r>
+            <a:endParaRPr lang="en-US" dirty="0"/>
+          </a:p>
+        </p:txBody>
+      </p:sp>
+      <p:sp>
+        <p:nvSpPr>
+          <p:cNvPr id="92" name="TextBox 91"/>
+          <p:cNvSpPr txBox="1"/>
+          <p:nvPr/>
+        </p:nvSpPr>
+        <p:spPr>
+          <a:xfrm>
+            <a:off x="3444938" y="3212068"/>
+            <a:ext cx="288862" cy="369332"/>
+          </a:xfrm>
+          <a:prstGeom prst="rect">
+            <a:avLst/>
+          </a:prstGeom>
+          <a:noFill/>
+        </p:spPr>
+        <p:txBody>
+          <a:bodyPr wrap="none" rtlCol="0">
+            <a:spAutoFit/>
+          </a:bodyPr>
+          <a:lstStyle/>
+          <a:p>
+            <a:r>
+              <a:rPr lang="es-AR" dirty="0" smtClean="0"/>
+              <a:t>i</a:t>
+            </a:r>
+            <a:r>
+              <a:rPr lang="en-US" dirty="0" smtClean="0"/>
+              <a:t>'</a:t>
+            </a:r>
+            <a:endParaRPr lang="en-US" dirty="0"/>
+          </a:p>
+        </p:txBody>
+      </p:sp>
+      <p:sp>
+        <p:nvSpPr>
+          <p:cNvPr id="45" name="TextBox 44"/>
+          <p:cNvSpPr txBox="1"/>
+          <p:nvPr/>
+        </p:nvSpPr>
+        <p:spPr>
+          <a:xfrm>
+            <a:off x="2895600" y="2971800"/>
+            <a:ext cx="304800" cy="369332"/>
+          </a:xfrm>
+          <a:prstGeom prst="rect">
+            <a:avLst/>
+          </a:prstGeom>
+          <a:noFill/>
+        </p:spPr>
+        <p:txBody>
+          <a:bodyPr wrap="square" rtlCol="0">
+            <a:spAutoFit/>
+          </a:bodyPr>
+          <a:lstStyle/>
+          <a:p>
+            <a:r>
+              <a:rPr lang="en-US" b="1" dirty="0" smtClean="0"/>
+              <a:t>r</a:t>
+            </a:r>
+            <a:endParaRPr lang="en-US" b="1" dirty="0"/>
+          </a:p>
+        </p:txBody>
+      </p:sp>
+      <p:sp>
+        <p:nvSpPr>
+          <p:cNvPr id="46" name="TextBox 45"/>
+          <p:cNvSpPr txBox="1"/>
+          <p:nvPr/>
+        </p:nvSpPr>
+        <p:spPr>
+          <a:xfrm>
+            <a:off x="4114800" y="2590800"/>
+            <a:ext cx="306494" cy="369332"/>
+          </a:xfrm>
+          <a:prstGeom prst="rect">
+            <a:avLst/>
+          </a:prstGeom>
+          <a:noFill/>
+        </p:spPr>
+        <p:txBody>
+          <a:bodyPr wrap="none" rtlCol="0">
+            <a:spAutoFit/>
+          </a:bodyPr>
+          <a:lstStyle/>
+          <a:p>
+            <a:r>
+              <a:rPr lang="en-US" b="1" dirty="0" smtClean="0"/>
+              <a:t>u</a:t>
+            </a:r>
+            <a:endParaRPr lang="en-US" b="1" dirty="0"/>
           </a:p>
         </p:txBody>
       </p:sp>
       <p:cxnSp>
         <p:nvCxnSpPr>
-          <p:cNvPr id="87" name="Straight Connector 86"/>
+          <p:cNvPr id="47" name="Straight Connector 46"/>
           <p:cNvCxnSpPr>
-            <a:stCxn id="23" idx="4"/>
-            <a:endCxn id="5" idx="0"/>
+            <a:stCxn id="5" idx="6"/>
           </p:cNvCxnSpPr>
           <p:nvPr/>
         </p:nvCxnSpPr>
         <p:spPr>
-          <a:xfrm rot="5400000">
-            <a:off x="3848100" y="3924300"/>
-            <a:ext cx="1752600" cy="152400"/>
+          <a:xfrm flipV="1">
+            <a:off x="3505200" y="2895600"/>
+            <a:ext cx="4267200" cy="457200"/>
           </a:xfrm>
           <a:prstGeom prst="line">
             <a:avLst/>
           </a:prstGeom>
           <a:ln>
             <a:solidFill>
-              <a:srgbClr val="FF0000"/>
+              <a:schemeClr val="tx1"/>
             </a:solidFill>
-            <a:prstDash val="sysDash"/>
+            <a:prstDash val="dash"/>
+          </a:ln>
+        </p:spPr>
+        <p:style>
+          <a:lnRef idx="1">
+            <a:schemeClr val="accent1"/>
+          </a:lnRef>
+          <a:fillRef idx="0">
+            <a:schemeClr val="accent1"/>
+          </a:fillRef>
+          <a:effectRef idx="0">
+            <a:schemeClr val="accent1"/>
+          </a:effectRef>
+          <a:fontRef idx="minor">
+            <a:schemeClr val="tx1"/>
+          </a:fontRef>
+        </p:style>
+      </p:cxnSp>
+      <p:sp>
+        <p:nvSpPr>
+          <p:cNvPr id="50" name="TextBox 49"/>
+          <p:cNvSpPr txBox="1"/>
+          <p:nvPr/>
+        </p:nvSpPr>
+        <p:spPr>
+          <a:xfrm>
+            <a:off x="4267200" y="2971800"/>
+            <a:ext cx="356188" cy="369332"/>
+          </a:xfrm>
+          <a:prstGeom prst="rect">
+            <a:avLst/>
+          </a:prstGeom>
+          <a:noFill/>
+        </p:spPr>
+        <p:txBody>
+          <a:bodyPr wrap="none" rtlCol="0">
+            <a:spAutoFit/>
+          </a:bodyPr>
+          <a:lstStyle/>
+          <a:p>
+            <a:r>
+              <a:rPr lang="en-US" b="1" dirty="0" smtClean="0"/>
+              <a:t>w</a:t>
+            </a:r>
+            <a:endParaRPr lang="en-US" b="1" dirty="0"/>
+          </a:p>
+        </p:txBody>
+      </p:sp>
+      <p:cxnSp>
+        <p:nvCxnSpPr>
+          <p:cNvPr id="51" name="Straight Connector 50"/>
+          <p:cNvCxnSpPr>
+            <a:stCxn id="23" idx="0"/>
+            <a:endCxn id="5" idx="4"/>
+          </p:cNvCxnSpPr>
+          <p:nvPr/>
+        </p:nvCxnSpPr>
+        <p:spPr>
+          <a:xfrm rot="5400000" flipH="1" flipV="1">
+            <a:off x="2546866" y="3701534"/>
+            <a:ext cx="1154668" cy="609600"/>
+          </a:xfrm>
+          <a:prstGeom prst="line">
+            <a:avLst/>
+          </a:prstGeom>
+          <a:ln>
+            <a:solidFill>
+              <a:schemeClr val="tx1"/>
+            </a:solidFill>
+            <a:prstDash val="dash"/>
           </a:ln>
         </p:spPr>
         <p:style>
@@ -5572,25 +5788,26 @@
       </p:cxnSp>
       <p:cxnSp>
         <p:nvCxnSpPr>
-          <p:cNvPr id="89" name="Straight Arrow Connector 88"/>
+          <p:cNvPr id="55" name="Straight Connector 54"/>
           <p:cNvCxnSpPr>
-            <a:stCxn id="5" idx="4"/>
+            <a:stCxn id="24" idx="1"/>
+            <a:endCxn id="5" idx="4"/>
           </p:cNvCxnSpPr>
           <p:nvPr/>
         </p:nvCxnSpPr>
         <p:spPr>
-          <a:xfrm rot="5400000">
-            <a:off x="4152900" y="5448300"/>
-            <a:ext cx="914400" cy="76200"/>
-          </a:xfrm>
-          <a:prstGeom prst="straightConnector1">
-            <a:avLst/>
-          </a:prstGeom>
-          <a:ln w="19050">
+          <a:xfrm rot="16200000" flipV="1">
+            <a:off x="3461266" y="3396734"/>
+            <a:ext cx="799816" cy="864348"/>
+          </a:xfrm>
+          <a:prstGeom prst="line">
+            <a:avLst/>
+          </a:prstGeom>
+          <a:ln>
             <a:solidFill>
-              <a:srgbClr val="FF0000"/>
+              <a:schemeClr val="tx1"/>
             </a:solidFill>
-            <a:tailEnd type="arrow"/>
+            <a:prstDash val="dash"/>
           </a:ln>
         </p:spPr>
         <p:style>
@@ -5610,14 +5827,74 @@
       </p:cxnSp>
       <p:sp>
         <p:nvSpPr>
-          <p:cNvPr id="90" name="TextBox 89"/>
+          <p:cNvPr id="61" name="TextBox 60"/>
           <p:cNvSpPr txBox="1"/>
           <p:nvPr/>
         </p:nvSpPr>
         <p:spPr>
           <a:xfrm>
-            <a:off x="3657600" y="2362200"/>
-            <a:ext cx="239168" cy="369332"/>
+            <a:off x="2971800" y="3657600"/>
+            <a:ext cx="304800" cy="369332"/>
+          </a:xfrm>
+          <a:prstGeom prst="rect">
+            <a:avLst/>
+          </a:prstGeom>
+          <a:noFill/>
+        </p:spPr>
+        <p:txBody>
+          <a:bodyPr wrap="square" rtlCol="0">
+            <a:spAutoFit/>
+          </a:bodyPr>
+          <a:lstStyle/>
+          <a:p>
+            <a:r>
+              <a:rPr lang="en-US" b="1" dirty="0" smtClean="0"/>
+              <a:t>s</a:t>
+            </a:r>
+            <a:endParaRPr lang="en-US" b="1" dirty="0"/>
+          </a:p>
+        </p:txBody>
+      </p:sp>
+      <p:sp>
+        <p:nvSpPr>
+          <p:cNvPr id="62" name="TextBox 61"/>
+          <p:cNvSpPr txBox="1"/>
+          <p:nvPr/>
+        </p:nvSpPr>
+        <p:spPr>
+          <a:xfrm>
+            <a:off x="3886200" y="3593068"/>
+            <a:ext cx="304800" cy="369332"/>
+          </a:xfrm>
+          <a:prstGeom prst="rect">
+            <a:avLst/>
+          </a:prstGeom>
+          <a:noFill/>
+        </p:spPr>
+        <p:txBody>
+          <a:bodyPr wrap="square" rtlCol="0">
+            <a:spAutoFit/>
+          </a:bodyPr>
+          <a:lstStyle/>
+          <a:p>
+            <a:r>
+              <a:rPr lang="en-US" b="1" dirty="0" smtClean="0"/>
+              <a:t>t</a:t>
+            </a:r>
+            <a:endParaRPr lang="en-US" b="1" dirty="0"/>
+          </a:p>
+        </p:txBody>
+      </p:sp>
+      <p:sp>
+        <p:nvSpPr>
+          <p:cNvPr id="77" name="TextBox 76"/>
+          <p:cNvSpPr txBox="1"/>
+          <p:nvPr/>
+        </p:nvSpPr>
+        <p:spPr>
+          <a:xfrm>
+            <a:off x="6821510" y="3581400"/>
+            <a:ext cx="1179490" cy="369332"/>
           </a:xfrm>
           <a:prstGeom prst="rect">
             <a:avLst/>
@@ -5631,254 +5908,12 @@
           <a:lstStyle/>
           <a:p>
             <a:r>
-              <a:rPr lang="es-AR" dirty="0" smtClean="0"/>
-              <a:t>j</a:t>
-            </a:r>
-            <a:endParaRPr lang="en-US" dirty="0"/>
-          </a:p>
-        </p:txBody>
-      </p:sp>
-      <p:sp>
-        <p:nvSpPr>
-          <p:cNvPr id="91" name="TextBox 90"/>
-          <p:cNvSpPr txBox="1"/>
-          <p:nvPr/>
-        </p:nvSpPr>
-        <p:spPr>
-          <a:xfrm>
-            <a:off x="4419600" y="3048000"/>
-            <a:ext cx="290464" cy="369332"/>
-          </a:xfrm>
-          <a:prstGeom prst="rect">
-            <a:avLst/>
-          </a:prstGeom>
-          <a:noFill/>
-        </p:spPr>
-        <p:txBody>
-          <a:bodyPr wrap="none" rtlCol="0">
-            <a:spAutoFit/>
-          </a:bodyPr>
-          <a:lstStyle/>
-          <a:p>
-            <a:r>
               <a:rPr lang="en-US" dirty="0" smtClean="0"/>
-              <a:t>j'</a:t>
-            </a:r>
-            <a:endParaRPr lang="en-US" dirty="0"/>
-          </a:p>
-        </p:txBody>
-      </p:sp>
-      <p:sp>
-        <p:nvSpPr>
-          <p:cNvPr id="92" name="TextBox 91"/>
-          <p:cNvSpPr txBox="1"/>
-          <p:nvPr/>
-        </p:nvSpPr>
-        <p:spPr>
-          <a:xfrm>
-            <a:off x="4648200" y="4953000"/>
-            <a:ext cx="288862" cy="369332"/>
-          </a:xfrm>
-          <a:prstGeom prst="rect">
-            <a:avLst/>
-          </a:prstGeom>
-          <a:noFill/>
-        </p:spPr>
-        <p:txBody>
-          <a:bodyPr wrap="none" rtlCol="0">
-            <a:spAutoFit/>
-          </a:bodyPr>
-          <a:lstStyle/>
-          <a:p>
-            <a:r>
-              <a:rPr lang="es-AR" dirty="0" smtClean="0"/>
-              <a:t>i</a:t>
-            </a:r>
-            <a:r>
-              <a:rPr lang="en-US" dirty="0" smtClean="0"/>
-              <a:t>'</a:t>
-            </a:r>
-            <a:endParaRPr lang="en-US" dirty="0"/>
-          </a:p>
-        </p:txBody>
-      </p:sp>
-      <p:sp>
-        <p:nvSpPr>
-          <p:cNvPr id="93" name="TextBox 92"/>
-          <p:cNvSpPr txBox="1"/>
-          <p:nvPr/>
-        </p:nvSpPr>
-        <p:spPr>
-          <a:xfrm>
-            <a:off x="4505671" y="5879068"/>
-            <a:ext cx="752129" cy="369332"/>
-          </a:xfrm>
-          <a:prstGeom prst="rect">
-            <a:avLst/>
-          </a:prstGeom>
-          <a:noFill/>
-        </p:spPr>
-        <p:txBody>
-          <a:bodyPr wrap="none" rtlCol="0">
-            <a:spAutoFit/>
-          </a:bodyPr>
-          <a:lstStyle/>
-          <a:p>
-            <a:r>
-              <a:rPr lang="es-AR" dirty="0" smtClean="0"/>
-              <a:t>F(i</a:t>
-            </a:r>
-            <a:r>
-              <a:rPr lang="en-US" dirty="0" smtClean="0"/>
-              <a:t>', j')</a:t>
-            </a:r>
-          </a:p>
-        </p:txBody>
-      </p:sp>
-      <p:cxnSp>
-        <p:nvCxnSpPr>
-          <p:cNvPr id="100" name="Straight Arrow Connector 99"/>
-          <p:cNvCxnSpPr>
-            <a:stCxn id="5" idx="1"/>
-          </p:cNvCxnSpPr>
-          <p:nvPr/>
-        </p:nvCxnSpPr>
-        <p:spPr>
-          <a:xfrm rot="16200000" flipV="1">
-            <a:off x="4191000" y="4495800"/>
-            <a:ext cx="403318" cy="403318"/>
-          </a:xfrm>
-          <a:prstGeom prst="straightConnector1">
-            <a:avLst/>
-          </a:prstGeom>
-          <a:ln w="19050">
-            <a:solidFill>
-              <a:srgbClr val="00B050"/>
-            </a:solidFill>
-            <a:tailEnd type="arrow"/>
-          </a:ln>
-        </p:spPr>
-        <p:style>
-          <a:lnRef idx="1">
-            <a:schemeClr val="accent1"/>
-          </a:lnRef>
-          <a:fillRef idx="0">
-            <a:schemeClr val="accent1"/>
-          </a:fillRef>
-          <a:effectRef idx="0">
-            <a:schemeClr val="accent1"/>
-          </a:effectRef>
-          <a:fontRef idx="minor">
-            <a:schemeClr val="tx1"/>
-          </a:fontRef>
-        </p:style>
-      </p:cxnSp>
-      <p:sp>
-        <p:nvSpPr>
-          <p:cNvPr id="102" name="TextBox 101"/>
-          <p:cNvSpPr txBox="1"/>
-          <p:nvPr/>
-        </p:nvSpPr>
-        <p:spPr>
-          <a:xfrm>
-            <a:off x="3810000" y="4202668"/>
-            <a:ext cx="699230" cy="369332"/>
-          </a:xfrm>
-          <a:prstGeom prst="rect">
-            <a:avLst/>
-          </a:prstGeom>
-          <a:noFill/>
-        </p:spPr>
-        <p:txBody>
-          <a:bodyPr wrap="none" rtlCol="0">
-            <a:spAutoFit/>
-          </a:bodyPr>
-          <a:lstStyle/>
-          <a:p>
-            <a:r>
-              <a:rPr lang="es-AR" dirty="0" smtClean="0"/>
-              <a:t>F(i</a:t>
-            </a:r>
-            <a:r>
-              <a:rPr lang="en-US" dirty="0" smtClean="0"/>
-              <a:t>, </a:t>
+              <a:t>Objective </a:t>
             </a:r>
             <a:r>
               <a:rPr lang="en-US" dirty="0" err="1" smtClean="0"/>
               <a:t>i</a:t>
-            </a:r>
-            <a:r>
-              <a:rPr lang="en-US" dirty="0" smtClean="0"/>
-              <a:t>')</a:t>
-            </a:r>
-          </a:p>
-        </p:txBody>
-      </p:sp>
-      <p:cxnSp>
-        <p:nvCxnSpPr>
-          <p:cNvPr id="104" name="Straight Arrow Connector 103"/>
-          <p:cNvCxnSpPr/>
-          <p:nvPr/>
-        </p:nvCxnSpPr>
-        <p:spPr>
-          <a:xfrm rot="-120000" flipV="1">
-            <a:off x="3276600" y="5105400"/>
-            <a:ext cx="533400" cy="76200"/>
-          </a:xfrm>
-          <a:prstGeom prst="straightConnector1">
-            <a:avLst/>
-          </a:prstGeom>
-          <a:ln w="19050">
-            <a:solidFill>
-              <a:schemeClr val="accent6"/>
-            </a:solidFill>
-            <a:tailEnd type="arrow"/>
-          </a:ln>
-        </p:spPr>
-        <p:style>
-          <a:lnRef idx="1">
-            <a:schemeClr val="accent1"/>
-          </a:lnRef>
-          <a:fillRef idx="0">
-            <a:schemeClr val="accent1"/>
-          </a:fillRef>
-          <a:effectRef idx="0">
-            <a:schemeClr val="accent1"/>
-          </a:effectRef>
-          <a:fontRef idx="minor">
-            <a:schemeClr val="tx1"/>
-          </a:fontRef>
-        </p:style>
-      </p:cxnSp>
-      <p:sp>
-        <p:nvSpPr>
-          <p:cNvPr id="109" name="TextBox 108"/>
-          <p:cNvSpPr txBox="1"/>
-          <p:nvPr/>
-        </p:nvSpPr>
-        <p:spPr>
-          <a:xfrm>
-            <a:off x="3352800" y="5105400"/>
-            <a:ext cx="915828" cy="369332"/>
-          </a:xfrm>
-          <a:prstGeom prst="rect">
-            <a:avLst/>
-          </a:prstGeom>
-          <a:noFill/>
-        </p:spPr>
-        <p:txBody>
-          <a:bodyPr wrap="none" rtlCol="0">
-            <a:spAutoFit/>
-          </a:bodyPr>
-          <a:lstStyle/>
-          <a:p>
-            <a:r>
-              <a:rPr lang="es-AR" dirty="0" smtClean="0"/>
-              <a:t>F </a:t>
-            </a:r>
-            <a:r>
-              <a:rPr lang="es-AR" dirty="0" err="1" smtClean="0"/>
-              <a:t>desire</a:t>
             </a:r>
             <a:endParaRPr lang="en-US" dirty="0"/>
           </a:p>
@@ -5911,7 +5946,7 @@
       </p:grpSpPr>
       <p:sp>
         <p:nvSpPr>
-          <p:cNvPr id="14" name="Oval 13"/>
+          <p:cNvPr id="5" name="Oval 4"/>
           <p:cNvSpPr/>
           <p:nvPr/>
         </p:nvSpPr>
@@ -5950,7 +5985,7 @@
       </p:sp>
       <p:sp>
         <p:nvSpPr>
-          <p:cNvPr id="15" name="Oval 14"/>
+          <p:cNvPr id="6" name="Oval 5"/>
           <p:cNvSpPr/>
           <p:nvPr/>
         </p:nvSpPr>
@@ -5987,11 +6022,40 @@
           </a:p>
         </p:txBody>
       </p:sp>
+      <p:sp>
+        <p:nvSpPr>
+          <p:cNvPr id="11" name="TextBox 10"/>
+          <p:cNvSpPr txBox="1"/>
+          <p:nvPr/>
+        </p:nvSpPr>
+        <p:spPr>
+          <a:xfrm>
+            <a:off x="0" y="11668"/>
+            <a:ext cx="3048000" cy="369332"/>
+          </a:xfrm>
+          <a:prstGeom prst="rect">
+            <a:avLst/>
+          </a:prstGeom>
+          <a:noFill/>
+        </p:spPr>
+        <p:txBody>
+          <a:bodyPr wrap="square" rtlCol="0">
+            <a:spAutoFit/>
+          </a:bodyPr>
+          <a:lstStyle/>
+          <a:p>
+            <a:r>
+              <a:rPr lang="en-US" dirty="0" smtClean="0"/>
+              <a:t>pedestrian-top-forces.png</a:t>
+            </a:r>
+          </a:p>
+        </p:txBody>
+      </p:sp>
       <p:cxnSp>
         <p:nvCxnSpPr>
-          <p:cNvPr id="16" name="Straight Connector 15"/>
+          <p:cNvPr id="13" name="Straight Connector 12"/>
           <p:cNvCxnSpPr>
-            <a:endCxn id="14" idx="2"/>
+            <a:endCxn id="5" idx="2"/>
           </p:cNvCxnSpPr>
           <p:nvPr/>
         </p:nvCxnSpPr>
@@ -6027,7 +6091,124 @@
       </p:cxnSp>
       <p:sp>
         <p:nvSpPr>
-          <p:cNvPr id="20" name="TextBox 19"/>
+          <p:cNvPr id="23" name="Oval 22"/>
+          <p:cNvSpPr/>
+          <p:nvPr/>
+        </p:nvSpPr>
+        <p:spPr>
+          <a:xfrm>
+            <a:off x="4724400" y="2971800"/>
+            <a:ext cx="152400" cy="152400"/>
+          </a:xfrm>
+          <a:prstGeom prst="ellipse">
+            <a:avLst/>
+          </a:prstGeom>
+          <a:noFill/>
+        </p:spPr>
+        <p:style>
+          <a:lnRef idx="2">
+            <a:schemeClr val="accent1"/>
+          </a:lnRef>
+          <a:fillRef idx="1">
+            <a:schemeClr val="lt1"/>
+          </a:fillRef>
+          <a:effectRef idx="0">
+            <a:schemeClr val="accent1"/>
+          </a:effectRef>
+          <a:fontRef idx="minor">
+            <a:schemeClr val="dk1"/>
+          </a:fontRef>
+        </p:style>
+        <p:txBody>
+          <a:bodyPr rtlCol="0" anchor="ctr"/>
+          <a:lstStyle/>
+          <a:p>
+            <a:pPr algn="ctr"/>
+            <a:endParaRPr lang="en-US"/>
+          </a:p>
+        </p:txBody>
+      </p:sp>
+      <p:sp>
+        <p:nvSpPr>
+          <p:cNvPr id="24" name="Oval 23"/>
+          <p:cNvSpPr/>
+          <p:nvPr/>
+        </p:nvSpPr>
+        <p:spPr>
+          <a:xfrm>
+            <a:off x="2971800" y="1219200"/>
+            <a:ext cx="1219200" cy="1219200"/>
+          </a:xfrm>
+          <a:prstGeom prst="ellipse">
+            <a:avLst/>
+          </a:prstGeom>
+          <a:noFill/>
+        </p:spPr>
+        <p:style>
+          <a:lnRef idx="2">
+            <a:schemeClr val="accent1"/>
+          </a:lnRef>
+          <a:fillRef idx="1">
+            <a:schemeClr val="lt1"/>
+          </a:fillRef>
+          <a:effectRef idx="0">
+            <a:schemeClr val="accent1"/>
+          </a:effectRef>
+          <a:fontRef idx="minor">
+            <a:schemeClr val="dk1"/>
+          </a:fontRef>
+        </p:style>
+        <p:txBody>
+          <a:bodyPr rtlCol="0" anchor="ctr"/>
+          <a:lstStyle/>
+          <a:p>
+            <a:pPr algn="ctr"/>
+            <a:endParaRPr lang="en-US"/>
+          </a:p>
+        </p:txBody>
+      </p:sp>
+      <p:cxnSp>
+        <p:nvCxnSpPr>
+          <p:cNvPr id="25" name="Straight Connector 24"/>
+          <p:cNvCxnSpPr>
+            <a:stCxn id="24" idx="5"/>
+            <a:endCxn id="23" idx="1"/>
+          </p:cNvCxnSpPr>
+          <p:nvPr/>
+        </p:nvCxnSpPr>
+        <p:spPr>
+          <a:xfrm rot="16200000" flipH="1">
+            <a:off x="4012452" y="2259852"/>
+            <a:ext cx="734266" cy="734266"/>
+          </a:xfrm>
+          <a:prstGeom prst="line">
+            <a:avLst/>
+          </a:prstGeom>
+          <a:ln>
+            <a:solidFill>
+              <a:schemeClr val="tx1"/>
+            </a:solidFill>
+            <a:prstDash val="sysDash"/>
+          </a:ln>
+        </p:spPr>
+        <p:style>
+          <a:lnRef idx="1">
+            <a:schemeClr val="accent1"/>
+          </a:lnRef>
+          <a:fillRef idx="0">
+            <a:schemeClr val="accent1"/>
+          </a:fillRef>
+          <a:effectRef idx="0">
+            <a:schemeClr val="accent1"/>
+          </a:effectRef>
+          <a:fontRef idx="minor">
+            <a:schemeClr val="tx1"/>
+          </a:fontRef>
+        </p:style>
+      </p:cxnSp>
+      <p:sp>
+        <p:nvSpPr>
+          <p:cNvPr id="57" name="TextBox 56"/>
           <p:cNvSpPr txBox="1"/>
           <p:nvPr/>
         </p:nvSpPr>
@@ -6057,13 +6238,13 @@
       </p:sp>
       <p:cxnSp>
         <p:nvCxnSpPr>
-          <p:cNvPr id="21" name="Straight Connector 20"/>
+          <p:cNvPr id="66" name="Straight Connector 65"/>
           <p:cNvCxnSpPr/>
           <p:nvPr/>
         </p:nvCxnSpPr>
         <p:spPr>
           <a:xfrm rot="16200000" flipH="1">
-            <a:off x="4065134" y="1649868"/>
+            <a:off x="4446136" y="1160011"/>
             <a:ext cx="3233055" cy="2828922"/>
           </a:xfrm>
           <a:prstGeom prst="line">
@@ -6093,16 +6274,16 @@
       </p:cxnSp>
       <p:cxnSp>
         <p:nvCxnSpPr>
-          <p:cNvPr id="22" name="Straight Connector 21"/>
+          <p:cNvPr id="79" name="Straight Connector 78"/>
           <p:cNvCxnSpPr>
-            <a:stCxn id="15" idx="7"/>
+            <a:stCxn id="6" idx="7"/>
           </p:cNvCxnSpPr>
           <p:nvPr/>
         </p:nvCxnSpPr>
         <p:spPr>
           <a:xfrm rot="5400000" flipH="1" flipV="1">
-            <a:off x="3222069" y="2695383"/>
-            <a:ext cx="2095216" cy="2343250"/>
+            <a:off x="3244619" y="2291833"/>
+            <a:ext cx="2476216" cy="2769350"/>
           </a:xfrm>
           <a:prstGeom prst="line">
             <a:avLst/>
@@ -6131,13 +6312,13 @@
       </p:cxnSp>
       <p:sp>
         <p:nvSpPr>
-          <p:cNvPr id="23" name="TextBox 22"/>
+          <p:cNvPr id="82" name="TextBox 81"/>
           <p:cNvSpPr txBox="1"/>
           <p:nvPr/>
         </p:nvSpPr>
         <p:spPr>
           <a:xfrm>
-            <a:off x="5486400" y="2590800"/>
+            <a:off x="5715000" y="1828800"/>
             <a:ext cx="1179490" cy="369332"/>
           </a:xfrm>
           <a:prstGeom prst="rect">
@@ -6163,16 +6344,93 @@
           </a:p>
         </p:txBody>
       </p:sp>
-      <p:sp>
-        <p:nvSpPr>
-          <p:cNvPr id="28" name="TextBox 27"/>
+      <p:cxnSp>
+        <p:nvCxnSpPr>
+          <p:cNvPr id="87" name="Straight Connector 86"/>
+          <p:cNvCxnSpPr>
+            <a:stCxn id="23" idx="4"/>
+            <a:endCxn id="5" idx="0"/>
+          </p:cNvCxnSpPr>
+          <p:nvPr/>
+        </p:nvCxnSpPr>
+        <p:spPr>
+          <a:xfrm rot="5400000">
+            <a:off x="3848100" y="3924300"/>
+            <a:ext cx="1752600" cy="152400"/>
+          </a:xfrm>
+          <a:prstGeom prst="line">
+            <a:avLst/>
+          </a:prstGeom>
+          <a:ln>
+            <a:solidFill>
+              <a:srgbClr val="FF0000"/>
+            </a:solidFill>
+            <a:prstDash val="sysDash"/>
+          </a:ln>
+        </p:spPr>
+        <p:style>
+          <a:lnRef idx="1">
+            <a:schemeClr val="accent1"/>
+          </a:lnRef>
+          <a:fillRef idx="0">
+            <a:schemeClr val="accent1"/>
+          </a:fillRef>
+          <a:effectRef idx="0">
+            <a:schemeClr val="accent1"/>
+          </a:effectRef>
+          <a:fontRef idx="minor">
+            <a:schemeClr val="tx1"/>
+          </a:fontRef>
+        </p:style>
+      </p:cxnSp>
+      <p:cxnSp>
+        <p:nvCxnSpPr>
+          <p:cNvPr id="89" name="Straight Arrow Connector 88"/>
+          <p:cNvCxnSpPr>
+            <a:stCxn id="5" idx="4"/>
+          </p:cNvCxnSpPr>
+          <p:nvPr/>
+        </p:nvCxnSpPr>
+        <p:spPr>
+          <a:xfrm rot="5400000">
+            <a:off x="4152900" y="5448300"/>
+            <a:ext cx="914400" cy="76200"/>
+          </a:xfrm>
+          <a:prstGeom prst="straightConnector1">
+            <a:avLst/>
+          </a:prstGeom>
+          <a:ln w="19050">
+            <a:solidFill>
+              <a:srgbClr val="FF0000"/>
+            </a:solidFill>
+            <a:tailEnd type="arrow"/>
+          </a:ln>
+        </p:spPr>
+        <p:style>
+          <a:lnRef idx="1">
+            <a:schemeClr val="accent1"/>
+          </a:lnRef>
+          <a:fillRef idx="0">
+            <a:schemeClr val="accent1"/>
+          </a:fillRef>
+          <a:effectRef idx="0">
+            <a:schemeClr val="accent1"/>
+          </a:effectRef>
+          <a:fontRef idx="minor">
+            <a:schemeClr val="tx1"/>
+          </a:fontRef>
+        </p:style>
+      </p:cxnSp>
+      <p:sp>
+        <p:nvSpPr>
+          <p:cNvPr id="90" name="TextBox 89"/>
           <p:cNvSpPr txBox="1"/>
           <p:nvPr/>
         </p:nvSpPr>
         <p:spPr>
           <a:xfrm>
-            <a:off x="4648200" y="4953000"/>
-            <a:ext cx="288862" cy="369332"/>
+            <a:off x="3657600" y="2362200"/>
+            <a:ext cx="239168" cy="369332"/>
           </a:xfrm>
           <a:prstGeom prst="rect">
             <a:avLst/>
@@ -6187,6 +6445,66 @@
           <a:p>
             <a:r>
               <a:rPr lang="es-AR" dirty="0" smtClean="0"/>
+              <a:t>j</a:t>
+            </a:r>
+            <a:endParaRPr lang="en-US" dirty="0"/>
+          </a:p>
+        </p:txBody>
+      </p:sp>
+      <p:sp>
+        <p:nvSpPr>
+          <p:cNvPr id="91" name="TextBox 90"/>
+          <p:cNvSpPr txBox="1"/>
+          <p:nvPr/>
+        </p:nvSpPr>
+        <p:spPr>
+          <a:xfrm>
+            <a:off x="4419600" y="3048000"/>
+            <a:ext cx="290464" cy="369332"/>
+          </a:xfrm>
+          <a:prstGeom prst="rect">
+            <a:avLst/>
+          </a:prstGeom>
+          <a:noFill/>
+        </p:spPr>
+        <p:txBody>
+          <a:bodyPr wrap="none" rtlCol="0">
+            <a:spAutoFit/>
+          </a:bodyPr>
+          <a:lstStyle/>
+          <a:p>
+            <a:r>
+              <a:rPr lang="en-US" dirty="0" smtClean="0"/>
+              <a:t>j'</a:t>
+            </a:r>
+            <a:endParaRPr lang="en-US" dirty="0"/>
+          </a:p>
+        </p:txBody>
+      </p:sp>
+      <p:sp>
+        <p:nvSpPr>
+          <p:cNvPr id="92" name="TextBox 91"/>
+          <p:cNvSpPr txBox="1"/>
+          <p:nvPr/>
+        </p:nvSpPr>
+        <p:spPr>
+          <a:xfrm>
+            <a:off x="4648200" y="4953000"/>
+            <a:ext cx="288862" cy="369332"/>
+          </a:xfrm>
+          <a:prstGeom prst="rect">
+            <a:avLst/>
+          </a:prstGeom>
+          <a:noFill/>
+        </p:spPr>
+        <p:txBody>
+          <a:bodyPr wrap="none" rtlCol="0">
+            <a:spAutoFit/>
+          </a:bodyPr>
+          <a:lstStyle/>
+          <a:p>
+            <a:r>
+              <a:rPr lang="es-AR" dirty="0" smtClean="0"/>
               <a:t>i</a:t>
             </a:r>
             <a:r>
@@ -6197,16 +6515,51 @@
           </a:p>
         </p:txBody>
       </p:sp>
+      <p:sp>
+        <p:nvSpPr>
+          <p:cNvPr id="93" name="TextBox 92"/>
+          <p:cNvSpPr txBox="1"/>
+          <p:nvPr/>
+        </p:nvSpPr>
+        <p:spPr>
+          <a:xfrm>
+            <a:off x="4505671" y="5879068"/>
+            <a:ext cx="752129" cy="369332"/>
+          </a:xfrm>
+          <a:prstGeom prst="rect">
+            <a:avLst/>
+          </a:prstGeom>
+          <a:noFill/>
+        </p:spPr>
+        <p:txBody>
+          <a:bodyPr wrap="none" rtlCol="0">
+            <a:spAutoFit/>
+          </a:bodyPr>
+          <a:lstStyle/>
+          <a:p>
+            <a:r>
+              <a:rPr lang="es-AR" dirty="0" smtClean="0"/>
+              <a:t>F(i</a:t>
+            </a:r>
+            <a:r>
+              <a:rPr lang="en-US" dirty="0" smtClean="0"/>
+              <a:t>', j')</a:t>
+            </a:r>
+          </a:p>
+        </p:txBody>
+      </p:sp>
       <p:cxnSp>
         <p:nvCxnSpPr>
-          <p:cNvPr id="30" name="Straight Arrow Connector 29"/>
-          <p:cNvCxnSpPr/>
+          <p:cNvPr id="100" name="Straight Arrow Connector 99"/>
+          <p:cNvCxnSpPr>
+            <a:stCxn id="5" idx="1"/>
+          </p:cNvCxnSpPr>
           <p:nvPr/>
         </p:nvCxnSpPr>
         <p:spPr>
-          <a:xfrm rot="5400000" flipH="1" flipV="1">
-            <a:off x="4419600" y="4343400"/>
-            <a:ext cx="838200" cy="381000"/>
+          <a:xfrm rot="16200000" flipV="1">
+            <a:off x="4191000" y="4495800"/>
+            <a:ext cx="403318" cy="403318"/>
           </a:xfrm>
           <a:prstGeom prst="straightConnector1">
             <a:avLst/>
@@ -6235,14 +6588,14 @@
       </p:cxnSp>
       <p:sp>
         <p:nvSpPr>
-          <p:cNvPr id="31" name="TextBox 30"/>
+          <p:cNvPr id="102" name="TextBox 101"/>
           <p:cNvSpPr txBox="1"/>
           <p:nvPr/>
         </p:nvSpPr>
         <p:spPr>
           <a:xfrm>
-            <a:off x="4953000" y="4191000"/>
-            <a:ext cx="615810" cy="369332"/>
+            <a:off x="3810000" y="4202668"/>
+            <a:ext cx="699230" cy="369332"/>
           </a:xfrm>
           <a:prstGeom prst="rect">
             <a:avLst/>
@@ -6257,30 +6610,33 @@
           <a:p>
             <a:r>
               <a:rPr lang="es-AR" dirty="0" smtClean="0"/>
-              <a:t>F</a:t>
+              <a:t>F(i</a:t>
             </a:r>
             <a:r>
               <a:rPr lang="en-US" dirty="0" smtClean="0"/>
-              <a:t>S2 </a:t>
+              <a:t>, </a:t>
             </a:r>
             <a:r>
               <a:rPr lang="en-US" dirty="0" err="1" smtClean="0"/>
               <a:t>i</a:t>
             </a:r>
-            <a:endParaRPr lang="en-US" dirty="0" smtClean="0"/>
+            <a:r>
+              <a:rPr lang="en-US" dirty="0" smtClean="0"/>
+              <a:t>')</a:t>
+            </a:r>
           </a:p>
         </p:txBody>
       </p:sp>
       <p:cxnSp>
         <p:nvCxnSpPr>
-          <p:cNvPr id="32" name="Straight Arrow Connector 31"/>
+          <p:cNvPr id="104" name="Straight Arrow Connector 103"/>
           <p:cNvCxnSpPr/>
           <p:nvPr/>
         </p:nvCxnSpPr>
         <p:spPr>
-          <a:xfrm flipV="1">
-            <a:off x="4648200" y="4836153"/>
-            <a:ext cx="684381" cy="116847"/>
+          <a:xfrm rot="-120000" flipV="1">
+            <a:off x="3276600" y="5105400"/>
+            <a:ext cx="533400" cy="76200"/>
           </a:xfrm>
           <a:prstGeom prst="straightConnector1">
             <a:avLst/>
@@ -6309,14 +6665,14 @@
       </p:cxnSp>
       <p:sp>
         <p:nvSpPr>
-          <p:cNvPr id="33" name="TextBox 32"/>
+          <p:cNvPr id="109" name="TextBox 108"/>
           <p:cNvSpPr txBox="1"/>
           <p:nvPr/>
         </p:nvSpPr>
         <p:spPr>
           <a:xfrm>
-            <a:off x="5105400" y="4876800"/>
-            <a:ext cx="615810" cy="369332"/>
+            <a:off x="3352800" y="5105400"/>
+            <a:ext cx="915828" cy="369332"/>
           </a:xfrm>
           <a:prstGeom prst="rect">
             <a:avLst/>
@@ -6330,43 +6686,14 @@
           <a:lstStyle/>
           <a:p>
             <a:r>
-              <a:rPr lang="en-US" dirty="0" smtClean="0"/>
-              <a:t>FS1 </a:t>
-            </a:r>
-            <a:r>
-              <a:rPr lang="en-US" dirty="0" err="1" smtClean="0"/>
-              <a:t>i</a:t>
+              <a:rPr lang="es-AR" dirty="0" smtClean="0"/>
+              <a:t>F </a:t>
+            </a:r>
+            <a:r>
+              <a:rPr lang="es-AR" dirty="0" err="1" smtClean="0"/>
+              <a:t>desire</a:t>
             </a:r>
             <a:endParaRPr lang="en-US" dirty="0"/>
-          </a:p>
-        </p:txBody>
-      </p:sp>
-      <p:sp>
-        <p:nvSpPr>
-          <p:cNvPr id="48" name="TextBox 47"/>
-          <p:cNvSpPr txBox="1"/>
-          <p:nvPr/>
-        </p:nvSpPr>
-        <p:spPr>
-          <a:xfrm>
-            <a:off x="0" y="11668"/>
-            <a:ext cx="3048000" cy="369332"/>
-          </a:xfrm>
-          <a:prstGeom prst="rect">
-            <a:avLst/>
-          </a:prstGeom>
-          <a:noFill/>
-        </p:spPr>
-        <p:txBody>
-          <a:bodyPr wrap="square" rtlCol="0">
-            <a:spAutoFit/>
-          </a:bodyPr>
-          <a:lstStyle/>
-          <a:p>
-            <a:r>
-              <a:rPr lang="en-US" dirty="0" smtClean="0"/>
-              <a:t>pedestrian-internal-forces.png</a:t>
-            </a:r>
           </a:p>
         </p:txBody>
       </p:sp>
@@ -6397,13 +6724,13 @@
       </p:grpSpPr>
       <p:sp>
         <p:nvSpPr>
-          <p:cNvPr id="5" name="Oval 4"/>
+          <p:cNvPr id="14" name="Oval 13"/>
           <p:cNvSpPr/>
           <p:nvPr/>
         </p:nvSpPr>
         <p:spPr>
           <a:xfrm>
-            <a:off x="3352800" y="3276600"/>
+            <a:off x="5248277" y="4038600"/>
             <a:ext cx="152400" cy="152400"/>
           </a:xfrm>
           <a:prstGeom prst="ellipse">
@@ -6436,13 +6763,13 @@
       </p:sp>
       <p:sp>
         <p:nvSpPr>
-          <p:cNvPr id="6" name="Oval 5"/>
+          <p:cNvPr id="15" name="Oval 14"/>
           <p:cNvSpPr/>
           <p:nvPr/>
         </p:nvSpPr>
         <p:spPr>
           <a:xfrm>
-            <a:off x="1066797" y="2297668"/>
+            <a:off x="2733677" y="3897868"/>
             <a:ext cx="1219200" cy="1219200"/>
           </a:xfrm>
           <a:prstGeom prst="ellipse">
@@ -6473,46 +6800,18 @@
           </a:p>
         </p:txBody>
       </p:sp>
-      <p:sp>
-        <p:nvSpPr>
-          <p:cNvPr id="11" name="TextBox 10"/>
-          <p:cNvSpPr txBox="1"/>
-          <p:nvPr/>
-        </p:nvSpPr>
-        <p:spPr>
-          <a:xfrm>
-            <a:off x="0" y="11668"/>
-            <a:ext cx="3048000" cy="369332"/>
-          </a:xfrm>
-          <a:prstGeom prst="rect">
-            <a:avLst/>
-          </a:prstGeom>
-          <a:noFill/>
-        </p:spPr>
-        <p:txBody>
-          <a:bodyPr wrap="square" rtlCol="0">
-            <a:spAutoFit/>
-          </a:bodyPr>
-          <a:lstStyle/>
-          <a:p>
-            <a:r>
-              <a:rPr lang="en-US" dirty="0" smtClean="0"/>
-              <a:t>geometry.png</a:t>
-            </a:r>
-            <a:endParaRPr lang="en-US" dirty="0" smtClean="0"/>
-          </a:p>
-        </p:txBody>
-      </p:sp>
       <p:cxnSp>
         <p:nvCxnSpPr>
-          <p:cNvPr id="13" name="Straight Connector 12"/>
-          <p:cNvCxnSpPr/>
+          <p:cNvPr id="16" name="Straight Connector 15"/>
+          <p:cNvCxnSpPr>
+            <a:endCxn id="14" idx="2"/>
+          </p:cNvCxnSpPr>
           <p:nvPr/>
         </p:nvCxnSpPr>
         <p:spPr>
-          <a:xfrm>
-            <a:off x="2286000" y="3048000"/>
-            <a:ext cx="1089115" cy="294150"/>
+          <a:xfrm flipV="1">
+            <a:off x="3952877" y="4114800"/>
+            <a:ext cx="1298448" cy="233172"/>
           </a:xfrm>
           <a:prstGeom prst="line">
             <a:avLst/>
@@ -6521,7 +6820,7 @@
             <a:solidFill>
               <a:schemeClr val="tx1"/>
             </a:solidFill>
-            <a:prstDash val="solid"/>
+            <a:prstDash val="sysDash"/>
           </a:ln>
         </p:spPr>
         <p:style>
@@ -6541,130 +6840,13 @@
       </p:cxnSp>
       <p:sp>
         <p:nvSpPr>
-          <p:cNvPr id="23" name="Oval 22"/>
-          <p:cNvSpPr/>
-          <p:nvPr/>
-        </p:nvSpPr>
-        <p:spPr>
-          <a:xfrm>
-            <a:off x="2743200" y="4583668"/>
-            <a:ext cx="152400" cy="152400"/>
-          </a:xfrm>
-          <a:prstGeom prst="ellipse">
-            <a:avLst/>
-          </a:prstGeom>
-          <a:noFill/>
-        </p:spPr>
-        <p:style>
-          <a:lnRef idx="2">
-            <a:schemeClr val="accent1"/>
-          </a:lnRef>
-          <a:fillRef idx="1">
-            <a:schemeClr val="lt1"/>
-          </a:fillRef>
-          <a:effectRef idx="0">
-            <a:schemeClr val="accent1"/>
-          </a:effectRef>
-          <a:fontRef idx="minor">
-            <a:schemeClr val="dk1"/>
-          </a:fontRef>
-        </p:style>
-        <p:txBody>
-          <a:bodyPr rtlCol="0" anchor="ctr"/>
-          <a:lstStyle/>
-          <a:p>
-            <a:pPr algn="ctr"/>
-            <a:endParaRPr lang="en-US"/>
-          </a:p>
-        </p:txBody>
-      </p:sp>
-      <p:sp>
-        <p:nvSpPr>
-          <p:cNvPr id="24" name="Oval 23"/>
-          <p:cNvSpPr/>
-          <p:nvPr/>
-        </p:nvSpPr>
-        <p:spPr>
-          <a:xfrm>
-            <a:off x="4114800" y="4050268"/>
-            <a:ext cx="1219200" cy="1219200"/>
-          </a:xfrm>
-          <a:prstGeom prst="ellipse">
-            <a:avLst/>
-          </a:prstGeom>
-          <a:noFill/>
-        </p:spPr>
-        <p:style>
-          <a:lnRef idx="2">
-            <a:schemeClr val="accent1"/>
-          </a:lnRef>
-          <a:fillRef idx="1">
-            <a:schemeClr val="lt1"/>
-          </a:fillRef>
-          <a:effectRef idx="0">
-            <a:schemeClr val="accent1"/>
-          </a:effectRef>
-          <a:fontRef idx="minor">
-            <a:schemeClr val="dk1"/>
-          </a:fontRef>
-        </p:style>
-        <p:txBody>
-          <a:bodyPr rtlCol="0" anchor="ctr"/>
-          <a:lstStyle/>
-          <a:p>
-            <a:pPr algn="ctr"/>
-            <a:endParaRPr lang="en-US"/>
-          </a:p>
-        </p:txBody>
-      </p:sp>
-      <p:cxnSp>
-        <p:nvCxnSpPr>
-          <p:cNvPr id="25" name="Straight Connector 24"/>
-          <p:cNvCxnSpPr>
-            <a:stCxn id="24" idx="2"/>
-            <a:endCxn id="23" idx="6"/>
-          </p:cNvCxnSpPr>
-          <p:nvPr/>
-        </p:nvCxnSpPr>
-        <p:spPr>
-          <a:xfrm rot="10800000">
-            <a:off x="2895600" y="4659868"/>
-            <a:ext cx="1219200" cy="1588"/>
-          </a:xfrm>
-          <a:prstGeom prst="line">
-            <a:avLst/>
-          </a:prstGeom>
-          <a:ln>
-            <a:solidFill>
-              <a:schemeClr val="tx1"/>
-            </a:solidFill>
-            <a:prstDash val="solid"/>
-          </a:ln>
-        </p:spPr>
-        <p:style>
-          <a:lnRef idx="1">
-            <a:schemeClr val="accent1"/>
-          </a:lnRef>
-          <a:fillRef idx="0">
-            <a:schemeClr val="accent1"/>
-          </a:fillRef>
-          <a:effectRef idx="0">
-            <a:schemeClr val="accent1"/>
-          </a:effectRef>
-          <a:fontRef idx="minor">
-            <a:schemeClr val="tx1"/>
-          </a:fontRef>
-        </p:style>
-      </p:cxnSp>
-      <p:sp>
-        <p:nvSpPr>
-          <p:cNvPr id="57" name="TextBox 56"/>
+          <p:cNvPr id="20" name="TextBox 19"/>
           <p:cNvSpPr txBox="1"/>
           <p:nvPr/>
         </p:nvSpPr>
         <p:spPr>
           <a:xfrm>
-            <a:off x="1563624" y="2743200"/>
+            <a:off x="3800477" y="4888468"/>
             <a:ext cx="237566" cy="369332"/>
           </a:xfrm>
           <a:prstGeom prst="rect">
@@ -6688,14 +6870,14 @@
       </p:sp>
       <p:cxnSp>
         <p:nvCxnSpPr>
-          <p:cNvPr id="66" name="Straight Connector 65"/>
+          <p:cNvPr id="21" name="Straight Connector 20"/>
           <p:cNvCxnSpPr/>
           <p:nvPr/>
         </p:nvCxnSpPr>
         <p:spPr>
           <a:xfrm rot="16200000" flipH="1">
-            <a:off x="7048501" y="3009899"/>
-            <a:ext cx="1447800" cy="2"/>
+            <a:off x="3979411" y="1268867"/>
+            <a:ext cx="3233055" cy="2828922"/>
           </a:xfrm>
           <a:prstGeom prst="line">
             <a:avLst/>
@@ -6724,16 +6906,16 @@
       </p:cxnSp>
       <p:cxnSp>
         <p:nvCxnSpPr>
-          <p:cNvPr id="79" name="Straight Connector 78"/>
+          <p:cNvPr id="22" name="Straight Connector 21"/>
           <p:cNvCxnSpPr>
-            <a:stCxn id="6" idx="6"/>
+            <a:stCxn id="15" idx="7"/>
           </p:cNvCxnSpPr>
           <p:nvPr/>
         </p:nvCxnSpPr>
         <p:spPr>
-          <a:xfrm>
-            <a:off x="2285997" y="2907268"/>
-            <a:ext cx="5486400" cy="1588"/>
+          <a:xfrm rot="5400000" flipH="1" flipV="1">
+            <a:off x="3864437" y="2463976"/>
+            <a:ext cx="1522333" cy="1702548"/>
           </a:xfrm>
           <a:prstGeom prst="line">
             <a:avLst/>
@@ -6762,13 +6944,13 @@
       </p:cxnSp>
       <p:sp>
         <p:nvSpPr>
-          <p:cNvPr id="82" name="TextBox 81"/>
+          <p:cNvPr id="23" name="TextBox 22"/>
           <p:cNvSpPr txBox="1"/>
           <p:nvPr/>
         </p:nvSpPr>
         <p:spPr>
           <a:xfrm>
-            <a:off x="7542106" y="2602468"/>
+            <a:off x="5170383" y="2362200"/>
             <a:ext cx="306494" cy="369332"/>
           </a:xfrm>
           <a:prstGeom prst="rect">
@@ -6792,14 +6974,14 @@
       </p:sp>
       <p:sp>
         <p:nvSpPr>
-          <p:cNvPr id="90" name="TextBox 89"/>
+          <p:cNvPr id="28" name="TextBox 27"/>
           <p:cNvSpPr txBox="1"/>
           <p:nvPr/>
         </p:nvSpPr>
         <p:spPr>
           <a:xfrm>
-            <a:off x="4617720" y="4480560"/>
-            <a:ext cx="239168" cy="369332"/>
+            <a:off x="5324477" y="4114800"/>
+            <a:ext cx="288862" cy="369332"/>
           </a:xfrm>
           <a:prstGeom prst="rect">
             <a:avLst/>
@@ -6814,66 +6996,6 @@
           <a:p>
             <a:r>
               <a:rPr lang="es-AR" dirty="0" smtClean="0"/>
-              <a:t>j</a:t>
-            </a:r>
-            <a:endParaRPr lang="en-US" dirty="0"/>
-          </a:p>
-        </p:txBody>
-      </p:sp>
-      <p:sp>
-        <p:nvSpPr>
-          <p:cNvPr id="91" name="TextBox 90"/>
-          <p:cNvSpPr txBox="1"/>
-          <p:nvPr/>
-        </p:nvSpPr>
-        <p:spPr>
-          <a:xfrm>
-            <a:off x="2819400" y="4659868"/>
-            <a:ext cx="290464" cy="369332"/>
-          </a:xfrm>
-          <a:prstGeom prst="rect">
-            <a:avLst/>
-          </a:prstGeom>
-          <a:noFill/>
-        </p:spPr>
-        <p:txBody>
-          <a:bodyPr wrap="none" rtlCol="0">
-            <a:spAutoFit/>
-          </a:bodyPr>
-          <a:lstStyle/>
-          <a:p>
-            <a:r>
-              <a:rPr lang="en-US" dirty="0" smtClean="0"/>
-              <a:t>j'</a:t>
-            </a:r>
-            <a:endParaRPr lang="en-US" dirty="0"/>
-          </a:p>
-        </p:txBody>
-      </p:sp>
-      <p:sp>
-        <p:nvSpPr>
-          <p:cNvPr id="92" name="TextBox 91"/>
-          <p:cNvSpPr txBox="1"/>
-          <p:nvPr/>
-        </p:nvSpPr>
-        <p:spPr>
-          <a:xfrm>
-            <a:off x="3444938" y="3212068"/>
-            <a:ext cx="288862" cy="369332"/>
-          </a:xfrm>
-          <a:prstGeom prst="rect">
-            <a:avLst/>
-          </a:prstGeom>
-          <a:noFill/>
-        </p:spPr>
-        <p:txBody>
-          <a:bodyPr wrap="none" rtlCol="0">
-            <a:spAutoFit/>
-          </a:bodyPr>
-          <a:lstStyle/>
-          <a:p>
-            <a:r>
-              <a:rPr lang="es-AR" dirty="0" smtClean="0"/>
               <a:t>i</a:t>
             </a:r>
             <a:r>
@@ -6884,87 +7006,25 @@
           </a:p>
         </p:txBody>
       </p:sp>
-      <p:sp>
-        <p:nvSpPr>
-          <p:cNvPr id="45" name="TextBox 44"/>
-          <p:cNvSpPr txBox="1"/>
-          <p:nvPr/>
-        </p:nvSpPr>
-        <p:spPr>
-          <a:xfrm>
-            <a:off x="2895600" y="2971800"/>
-            <a:ext cx="304800" cy="369332"/>
-          </a:xfrm>
-          <a:prstGeom prst="rect">
-            <a:avLst/>
-          </a:prstGeom>
-          <a:noFill/>
-        </p:spPr>
-        <p:txBody>
-          <a:bodyPr wrap="square" rtlCol="0">
-            <a:spAutoFit/>
-          </a:bodyPr>
-          <a:lstStyle/>
-          <a:p>
-            <a:r>
-              <a:rPr lang="en-US" b="1" dirty="0" smtClean="0"/>
-              <a:t>r</a:t>
-            </a:r>
-            <a:endParaRPr lang="en-US" b="1" dirty="0"/>
-          </a:p>
-        </p:txBody>
-      </p:sp>
-      <p:sp>
-        <p:nvSpPr>
-          <p:cNvPr id="46" name="TextBox 45"/>
-          <p:cNvSpPr txBox="1"/>
-          <p:nvPr/>
-        </p:nvSpPr>
-        <p:spPr>
-          <a:xfrm>
-            <a:off x="4114800" y="2590800"/>
-            <a:ext cx="306494" cy="369332"/>
-          </a:xfrm>
-          <a:prstGeom prst="rect">
-            <a:avLst/>
-          </a:prstGeom>
-          <a:noFill/>
-        </p:spPr>
-        <p:txBody>
-          <a:bodyPr wrap="none" rtlCol="0">
-            <a:spAutoFit/>
-          </a:bodyPr>
-          <a:lstStyle/>
-          <a:p>
-            <a:r>
-              <a:rPr lang="en-US" b="1" dirty="0" smtClean="0"/>
-              <a:t>u</a:t>
-            </a:r>
-            <a:endParaRPr lang="en-US" b="1" dirty="0"/>
-          </a:p>
-        </p:txBody>
-      </p:sp>
       <p:cxnSp>
         <p:nvCxnSpPr>
-          <p:cNvPr id="47" name="Straight Connector 46"/>
-          <p:cNvCxnSpPr>
-            <a:stCxn id="5" idx="6"/>
-          </p:cNvCxnSpPr>
+          <p:cNvPr id="30" name="Straight Arrow Connector 29"/>
+          <p:cNvCxnSpPr/>
           <p:nvPr/>
         </p:nvCxnSpPr>
         <p:spPr>
-          <a:xfrm flipV="1">
-            <a:off x="3505200" y="2895600"/>
-            <a:ext cx="4267200" cy="457200"/>
-          </a:xfrm>
-          <a:prstGeom prst="line">
-            <a:avLst/>
-          </a:prstGeom>
-          <a:ln>
+          <a:xfrm rot="10800000">
+            <a:off x="4714877" y="3733800"/>
+            <a:ext cx="609600" cy="381000"/>
+          </a:xfrm>
+          <a:prstGeom prst="straightConnector1">
+            <a:avLst/>
+          </a:prstGeom>
+          <a:ln w="19050">
             <a:solidFill>
-              <a:schemeClr val="tx1"/>
+              <a:srgbClr val="00B050"/>
             </a:solidFill>
-            <a:prstDash val="dash"/>
+            <a:tailEnd type="arrow"/>
           </a:ln>
         </p:spPr>
         <p:style>
@@ -6984,14 +7044,14 @@
       </p:cxnSp>
       <p:sp>
         <p:nvSpPr>
-          <p:cNvPr id="50" name="TextBox 49"/>
+          <p:cNvPr id="31" name="TextBox 30"/>
           <p:cNvSpPr txBox="1"/>
           <p:nvPr/>
         </p:nvSpPr>
         <p:spPr>
           <a:xfrm>
-            <a:off x="4267200" y="2971800"/>
-            <a:ext cx="356188" cy="369332"/>
+            <a:off x="4747789" y="3516868"/>
+            <a:ext cx="510011" cy="369332"/>
           </a:xfrm>
           <a:prstGeom prst="rect">
             <a:avLst/>
@@ -7005,35 +7065,36 @@
           <a:lstStyle/>
           <a:p>
             <a:r>
-              <a:rPr lang="en-US" b="1" dirty="0" smtClean="0"/>
-              <a:t>w</a:t>
-            </a:r>
-            <a:endParaRPr lang="en-US" b="1" dirty="0"/>
+              <a:rPr lang="es-AR" dirty="0" smtClean="0"/>
+              <a:t>F</a:t>
+            </a:r>
+            <a:r>
+              <a:rPr lang="en-US" dirty="0" smtClean="0"/>
+              <a:t>S1</a:t>
+            </a:r>
+            <a:endParaRPr lang="en-US" dirty="0" smtClean="0"/>
           </a:p>
         </p:txBody>
       </p:sp>
       <p:cxnSp>
         <p:nvCxnSpPr>
-          <p:cNvPr id="51" name="Straight Connector 50"/>
-          <p:cNvCxnSpPr>
-            <a:stCxn id="23" idx="0"/>
-            <a:endCxn id="5" idx="4"/>
-          </p:cNvCxnSpPr>
+          <p:cNvPr id="32" name="Straight Arrow Connector 31"/>
+          <p:cNvCxnSpPr/>
           <p:nvPr/>
         </p:nvCxnSpPr>
         <p:spPr>
-          <a:xfrm rot="5400000" flipH="1" flipV="1">
-            <a:off x="2546866" y="3701534"/>
-            <a:ext cx="1154668" cy="609600"/>
-          </a:xfrm>
-          <a:prstGeom prst="line">
-            <a:avLst/>
-          </a:prstGeom>
-          <a:ln>
+          <a:xfrm rot="10800000" flipV="1">
+            <a:off x="4800601" y="4114800"/>
+            <a:ext cx="523877" cy="76199"/>
+          </a:xfrm>
+          <a:prstGeom prst="straightConnector1">
+            <a:avLst/>
+          </a:prstGeom>
+          <a:ln w="19050">
             <a:solidFill>
-              <a:schemeClr val="tx1"/>
+              <a:schemeClr val="accent6"/>
             </a:solidFill>
-            <a:prstDash val="dash"/>
+            <a:tailEnd type="arrow"/>
           </a:ln>
         </p:spPr>
         <p:style>
@@ -7051,39 +7112,143 @@
           </a:fontRef>
         </p:style>
       </p:cxnSp>
+      <p:sp>
+        <p:nvSpPr>
+          <p:cNvPr id="33" name="TextBox 32"/>
+          <p:cNvSpPr txBox="1"/>
+          <p:nvPr/>
+        </p:nvSpPr>
+        <p:spPr>
+          <a:xfrm>
+            <a:off x="4648200" y="4126468"/>
+            <a:ext cx="510011" cy="369332"/>
+          </a:xfrm>
+          <a:prstGeom prst="rect">
+            <a:avLst/>
+          </a:prstGeom>
+          <a:noFill/>
+        </p:spPr>
+        <p:txBody>
+          <a:bodyPr wrap="none" rtlCol="0">
+            <a:spAutoFit/>
+          </a:bodyPr>
+          <a:lstStyle/>
+          <a:p>
+            <a:r>
+              <a:rPr lang="en-US" dirty="0" smtClean="0"/>
+              <a:t>FS2</a:t>
+            </a:r>
+            <a:endParaRPr lang="en-US" dirty="0"/>
+          </a:p>
+        </p:txBody>
+      </p:sp>
+      <p:sp>
+        <p:nvSpPr>
+          <p:cNvPr id="48" name="TextBox 47"/>
+          <p:cNvSpPr txBox="1"/>
+          <p:nvPr/>
+        </p:nvSpPr>
+        <p:spPr>
+          <a:xfrm>
+            <a:off x="0" y="11668"/>
+            <a:ext cx="3048000" cy="369332"/>
+          </a:xfrm>
+          <a:prstGeom prst="rect">
+            <a:avLst/>
+          </a:prstGeom>
+          <a:noFill/>
+        </p:spPr>
+        <p:txBody>
+          <a:bodyPr wrap="square" rtlCol="0">
+            <a:spAutoFit/>
+          </a:bodyPr>
+          <a:lstStyle/>
+          <a:p>
+            <a:r>
+              <a:rPr lang="en-US" dirty="0" smtClean="0"/>
+              <a:t>pedestrian-internal-forces.png</a:t>
+            </a:r>
+          </a:p>
+        </p:txBody>
+      </p:sp>
+      <p:sp>
+        <p:nvSpPr>
+          <p:cNvPr id="18" name="Oval 17"/>
+          <p:cNvSpPr/>
+          <p:nvPr/>
+        </p:nvSpPr>
+        <p:spPr>
+          <a:xfrm>
+            <a:off x="1971677" y="3124200"/>
+            <a:ext cx="2743200" cy="2743200"/>
+          </a:xfrm>
+          <a:prstGeom prst="ellipse">
+            <a:avLst/>
+          </a:prstGeom>
+          <a:noFill/>
+          <a:ln w="12700">
+            <a:solidFill>
+              <a:schemeClr val="bg1">
+                <a:lumMod val="65000"/>
+              </a:schemeClr>
+            </a:solidFill>
+            <a:prstDash val="lgDash"/>
+          </a:ln>
+        </p:spPr>
+        <p:style>
+          <a:lnRef idx="2">
+            <a:schemeClr val="accent1"/>
+          </a:lnRef>
+          <a:fillRef idx="1">
+            <a:schemeClr val="lt1"/>
+          </a:fillRef>
+          <a:effectRef idx="0">
+            <a:schemeClr val="accent1"/>
+          </a:effectRef>
+          <a:fontRef idx="minor">
+            <a:schemeClr val="dk1"/>
+          </a:fontRef>
+        </p:style>
+        <p:txBody>
+          <a:bodyPr rtlCol="0" anchor="ctr"/>
+          <a:lstStyle/>
+          <a:p>
+            <a:pPr algn="ctr"/>
+            <a:endParaRPr lang="en-US"/>
+          </a:p>
+        </p:txBody>
+      </p:sp>
       <p:cxnSp>
         <p:nvCxnSpPr>
-          <p:cNvPr id="55" name="Straight Connector 54"/>
+          <p:cNvPr id="39" name="Straight Arrow Connector 38"/>
           <p:cNvCxnSpPr>
-            <a:stCxn id="24" idx="1"/>
-            <a:endCxn id="5" idx="4"/>
+            <a:stCxn id="15" idx="2"/>
+            <a:endCxn id="18" idx="2"/>
           </p:cNvCxnSpPr>
           <p:nvPr/>
         </p:nvCxnSpPr>
         <p:spPr>
-          <a:xfrm rot="16200000" flipV="1">
-            <a:off x="3461266" y="3396734"/>
-            <a:ext cx="799816" cy="864348"/>
-          </a:xfrm>
-          <a:prstGeom prst="line">
+          <a:xfrm rot="10800000">
+            <a:off x="1971677" y="4495800"/>
+            <a:ext cx="762000" cy="11668"/>
+          </a:xfrm>
+          <a:prstGeom prst="straightConnector1">
             <a:avLst/>
           </a:prstGeom>
           <a:ln>
-            <a:solidFill>
-              <a:schemeClr val="tx1"/>
-            </a:solidFill>
-            <a:prstDash val="dash"/>
+            <a:headEnd type="arrow"/>
+            <a:tailEnd type="arrow"/>
           </a:ln>
         </p:spPr>
         <p:style>
           <a:lnRef idx="1">
-            <a:schemeClr val="accent1"/>
+            <a:schemeClr val="dk1"/>
           </a:lnRef>
           <a:fillRef idx="0">
-            <a:schemeClr val="accent1"/>
+            <a:schemeClr val="dk1"/>
           </a:fillRef>
           <a:effectRef idx="0">
-            <a:schemeClr val="accent1"/>
+            <a:schemeClr val="dk1"/>
           </a:effectRef>
           <a:fontRef idx="minor">
             <a:schemeClr val="tx1"/>
@@ -7092,74 +7257,14 @@
       </p:cxnSp>
       <p:sp>
         <p:nvSpPr>
-          <p:cNvPr id="61" name="TextBox 60"/>
+          <p:cNvPr id="41" name="TextBox 40"/>
           <p:cNvSpPr txBox="1"/>
           <p:nvPr/>
         </p:nvSpPr>
         <p:spPr>
           <a:xfrm>
-            <a:off x="2971800" y="3657600"/>
-            <a:ext cx="304800" cy="369332"/>
-          </a:xfrm>
-          <a:prstGeom prst="rect">
-            <a:avLst/>
-          </a:prstGeom>
-          <a:noFill/>
-        </p:spPr>
-        <p:txBody>
-          <a:bodyPr wrap="square" rtlCol="0">
-            <a:spAutoFit/>
-          </a:bodyPr>
-          <a:lstStyle/>
-          <a:p>
-            <a:r>
-              <a:rPr lang="en-US" b="1" dirty="0" smtClean="0"/>
-              <a:t>s</a:t>
-            </a:r>
-            <a:endParaRPr lang="en-US" b="1" dirty="0"/>
-          </a:p>
-        </p:txBody>
-      </p:sp>
-      <p:sp>
-        <p:nvSpPr>
-          <p:cNvPr id="62" name="TextBox 61"/>
-          <p:cNvSpPr txBox="1"/>
-          <p:nvPr/>
-        </p:nvSpPr>
-        <p:spPr>
-          <a:xfrm>
-            <a:off x="3886200" y="3593068"/>
-            <a:ext cx="304800" cy="369332"/>
-          </a:xfrm>
-          <a:prstGeom prst="rect">
-            <a:avLst/>
-          </a:prstGeom>
-          <a:noFill/>
-        </p:spPr>
-        <p:txBody>
-          <a:bodyPr wrap="square" rtlCol="0">
-            <a:spAutoFit/>
-          </a:bodyPr>
-          <a:lstStyle/>
-          <a:p>
-            <a:r>
-              <a:rPr lang="en-US" b="1" dirty="0" smtClean="0"/>
-              <a:t>t</a:t>
-            </a:r>
-            <a:endParaRPr lang="en-US" b="1" dirty="0"/>
-          </a:p>
-        </p:txBody>
-      </p:sp>
-      <p:sp>
-        <p:nvSpPr>
-          <p:cNvPr id="77" name="TextBox 76"/>
-          <p:cNvSpPr txBox="1"/>
-          <p:nvPr/>
-        </p:nvSpPr>
-        <p:spPr>
-          <a:xfrm>
-            <a:off x="6821510" y="3581400"/>
-            <a:ext cx="1179490" cy="369332"/>
+            <a:off x="2133600" y="4191000"/>
+            <a:ext cx="407484" cy="323165"/>
           </a:xfrm>
           <a:prstGeom prst="rect">
             <a:avLst/>
@@ -7173,14 +7278,10 @@
           <a:lstStyle/>
           <a:p>
             <a:r>
-              <a:rPr lang="en-US" dirty="0" smtClean="0"/>
-              <a:t>Objective </a:t>
-            </a:r>
-            <a:r>
-              <a:rPr lang="en-US" dirty="0" err="1" smtClean="0"/>
-              <a:t>i</a:t>
-            </a:r>
-            <a:endParaRPr lang="en-US" dirty="0"/>
+              <a:rPr lang="en-US" sz="1500" dirty="0" smtClean="0"/>
+              <a:t>RD</a:t>
+            </a:r>
+            <a:endParaRPr lang="en-US" sz="1500" dirty="0"/>
           </a:p>
         </p:txBody>
       </p:sp>

</xml_diff>

<commit_message>
actualizo carpeta informe con todo lo que esta subido en shareslatex
</commit_message>
<xml_diff>
--- a/doc/informe/pictures.pptx
+++ b/doc/informe/pictures.pptx
@@ -12,9 +12,9 @@
     <p:sldId id="257" r:id="rId3"/>
     <p:sldId id="258" r:id="rId4"/>
     <p:sldId id="259" r:id="rId5"/>
-    <p:sldId id="260" r:id="rId6"/>
-    <p:sldId id="261" r:id="rId7"/>
-    <p:sldId id="262" r:id="rId8"/>
+    <p:sldId id="262" r:id="rId6"/>
+    <p:sldId id="260" r:id="rId7"/>
+    <p:sldId id="261" r:id="rId8"/>
   </p:sldIdLst>
   <p:sldSz cx="9144000" cy="6858000" type="screen4x3"/>
   <p:notesSz cx="6858000" cy="9144000"/>
@@ -199,7 +199,7 @@
             <a:fld id="{845A57F8-9FFB-4742-8CFD-3414C37FBF35}" type="datetimeFigureOut">
               <a:rPr lang="en-US" smtClean="0"/>
               <a:pPr/>
-              <a:t>12/7/2014</a:t>
+              <a:t>11/12/2014</a:t>
             </a:fld>
             <a:endParaRPr lang="en-US"/>
           </a:p>
@@ -779,7 +779,7 @@
             <a:fld id="{7D97FC9E-4CEA-462C-95AC-29F39B39D0EF}" type="slidenum">
               <a:rPr lang="en-US" smtClean="0"/>
               <a:pPr/>
-              <a:t>7</a:t>
+              <a:t>6</a:t>
             </a:fld>
             <a:endParaRPr lang="en-US"/>
           </a:p>
@@ -975,7 +975,7 @@
             <a:fld id="{0BF94AD7-59A1-45F9-ACA2-67E78D40517C}" type="datetimeFigureOut">
               <a:rPr lang="en-US" smtClean="0"/>
               <a:pPr/>
-              <a:t>12/7/2014</a:t>
+              <a:t>11/12/2014</a:t>
             </a:fld>
             <a:endParaRPr lang="en-US"/>
           </a:p>
@@ -1142,7 +1142,7 @@
             <a:fld id="{0BF94AD7-59A1-45F9-ACA2-67E78D40517C}" type="datetimeFigureOut">
               <a:rPr lang="en-US" smtClean="0"/>
               <a:pPr/>
-              <a:t>12/7/2014</a:t>
+              <a:t>11/12/2014</a:t>
             </a:fld>
             <a:endParaRPr lang="en-US"/>
           </a:p>
@@ -1319,7 +1319,7 @@
             <a:fld id="{0BF94AD7-59A1-45F9-ACA2-67E78D40517C}" type="datetimeFigureOut">
               <a:rPr lang="en-US" smtClean="0"/>
               <a:pPr/>
-              <a:t>12/7/2014</a:t>
+              <a:t>11/12/2014</a:t>
             </a:fld>
             <a:endParaRPr lang="en-US"/>
           </a:p>
@@ -1486,7 +1486,7 @@
             <a:fld id="{0BF94AD7-59A1-45F9-ACA2-67E78D40517C}" type="datetimeFigureOut">
               <a:rPr lang="en-US" smtClean="0"/>
               <a:pPr/>
-              <a:t>12/7/2014</a:t>
+              <a:t>11/12/2014</a:t>
             </a:fld>
             <a:endParaRPr lang="en-US"/>
           </a:p>
@@ -1729,7 +1729,7 @@
             <a:fld id="{0BF94AD7-59A1-45F9-ACA2-67E78D40517C}" type="datetimeFigureOut">
               <a:rPr lang="en-US" smtClean="0"/>
               <a:pPr/>
-              <a:t>12/7/2014</a:t>
+              <a:t>11/12/2014</a:t>
             </a:fld>
             <a:endParaRPr lang="en-US"/>
           </a:p>
@@ -2014,7 +2014,7 @@
             <a:fld id="{0BF94AD7-59A1-45F9-ACA2-67E78D40517C}" type="datetimeFigureOut">
               <a:rPr lang="en-US" smtClean="0"/>
               <a:pPr/>
-              <a:t>12/7/2014</a:t>
+              <a:t>11/12/2014</a:t>
             </a:fld>
             <a:endParaRPr lang="en-US"/>
           </a:p>
@@ -2433,7 +2433,7 @@
             <a:fld id="{0BF94AD7-59A1-45F9-ACA2-67E78D40517C}" type="datetimeFigureOut">
               <a:rPr lang="en-US" smtClean="0"/>
               <a:pPr/>
-              <a:t>12/7/2014</a:t>
+              <a:t>11/12/2014</a:t>
             </a:fld>
             <a:endParaRPr lang="en-US"/>
           </a:p>
@@ -2548,7 +2548,7 @@
             <a:fld id="{0BF94AD7-59A1-45F9-ACA2-67E78D40517C}" type="datetimeFigureOut">
               <a:rPr lang="en-US" smtClean="0"/>
               <a:pPr/>
-              <a:t>12/7/2014</a:t>
+              <a:t>11/12/2014</a:t>
             </a:fld>
             <a:endParaRPr lang="en-US"/>
           </a:p>
@@ -2640,7 +2640,7 @@
             <a:fld id="{0BF94AD7-59A1-45F9-ACA2-67E78D40517C}" type="datetimeFigureOut">
               <a:rPr lang="en-US" smtClean="0"/>
               <a:pPr/>
-              <a:t>12/7/2014</a:t>
+              <a:t>11/12/2014</a:t>
             </a:fld>
             <a:endParaRPr lang="en-US"/>
           </a:p>
@@ -2914,7 +2914,7 @@
             <a:fld id="{0BF94AD7-59A1-45F9-ACA2-67E78D40517C}" type="datetimeFigureOut">
               <a:rPr lang="en-US" smtClean="0"/>
               <a:pPr/>
-              <a:t>12/7/2014</a:t>
+              <a:t>11/12/2014</a:t>
             </a:fld>
             <a:endParaRPr lang="en-US"/>
           </a:p>
@@ -3164,7 +3164,7 @@
             <a:fld id="{0BF94AD7-59A1-45F9-ACA2-67E78D40517C}" type="datetimeFigureOut">
               <a:rPr lang="en-US" smtClean="0"/>
               <a:pPr/>
-              <a:t>12/7/2014</a:t>
+              <a:t>11/12/2014</a:t>
             </a:fld>
             <a:endParaRPr lang="en-US"/>
           </a:p>
@@ -3374,7 +3374,7 @@
             <a:fld id="{0BF94AD7-59A1-45F9-ACA2-67E78D40517C}" type="datetimeFigureOut">
               <a:rPr lang="en-US" smtClean="0"/>
               <a:pPr/>
-              <a:t>12/7/2014</a:t>
+              <a:t>11/12/2014</a:t>
             </a:fld>
             <a:endParaRPr lang="en-US"/>
           </a:p>
@@ -5139,7 +5139,7 @@
         </p:nvSpPr>
         <p:spPr>
           <a:xfrm>
-            <a:off x="4572000" y="4876800"/>
+            <a:off x="3352800" y="3276600"/>
             <a:ext cx="152400" cy="152400"/>
           </a:xfrm>
           <a:prstGeom prst="ellipse">
@@ -5178,7 +5178,7 @@
         </p:nvSpPr>
         <p:spPr>
           <a:xfrm>
-            <a:off x="2057400" y="4736068"/>
+            <a:off x="1066797" y="2297668"/>
             <a:ext cx="1219200" cy="1219200"/>
           </a:xfrm>
           <a:prstGeom prst="ellipse">
@@ -5233,7 +5233,7 @@
           <a:p>
             <a:r>
               <a:rPr lang="en-US" dirty="0" smtClean="0"/>
-              <a:t>pedestrian-top-forces.png</a:t>
+              <a:t>geometry.png</a:t>
             </a:r>
           </a:p>
         </p:txBody>
@@ -5241,15 +5241,13 @@
       <p:cxnSp>
         <p:nvCxnSpPr>
           <p:cNvPr id="13" name="Straight Connector 12"/>
-          <p:cNvCxnSpPr>
-            <a:endCxn id="5" idx="2"/>
-          </p:cNvCxnSpPr>
+          <p:cNvCxnSpPr/>
           <p:nvPr/>
         </p:nvCxnSpPr>
         <p:spPr>
-          <a:xfrm flipV="1">
-            <a:off x="3276600" y="4953000"/>
-            <a:ext cx="1298448" cy="233172"/>
+          <a:xfrm>
+            <a:off x="2286000" y="3048000"/>
+            <a:ext cx="1089115" cy="294150"/>
           </a:xfrm>
           <a:prstGeom prst="line">
             <a:avLst/>
@@ -5258,7 +5256,7 @@
             <a:solidFill>
               <a:schemeClr val="tx1"/>
             </a:solidFill>
-            <a:prstDash val="sysDash"/>
+            <a:prstDash val="solid"/>
           </a:ln>
         </p:spPr>
         <p:style>
@@ -5284,7 +5282,7 @@
         </p:nvSpPr>
         <p:spPr>
           <a:xfrm>
-            <a:off x="4724400" y="2971800"/>
+            <a:off x="2743200" y="4583668"/>
             <a:ext cx="152400" cy="152400"/>
           </a:xfrm>
           <a:prstGeom prst="ellipse">
@@ -5323,7 +5321,7 @@
         </p:nvSpPr>
         <p:spPr>
           <a:xfrm>
-            <a:off x="2971800" y="1219200"/>
+            <a:off x="4114800" y="4050268"/>
             <a:ext cx="1219200" cy="1219200"/>
           </a:xfrm>
           <a:prstGeom prst="ellipse">
@@ -5358,15 +5356,15 @@
         <p:nvCxnSpPr>
           <p:cNvPr id="25" name="Straight Connector 24"/>
           <p:cNvCxnSpPr>
-            <a:stCxn id="24" idx="5"/>
-            <a:endCxn id="23" idx="1"/>
+            <a:stCxn id="24" idx="2"/>
+            <a:endCxn id="23" idx="6"/>
           </p:cNvCxnSpPr>
           <p:nvPr/>
         </p:nvCxnSpPr>
         <p:spPr>
-          <a:xfrm rot="16200000" flipH="1">
-            <a:off x="4012452" y="2259852"/>
-            <a:ext cx="734266" cy="734266"/>
+          <a:xfrm rot="10800000">
+            <a:off x="2895600" y="4659868"/>
+            <a:ext cx="1219200" cy="1588"/>
           </a:xfrm>
           <a:prstGeom prst="line">
             <a:avLst/>
@@ -5375,7 +5373,7 @@
             <a:solidFill>
               <a:schemeClr val="tx1"/>
             </a:solidFill>
-            <a:prstDash val="sysDash"/>
+            <a:prstDash val="solid"/>
           </a:ln>
         </p:spPr>
         <p:style>
@@ -5401,7 +5399,7 @@
         </p:nvSpPr>
         <p:spPr>
           <a:xfrm>
-            <a:off x="3124200" y="5726668"/>
+            <a:off x="1563624" y="2743200"/>
             <a:ext cx="237566" cy="369332"/>
           </a:xfrm>
           <a:prstGeom prst="rect">
@@ -5431,8 +5429,8 @@
         </p:nvCxnSpPr>
         <p:spPr>
           <a:xfrm rot="16200000" flipH="1">
-            <a:off x="4446136" y="1160011"/>
-            <a:ext cx="3233055" cy="2828922"/>
+            <a:off x="7048501" y="3009899"/>
+            <a:ext cx="1447800" cy="2"/>
           </a:xfrm>
           <a:prstGeom prst="line">
             <a:avLst/>
@@ -5463,14 +5461,14 @@
         <p:nvCxnSpPr>
           <p:cNvPr id="79" name="Straight Connector 78"/>
           <p:cNvCxnSpPr>
-            <a:stCxn id="6" idx="7"/>
+            <a:stCxn id="6" idx="6"/>
           </p:cNvCxnSpPr>
           <p:nvPr/>
         </p:nvCxnSpPr>
         <p:spPr>
-          <a:xfrm rot="5400000" flipH="1" flipV="1">
-            <a:off x="3244619" y="2291833"/>
-            <a:ext cx="2476216" cy="2769350"/>
+          <a:xfrm>
+            <a:off x="2285997" y="2907268"/>
+            <a:ext cx="5486400" cy="1588"/>
           </a:xfrm>
           <a:prstGeom prst="line">
             <a:avLst/>
@@ -5505,8 +5503,8 @@
         </p:nvSpPr>
         <p:spPr>
           <a:xfrm>
-            <a:off x="5715000" y="1828800"/>
-            <a:ext cx="1179490" cy="369332"/>
+            <a:off x="7542106" y="2602468"/>
+            <a:ext cx="306494" cy="369332"/>
           </a:xfrm>
           <a:prstGeom prst="rect">
             <a:avLst/>
@@ -5520,39 +5518,257 @@
           <a:lstStyle/>
           <a:p>
             <a:r>
-              <a:rPr lang="es-AR" dirty="0" err="1" smtClean="0"/>
-              <a:t>Objective</a:t>
-            </a:r>
-            <a:r>
               <a:rPr lang="es-AR" dirty="0" smtClean="0"/>
-              <a:t> i</a:t>
+              <a:t>o</a:t>
             </a:r>
             <a:endParaRPr lang="en-US" dirty="0"/>
+          </a:p>
+        </p:txBody>
+      </p:sp>
+      <p:sp>
+        <p:nvSpPr>
+          <p:cNvPr id="90" name="TextBox 89"/>
+          <p:cNvSpPr txBox="1"/>
+          <p:nvPr/>
+        </p:nvSpPr>
+        <p:spPr>
+          <a:xfrm>
+            <a:off x="4617720" y="4480560"/>
+            <a:ext cx="239168" cy="369332"/>
+          </a:xfrm>
+          <a:prstGeom prst="rect">
+            <a:avLst/>
+          </a:prstGeom>
+          <a:noFill/>
+        </p:spPr>
+        <p:txBody>
+          <a:bodyPr wrap="none" rtlCol="0">
+            <a:spAutoFit/>
+          </a:bodyPr>
+          <a:lstStyle/>
+          <a:p>
+            <a:r>
+              <a:rPr lang="es-AR" dirty="0" smtClean="0"/>
+              <a:t>j</a:t>
+            </a:r>
+            <a:endParaRPr lang="en-US" dirty="0"/>
+          </a:p>
+        </p:txBody>
+      </p:sp>
+      <p:sp>
+        <p:nvSpPr>
+          <p:cNvPr id="91" name="TextBox 90"/>
+          <p:cNvSpPr txBox="1"/>
+          <p:nvPr/>
+        </p:nvSpPr>
+        <p:spPr>
+          <a:xfrm>
+            <a:off x="2819400" y="4659868"/>
+            <a:ext cx="290464" cy="369332"/>
+          </a:xfrm>
+          <a:prstGeom prst="rect">
+            <a:avLst/>
+          </a:prstGeom>
+          <a:noFill/>
+        </p:spPr>
+        <p:txBody>
+          <a:bodyPr wrap="none" rtlCol="0">
+            <a:spAutoFit/>
+          </a:bodyPr>
+          <a:lstStyle/>
+          <a:p>
+            <a:r>
+              <a:rPr lang="en-US" dirty="0" smtClean="0"/>
+              <a:t>j'</a:t>
+            </a:r>
+            <a:endParaRPr lang="en-US" dirty="0"/>
+          </a:p>
+        </p:txBody>
+      </p:sp>
+      <p:sp>
+        <p:nvSpPr>
+          <p:cNvPr id="92" name="TextBox 91"/>
+          <p:cNvSpPr txBox="1"/>
+          <p:nvPr/>
+        </p:nvSpPr>
+        <p:spPr>
+          <a:xfrm>
+            <a:off x="3444938" y="3212068"/>
+            <a:ext cx="288862" cy="369332"/>
+          </a:xfrm>
+          <a:prstGeom prst="rect">
+            <a:avLst/>
+          </a:prstGeom>
+          <a:noFill/>
+        </p:spPr>
+        <p:txBody>
+          <a:bodyPr wrap="none" rtlCol="0">
+            <a:spAutoFit/>
+          </a:bodyPr>
+          <a:lstStyle/>
+          <a:p>
+            <a:r>
+              <a:rPr lang="es-AR" dirty="0" smtClean="0"/>
+              <a:t>i</a:t>
+            </a:r>
+            <a:r>
+              <a:rPr lang="en-US" dirty="0" smtClean="0"/>
+              <a:t>'</a:t>
+            </a:r>
+            <a:endParaRPr lang="en-US" dirty="0"/>
+          </a:p>
+        </p:txBody>
+      </p:sp>
+      <p:sp>
+        <p:nvSpPr>
+          <p:cNvPr id="45" name="TextBox 44"/>
+          <p:cNvSpPr txBox="1"/>
+          <p:nvPr/>
+        </p:nvSpPr>
+        <p:spPr>
+          <a:xfrm>
+            <a:off x="2895600" y="2971800"/>
+            <a:ext cx="304800" cy="369332"/>
+          </a:xfrm>
+          <a:prstGeom prst="rect">
+            <a:avLst/>
+          </a:prstGeom>
+          <a:noFill/>
+        </p:spPr>
+        <p:txBody>
+          <a:bodyPr wrap="square" rtlCol="0">
+            <a:spAutoFit/>
+          </a:bodyPr>
+          <a:lstStyle/>
+          <a:p>
+            <a:r>
+              <a:rPr lang="en-US" b="1" dirty="0" smtClean="0"/>
+              <a:t>r</a:t>
+            </a:r>
+            <a:endParaRPr lang="en-US" b="1" dirty="0"/>
+          </a:p>
+        </p:txBody>
+      </p:sp>
+      <p:sp>
+        <p:nvSpPr>
+          <p:cNvPr id="46" name="TextBox 45"/>
+          <p:cNvSpPr txBox="1"/>
+          <p:nvPr/>
+        </p:nvSpPr>
+        <p:spPr>
+          <a:xfrm>
+            <a:off x="4114800" y="2590800"/>
+            <a:ext cx="306494" cy="369332"/>
+          </a:xfrm>
+          <a:prstGeom prst="rect">
+            <a:avLst/>
+          </a:prstGeom>
+          <a:noFill/>
+        </p:spPr>
+        <p:txBody>
+          <a:bodyPr wrap="none" rtlCol="0">
+            <a:spAutoFit/>
+          </a:bodyPr>
+          <a:lstStyle/>
+          <a:p>
+            <a:r>
+              <a:rPr lang="en-US" b="1" dirty="0" smtClean="0"/>
+              <a:t>u</a:t>
+            </a:r>
+            <a:endParaRPr lang="en-US" b="1" dirty="0"/>
           </a:p>
         </p:txBody>
       </p:sp>
       <p:cxnSp>
         <p:nvCxnSpPr>
-          <p:cNvPr id="87" name="Straight Connector 86"/>
+          <p:cNvPr id="47" name="Straight Connector 46"/>
           <p:cNvCxnSpPr>
-            <a:stCxn id="23" idx="4"/>
-            <a:endCxn id="5" idx="0"/>
+            <a:stCxn id="5" idx="6"/>
           </p:cNvCxnSpPr>
           <p:nvPr/>
         </p:nvCxnSpPr>
         <p:spPr>
-          <a:xfrm rot="5400000">
-            <a:off x="3848100" y="3924300"/>
-            <a:ext cx="1752600" cy="152400"/>
+          <a:xfrm flipV="1">
+            <a:off x="3505200" y="2895600"/>
+            <a:ext cx="4267200" cy="457200"/>
           </a:xfrm>
           <a:prstGeom prst="line">
             <a:avLst/>
           </a:prstGeom>
           <a:ln>
             <a:solidFill>
-              <a:srgbClr val="FF0000"/>
+              <a:schemeClr val="tx1"/>
             </a:solidFill>
-            <a:prstDash val="sysDash"/>
+            <a:prstDash val="dash"/>
+          </a:ln>
+        </p:spPr>
+        <p:style>
+          <a:lnRef idx="1">
+            <a:schemeClr val="accent1"/>
+          </a:lnRef>
+          <a:fillRef idx="0">
+            <a:schemeClr val="accent1"/>
+          </a:fillRef>
+          <a:effectRef idx="0">
+            <a:schemeClr val="accent1"/>
+          </a:effectRef>
+          <a:fontRef idx="minor">
+            <a:schemeClr val="tx1"/>
+          </a:fontRef>
+        </p:style>
+      </p:cxnSp>
+      <p:sp>
+        <p:nvSpPr>
+          <p:cNvPr id="50" name="TextBox 49"/>
+          <p:cNvSpPr txBox="1"/>
+          <p:nvPr/>
+        </p:nvSpPr>
+        <p:spPr>
+          <a:xfrm>
+            <a:off x="4267200" y="2971800"/>
+            <a:ext cx="356188" cy="369332"/>
+          </a:xfrm>
+          <a:prstGeom prst="rect">
+            <a:avLst/>
+          </a:prstGeom>
+          <a:noFill/>
+        </p:spPr>
+        <p:txBody>
+          <a:bodyPr wrap="none" rtlCol="0">
+            <a:spAutoFit/>
+          </a:bodyPr>
+          <a:lstStyle/>
+          <a:p>
+            <a:r>
+              <a:rPr lang="en-US" b="1" dirty="0" smtClean="0"/>
+              <a:t>w</a:t>
+            </a:r>
+            <a:endParaRPr lang="en-US" b="1" dirty="0"/>
+          </a:p>
+        </p:txBody>
+      </p:sp>
+      <p:cxnSp>
+        <p:nvCxnSpPr>
+          <p:cNvPr id="51" name="Straight Connector 50"/>
+          <p:cNvCxnSpPr>
+            <a:stCxn id="23" idx="0"/>
+            <a:endCxn id="5" idx="4"/>
+          </p:cNvCxnSpPr>
+          <p:nvPr/>
+        </p:nvCxnSpPr>
+        <p:spPr>
+          <a:xfrm rot="5400000" flipH="1" flipV="1">
+            <a:off x="2546866" y="3701534"/>
+            <a:ext cx="1154668" cy="609600"/>
+          </a:xfrm>
+          <a:prstGeom prst="line">
+            <a:avLst/>
+          </a:prstGeom>
+          <a:ln>
+            <a:solidFill>
+              <a:schemeClr val="tx1"/>
+            </a:solidFill>
+            <a:prstDash val="dash"/>
           </a:ln>
         </p:spPr>
         <p:style>
@@ -5572,25 +5788,26 @@
       </p:cxnSp>
       <p:cxnSp>
         <p:nvCxnSpPr>
-          <p:cNvPr id="89" name="Straight Arrow Connector 88"/>
+          <p:cNvPr id="55" name="Straight Connector 54"/>
           <p:cNvCxnSpPr>
-            <a:stCxn id="5" idx="4"/>
+            <a:stCxn id="24" idx="1"/>
+            <a:endCxn id="5" idx="4"/>
           </p:cNvCxnSpPr>
           <p:nvPr/>
         </p:nvCxnSpPr>
         <p:spPr>
-          <a:xfrm rot="5400000">
-            <a:off x="4152900" y="5448300"/>
-            <a:ext cx="914400" cy="76200"/>
-          </a:xfrm>
-          <a:prstGeom prst="straightConnector1">
-            <a:avLst/>
-          </a:prstGeom>
-          <a:ln w="19050">
+          <a:xfrm rot="16200000" flipV="1">
+            <a:off x="3461266" y="3396734"/>
+            <a:ext cx="799816" cy="864348"/>
+          </a:xfrm>
+          <a:prstGeom prst="line">
+            <a:avLst/>
+          </a:prstGeom>
+          <a:ln>
             <a:solidFill>
-              <a:srgbClr val="FF0000"/>
+              <a:schemeClr val="tx1"/>
             </a:solidFill>
-            <a:tailEnd type="arrow"/>
+            <a:prstDash val="dash"/>
           </a:ln>
         </p:spPr>
         <p:style>
@@ -5610,14 +5827,74 @@
       </p:cxnSp>
       <p:sp>
         <p:nvSpPr>
-          <p:cNvPr id="90" name="TextBox 89"/>
+          <p:cNvPr id="61" name="TextBox 60"/>
           <p:cNvSpPr txBox="1"/>
           <p:nvPr/>
         </p:nvSpPr>
         <p:spPr>
           <a:xfrm>
-            <a:off x="3657600" y="2362200"/>
-            <a:ext cx="239168" cy="369332"/>
+            <a:off x="2971800" y="3657600"/>
+            <a:ext cx="304800" cy="369332"/>
+          </a:xfrm>
+          <a:prstGeom prst="rect">
+            <a:avLst/>
+          </a:prstGeom>
+          <a:noFill/>
+        </p:spPr>
+        <p:txBody>
+          <a:bodyPr wrap="square" rtlCol="0">
+            <a:spAutoFit/>
+          </a:bodyPr>
+          <a:lstStyle/>
+          <a:p>
+            <a:r>
+              <a:rPr lang="en-US" b="1" dirty="0" smtClean="0"/>
+              <a:t>s</a:t>
+            </a:r>
+            <a:endParaRPr lang="en-US" b="1" dirty="0"/>
+          </a:p>
+        </p:txBody>
+      </p:sp>
+      <p:sp>
+        <p:nvSpPr>
+          <p:cNvPr id="62" name="TextBox 61"/>
+          <p:cNvSpPr txBox="1"/>
+          <p:nvPr/>
+        </p:nvSpPr>
+        <p:spPr>
+          <a:xfrm>
+            <a:off x="3886200" y="3593068"/>
+            <a:ext cx="304800" cy="369332"/>
+          </a:xfrm>
+          <a:prstGeom prst="rect">
+            <a:avLst/>
+          </a:prstGeom>
+          <a:noFill/>
+        </p:spPr>
+        <p:txBody>
+          <a:bodyPr wrap="square" rtlCol="0">
+            <a:spAutoFit/>
+          </a:bodyPr>
+          <a:lstStyle/>
+          <a:p>
+            <a:r>
+              <a:rPr lang="en-US" b="1" dirty="0" smtClean="0"/>
+              <a:t>t</a:t>
+            </a:r>
+            <a:endParaRPr lang="en-US" b="1" dirty="0"/>
+          </a:p>
+        </p:txBody>
+      </p:sp>
+      <p:sp>
+        <p:nvSpPr>
+          <p:cNvPr id="77" name="TextBox 76"/>
+          <p:cNvSpPr txBox="1"/>
+          <p:nvPr/>
+        </p:nvSpPr>
+        <p:spPr>
+          <a:xfrm>
+            <a:off x="6821510" y="3581400"/>
+            <a:ext cx="1179490" cy="369332"/>
           </a:xfrm>
           <a:prstGeom prst="rect">
             <a:avLst/>
@@ -5631,254 +5908,12 @@
           <a:lstStyle/>
           <a:p>
             <a:r>
-              <a:rPr lang="es-AR" dirty="0" smtClean="0"/>
-              <a:t>j</a:t>
-            </a:r>
-            <a:endParaRPr lang="en-US" dirty="0"/>
-          </a:p>
-        </p:txBody>
-      </p:sp>
-      <p:sp>
-        <p:nvSpPr>
-          <p:cNvPr id="91" name="TextBox 90"/>
-          <p:cNvSpPr txBox="1"/>
-          <p:nvPr/>
-        </p:nvSpPr>
-        <p:spPr>
-          <a:xfrm>
-            <a:off x="4419600" y="3048000"/>
-            <a:ext cx="290464" cy="369332"/>
-          </a:xfrm>
-          <a:prstGeom prst="rect">
-            <a:avLst/>
-          </a:prstGeom>
-          <a:noFill/>
-        </p:spPr>
-        <p:txBody>
-          <a:bodyPr wrap="none" rtlCol="0">
-            <a:spAutoFit/>
-          </a:bodyPr>
-          <a:lstStyle/>
-          <a:p>
-            <a:r>
               <a:rPr lang="en-US" dirty="0" smtClean="0"/>
-              <a:t>j'</a:t>
-            </a:r>
-            <a:endParaRPr lang="en-US" dirty="0"/>
-          </a:p>
-        </p:txBody>
-      </p:sp>
-      <p:sp>
-        <p:nvSpPr>
-          <p:cNvPr id="92" name="TextBox 91"/>
-          <p:cNvSpPr txBox="1"/>
-          <p:nvPr/>
-        </p:nvSpPr>
-        <p:spPr>
-          <a:xfrm>
-            <a:off x="4648200" y="4953000"/>
-            <a:ext cx="288862" cy="369332"/>
-          </a:xfrm>
-          <a:prstGeom prst="rect">
-            <a:avLst/>
-          </a:prstGeom>
-          <a:noFill/>
-        </p:spPr>
-        <p:txBody>
-          <a:bodyPr wrap="none" rtlCol="0">
-            <a:spAutoFit/>
-          </a:bodyPr>
-          <a:lstStyle/>
-          <a:p>
-            <a:r>
-              <a:rPr lang="es-AR" dirty="0" smtClean="0"/>
-              <a:t>i</a:t>
-            </a:r>
-            <a:r>
-              <a:rPr lang="en-US" dirty="0" smtClean="0"/>
-              <a:t>'</a:t>
-            </a:r>
-            <a:endParaRPr lang="en-US" dirty="0"/>
-          </a:p>
-        </p:txBody>
-      </p:sp>
-      <p:sp>
-        <p:nvSpPr>
-          <p:cNvPr id="93" name="TextBox 92"/>
-          <p:cNvSpPr txBox="1"/>
-          <p:nvPr/>
-        </p:nvSpPr>
-        <p:spPr>
-          <a:xfrm>
-            <a:off x="4505671" y="5879068"/>
-            <a:ext cx="752129" cy="369332"/>
-          </a:xfrm>
-          <a:prstGeom prst="rect">
-            <a:avLst/>
-          </a:prstGeom>
-          <a:noFill/>
-        </p:spPr>
-        <p:txBody>
-          <a:bodyPr wrap="none" rtlCol="0">
-            <a:spAutoFit/>
-          </a:bodyPr>
-          <a:lstStyle/>
-          <a:p>
-            <a:r>
-              <a:rPr lang="es-AR" dirty="0" smtClean="0"/>
-              <a:t>F(i</a:t>
-            </a:r>
-            <a:r>
-              <a:rPr lang="en-US" dirty="0" smtClean="0"/>
-              <a:t>', j')</a:t>
-            </a:r>
-          </a:p>
-        </p:txBody>
-      </p:sp>
-      <p:cxnSp>
-        <p:nvCxnSpPr>
-          <p:cNvPr id="100" name="Straight Arrow Connector 99"/>
-          <p:cNvCxnSpPr>
-            <a:stCxn id="5" idx="1"/>
-          </p:cNvCxnSpPr>
-          <p:nvPr/>
-        </p:nvCxnSpPr>
-        <p:spPr>
-          <a:xfrm rot="16200000" flipV="1">
-            <a:off x="4191000" y="4495800"/>
-            <a:ext cx="403318" cy="403318"/>
-          </a:xfrm>
-          <a:prstGeom prst="straightConnector1">
-            <a:avLst/>
-          </a:prstGeom>
-          <a:ln w="19050">
-            <a:solidFill>
-              <a:srgbClr val="00B050"/>
-            </a:solidFill>
-            <a:tailEnd type="arrow"/>
-          </a:ln>
-        </p:spPr>
-        <p:style>
-          <a:lnRef idx="1">
-            <a:schemeClr val="accent1"/>
-          </a:lnRef>
-          <a:fillRef idx="0">
-            <a:schemeClr val="accent1"/>
-          </a:fillRef>
-          <a:effectRef idx="0">
-            <a:schemeClr val="accent1"/>
-          </a:effectRef>
-          <a:fontRef idx="minor">
-            <a:schemeClr val="tx1"/>
-          </a:fontRef>
-        </p:style>
-      </p:cxnSp>
-      <p:sp>
-        <p:nvSpPr>
-          <p:cNvPr id="102" name="TextBox 101"/>
-          <p:cNvSpPr txBox="1"/>
-          <p:nvPr/>
-        </p:nvSpPr>
-        <p:spPr>
-          <a:xfrm>
-            <a:off x="3810000" y="4202668"/>
-            <a:ext cx="699230" cy="369332"/>
-          </a:xfrm>
-          <a:prstGeom prst="rect">
-            <a:avLst/>
-          </a:prstGeom>
-          <a:noFill/>
-        </p:spPr>
-        <p:txBody>
-          <a:bodyPr wrap="none" rtlCol="0">
-            <a:spAutoFit/>
-          </a:bodyPr>
-          <a:lstStyle/>
-          <a:p>
-            <a:r>
-              <a:rPr lang="es-AR" dirty="0" smtClean="0"/>
-              <a:t>F(i</a:t>
-            </a:r>
-            <a:r>
-              <a:rPr lang="en-US" dirty="0" smtClean="0"/>
-              <a:t>, </a:t>
+              <a:t>Objective </a:t>
             </a:r>
             <a:r>
               <a:rPr lang="en-US" dirty="0" err="1" smtClean="0"/>
               <a:t>i</a:t>
-            </a:r>
-            <a:r>
-              <a:rPr lang="en-US" dirty="0" smtClean="0"/>
-              <a:t>')</a:t>
-            </a:r>
-          </a:p>
-        </p:txBody>
-      </p:sp>
-      <p:cxnSp>
-        <p:nvCxnSpPr>
-          <p:cNvPr id="104" name="Straight Arrow Connector 103"/>
-          <p:cNvCxnSpPr/>
-          <p:nvPr/>
-        </p:nvCxnSpPr>
-        <p:spPr>
-          <a:xfrm rot="-120000" flipV="1">
-            <a:off x="3276600" y="5105400"/>
-            <a:ext cx="533400" cy="76200"/>
-          </a:xfrm>
-          <a:prstGeom prst="straightConnector1">
-            <a:avLst/>
-          </a:prstGeom>
-          <a:ln w="19050">
-            <a:solidFill>
-              <a:schemeClr val="accent6"/>
-            </a:solidFill>
-            <a:tailEnd type="arrow"/>
-          </a:ln>
-        </p:spPr>
-        <p:style>
-          <a:lnRef idx="1">
-            <a:schemeClr val="accent1"/>
-          </a:lnRef>
-          <a:fillRef idx="0">
-            <a:schemeClr val="accent1"/>
-          </a:fillRef>
-          <a:effectRef idx="0">
-            <a:schemeClr val="accent1"/>
-          </a:effectRef>
-          <a:fontRef idx="minor">
-            <a:schemeClr val="tx1"/>
-          </a:fontRef>
-        </p:style>
-      </p:cxnSp>
-      <p:sp>
-        <p:nvSpPr>
-          <p:cNvPr id="109" name="TextBox 108"/>
-          <p:cNvSpPr txBox="1"/>
-          <p:nvPr/>
-        </p:nvSpPr>
-        <p:spPr>
-          <a:xfrm>
-            <a:off x="3352800" y="5105400"/>
-            <a:ext cx="915828" cy="369332"/>
-          </a:xfrm>
-          <a:prstGeom prst="rect">
-            <a:avLst/>
-          </a:prstGeom>
-          <a:noFill/>
-        </p:spPr>
-        <p:txBody>
-          <a:bodyPr wrap="none" rtlCol="0">
-            <a:spAutoFit/>
-          </a:bodyPr>
-          <a:lstStyle/>
-          <a:p>
-            <a:r>
-              <a:rPr lang="es-AR" dirty="0" smtClean="0"/>
-              <a:t>F </a:t>
-            </a:r>
-            <a:r>
-              <a:rPr lang="es-AR" dirty="0" err="1" smtClean="0"/>
-              <a:t>desire</a:t>
             </a:r>
             <a:endParaRPr lang="en-US" dirty="0"/>
           </a:p>
@@ -5911,7 +5946,7 @@
       </p:grpSpPr>
       <p:sp>
         <p:nvSpPr>
-          <p:cNvPr id="14" name="Oval 13"/>
+          <p:cNvPr id="5" name="Oval 4"/>
           <p:cNvSpPr/>
           <p:nvPr/>
         </p:nvSpPr>
@@ -5950,7 +5985,7 @@
       </p:sp>
       <p:sp>
         <p:nvSpPr>
-          <p:cNvPr id="15" name="Oval 14"/>
+          <p:cNvPr id="6" name="Oval 5"/>
           <p:cNvSpPr/>
           <p:nvPr/>
         </p:nvSpPr>
@@ -5987,11 +6022,40 @@
           </a:p>
         </p:txBody>
       </p:sp>
+      <p:sp>
+        <p:nvSpPr>
+          <p:cNvPr id="11" name="TextBox 10"/>
+          <p:cNvSpPr txBox="1"/>
+          <p:nvPr/>
+        </p:nvSpPr>
+        <p:spPr>
+          <a:xfrm>
+            <a:off x="0" y="11668"/>
+            <a:ext cx="3048000" cy="369332"/>
+          </a:xfrm>
+          <a:prstGeom prst="rect">
+            <a:avLst/>
+          </a:prstGeom>
+          <a:noFill/>
+        </p:spPr>
+        <p:txBody>
+          <a:bodyPr wrap="square" rtlCol="0">
+            <a:spAutoFit/>
+          </a:bodyPr>
+          <a:lstStyle/>
+          <a:p>
+            <a:r>
+              <a:rPr lang="en-US" dirty="0" smtClean="0"/>
+              <a:t>pedestrian-top-forces.png</a:t>
+            </a:r>
+          </a:p>
+        </p:txBody>
+      </p:sp>
       <p:cxnSp>
         <p:nvCxnSpPr>
-          <p:cNvPr id="16" name="Straight Connector 15"/>
+          <p:cNvPr id="13" name="Straight Connector 12"/>
           <p:cNvCxnSpPr>
-            <a:endCxn id="14" idx="2"/>
+            <a:endCxn id="5" idx="2"/>
           </p:cNvCxnSpPr>
           <p:nvPr/>
         </p:nvCxnSpPr>
@@ -6027,7 +6091,124 @@
       </p:cxnSp>
       <p:sp>
         <p:nvSpPr>
-          <p:cNvPr id="20" name="TextBox 19"/>
+          <p:cNvPr id="23" name="Oval 22"/>
+          <p:cNvSpPr/>
+          <p:nvPr/>
+        </p:nvSpPr>
+        <p:spPr>
+          <a:xfrm>
+            <a:off x="4724400" y="2971800"/>
+            <a:ext cx="152400" cy="152400"/>
+          </a:xfrm>
+          <a:prstGeom prst="ellipse">
+            <a:avLst/>
+          </a:prstGeom>
+          <a:noFill/>
+        </p:spPr>
+        <p:style>
+          <a:lnRef idx="2">
+            <a:schemeClr val="accent1"/>
+          </a:lnRef>
+          <a:fillRef idx="1">
+            <a:schemeClr val="lt1"/>
+          </a:fillRef>
+          <a:effectRef idx="0">
+            <a:schemeClr val="accent1"/>
+          </a:effectRef>
+          <a:fontRef idx="minor">
+            <a:schemeClr val="dk1"/>
+          </a:fontRef>
+        </p:style>
+        <p:txBody>
+          <a:bodyPr rtlCol="0" anchor="ctr"/>
+          <a:lstStyle/>
+          <a:p>
+            <a:pPr algn="ctr"/>
+            <a:endParaRPr lang="en-US"/>
+          </a:p>
+        </p:txBody>
+      </p:sp>
+      <p:sp>
+        <p:nvSpPr>
+          <p:cNvPr id="24" name="Oval 23"/>
+          <p:cNvSpPr/>
+          <p:nvPr/>
+        </p:nvSpPr>
+        <p:spPr>
+          <a:xfrm>
+            <a:off x="2971800" y="1219200"/>
+            <a:ext cx="1219200" cy="1219200"/>
+          </a:xfrm>
+          <a:prstGeom prst="ellipse">
+            <a:avLst/>
+          </a:prstGeom>
+          <a:noFill/>
+        </p:spPr>
+        <p:style>
+          <a:lnRef idx="2">
+            <a:schemeClr val="accent1"/>
+          </a:lnRef>
+          <a:fillRef idx="1">
+            <a:schemeClr val="lt1"/>
+          </a:fillRef>
+          <a:effectRef idx="0">
+            <a:schemeClr val="accent1"/>
+          </a:effectRef>
+          <a:fontRef idx="minor">
+            <a:schemeClr val="dk1"/>
+          </a:fontRef>
+        </p:style>
+        <p:txBody>
+          <a:bodyPr rtlCol="0" anchor="ctr"/>
+          <a:lstStyle/>
+          <a:p>
+            <a:pPr algn="ctr"/>
+            <a:endParaRPr lang="en-US"/>
+          </a:p>
+        </p:txBody>
+      </p:sp>
+      <p:cxnSp>
+        <p:nvCxnSpPr>
+          <p:cNvPr id="25" name="Straight Connector 24"/>
+          <p:cNvCxnSpPr>
+            <a:stCxn id="24" idx="5"/>
+            <a:endCxn id="23" idx="1"/>
+          </p:cNvCxnSpPr>
+          <p:nvPr/>
+        </p:nvCxnSpPr>
+        <p:spPr>
+          <a:xfrm rot="16200000" flipH="1">
+            <a:off x="4012452" y="2259852"/>
+            <a:ext cx="734266" cy="734266"/>
+          </a:xfrm>
+          <a:prstGeom prst="line">
+            <a:avLst/>
+          </a:prstGeom>
+          <a:ln>
+            <a:solidFill>
+              <a:schemeClr val="tx1"/>
+            </a:solidFill>
+            <a:prstDash val="sysDash"/>
+          </a:ln>
+        </p:spPr>
+        <p:style>
+          <a:lnRef idx="1">
+            <a:schemeClr val="accent1"/>
+          </a:lnRef>
+          <a:fillRef idx="0">
+            <a:schemeClr val="accent1"/>
+          </a:fillRef>
+          <a:effectRef idx="0">
+            <a:schemeClr val="accent1"/>
+          </a:effectRef>
+          <a:fontRef idx="minor">
+            <a:schemeClr val="tx1"/>
+          </a:fontRef>
+        </p:style>
+      </p:cxnSp>
+      <p:sp>
+        <p:nvSpPr>
+          <p:cNvPr id="57" name="TextBox 56"/>
           <p:cNvSpPr txBox="1"/>
           <p:nvPr/>
         </p:nvSpPr>
@@ -6057,13 +6238,13 @@
       </p:sp>
       <p:cxnSp>
         <p:nvCxnSpPr>
-          <p:cNvPr id="21" name="Straight Connector 20"/>
+          <p:cNvPr id="66" name="Straight Connector 65"/>
           <p:cNvCxnSpPr/>
           <p:nvPr/>
         </p:nvCxnSpPr>
         <p:spPr>
           <a:xfrm rot="16200000" flipH="1">
-            <a:off x="4065134" y="1649868"/>
+            <a:off x="4446136" y="1160011"/>
             <a:ext cx="3233055" cy="2828922"/>
           </a:xfrm>
           <a:prstGeom prst="line">
@@ -6093,16 +6274,16 @@
       </p:cxnSp>
       <p:cxnSp>
         <p:nvCxnSpPr>
-          <p:cNvPr id="22" name="Straight Connector 21"/>
+          <p:cNvPr id="79" name="Straight Connector 78"/>
           <p:cNvCxnSpPr>
-            <a:stCxn id="15" idx="7"/>
+            <a:stCxn id="6" idx="7"/>
           </p:cNvCxnSpPr>
           <p:nvPr/>
         </p:nvCxnSpPr>
         <p:spPr>
           <a:xfrm rot="5400000" flipH="1" flipV="1">
-            <a:off x="3222069" y="2695383"/>
-            <a:ext cx="2095216" cy="2343250"/>
+            <a:off x="3244619" y="2291833"/>
+            <a:ext cx="2476216" cy="2769350"/>
           </a:xfrm>
           <a:prstGeom prst="line">
             <a:avLst/>
@@ -6131,13 +6312,13 @@
       </p:cxnSp>
       <p:sp>
         <p:nvSpPr>
-          <p:cNvPr id="23" name="TextBox 22"/>
+          <p:cNvPr id="82" name="TextBox 81"/>
           <p:cNvSpPr txBox="1"/>
           <p:nvPr/>
         </p:nvSpPr>
         <p:spPr>
           <a:xfrm>
-            <a:off x="5486400" y="2590800"/>
+            <a:off x="5715000" y="1828800"/>
             <a:ext cx="1179490" cy="369332"/>
           </a:xfrm>
           <a:prstGeom prst="rect">
@@ -6163,16 +6344,93 @@
           </a:p>
         </p:txBody>
       </p:sp>
-      <p:sp>
-        <p:nvSpPr>
-          <p:cNvPr id="28" name="TextBox 27"/>
+      <p:cxnSp>
+        <p:nvCxnSpPr>
+          <p:cNvPr id="87" name="Straight Connector 86"/>
+          <p:cNvCxnSpPr>
+            <a:stCxn id="23" idx="4"/>
+            <a:endCxn id="5" idx="0"/>
+          </p:cNvCxnSpPr>
+          <p:nvPr/>
+        </p:nvCxnSpPr>
+        <p:spPr>
+          <a:xfrm rot="5400000">
+            <a:off x="3848100" y="3924300"/>
+            <a:ext cx="1752600" cy="152400"/>
+          </a:xfrm>
+          <a:prstGeom prst="line">
+            <a:avLst/>
+          </a:prstGeom>
+          <a:ln>
+            <a:solidFill>
+              <a:srgbClr val="FF0000"/>
+            </a:solidFill>
+            <a:prstDash val="sysDash"/>
+          </a:ln>
+        </p:spPr>
+        <p:style>
+          <a:lnRef idx="1">
+            <a:schemeClr val="accent1"/>
+          </a:lnRef>
+          <a:fillRef idx="0">
+            <a:schemeClr val="accent1"/>
+          </a:fillRef>
+          <a:effectRef idx="0">
+            <a:schemeClr val="accent1"/>
+          </a:effectRef>
+          <a:fontRef idx="minor">
+            <a:schemeClr val="tx1"/>
+          </a:fontRef>
+        </p:style>
+      </p:cxnSp>
+      <p:cxnSp>
+        <p:nvCxnSpPr>
+          <p:cNvPr id="89" name="Straight Arrow Connector 88"/>
+          <p:cNvCxnSpPr>
+            <a:stCxn id="5" idx="4"/>
+          </p:cNvCxnSpPr>
+          <p:nvPr/>
+        </p:nvCxnSpPr>
+        <p:spPr>
+          <a:xfrm rot="5400000">
+            <a:off x="4152900" y="5448300"/>
+            <a:ext cx="914400" cy="76200"/>
+          </a:xfrm>
+          <a:prstGeom prst="straightConnector1">
+            <a:avLst/>
+          </a:prstGeom>
+          <a:ln w="19050">
+            <a:solidFill>
+              <a:srgbClr val="FF0000"/>
+            </a:solidFill>
+            <a:tailEnd type="arrow"/>
+          </a:ln>
+        </p:spPr>
+        <p:style>
+          <a:lnRef idx="1">
+            <a:schemeClr val="accent1"/>
+          </a:lnRef>
+          <a:fillRef idx="0">
+            <a:schemeClr val="accent1"/>
+          </a:fillRef>
+          <a:effectRef idx="0">
+            <a:schemeClr val="accent1"/>
+          </a:effectRef>
+          <a:fontRef idx="minor">
+            <a:schemeClr val="tx1"/>
+          </a:fontRef>
+        </p:style>
+      </p:cxnSp>
+      <p:sp>
+        <p:nvSpPr>
+          <p:cNvPr id="90" name="TextBox 89"/>
           <p:cNvSpPr txBox="1"/>
           <p:nvPr/>
         </p:nvSpPr>
         <p:spPr>
           <a:xfrm>
-            <a:off x="4648200" y="4953000"/>
-            <a:ext cx="288862" cy="369332"/>
+            <a:off x="3657600" y="2362200"/>
+            <a:ext cx="239168" cy="369332"/>
           </a:xfrm>
           <a:prstGeom prst="rect">
             <a:avLst/>
@@ -6187,6 +6445,66 @@
           <a:p>
             <a:r>
               <a:rPr lang="es-AR" dirty="0" smtClean="0"/>
+              <a:t>j</a:t>
+            </a:r>
+            <a:endParaRPr lang="en-US" dirty="0"/>
+          </a:p>
+        </p:txBody>
+      </p:sp>
+      <p:sp>
+        <p:nvSpPr>
+          <p:cNvPr id="91" name="TextBox 90"/>
+          <p:cNvSpPr txBox="1"/>
+          <p:nvPr/>
+        </p:nvSpPr>
+        <p:spPr>
+          <a:xfrm>
+            <a:off x="4419600" y="3048000"/>
+            <a:ext cx="290464" cy="369332"/>
+          </a:xfrm>
+          <a:prstGeom prst="rect">
+            <a:avLst/>
+          </a:prstGeom>
+          <a:noFill/>
+        </p:spPr>
+        <p:txBody>
+          <a:bodyPr wrap="none" rtlCol="0">
+            <a:spAutoFit/>
+          </a:bodyPr>
+          <a:lstStyle/>
+          <a:p>
+            <a:r>
+              <a:rPr lang="en-US" dirty="0" smtClean="0"/>
+              <a:t>j'</a:t>
+            </a:r>
+            <a:endParaRPr lang="en-US" dirty="0"/>
+          </a:p>
+        </p:txBody>
+      </p:sp>
+      <p:sp>
+        <p:nvSpPr>
+          <p:cNvPr id="92" name="TextBox 91"/>
+          <p:cNvSpPr txBox="1"/>
+          <p:nvPr/>
+        </p:nvSpPr>
+        <p:spPr>
+          <a:xfrm>
+            <a:off x="4648200" y="4953000"/>
+            <a:ext cx="288862" cy="369332"/>
+          </a:xfrm>
+          <a:prstGeom prst="rect">
+            <a:avLst/>
+          </a:prstGeom>
+          <a:noFill/>
+        </p:spPr>
+        <p:txBody>
+          <a:bodyPr wrap="none" rtlCol="0">
+            <a:spAutoFit/>
+          </a:bodyPr>
+          <a:lstStyle/>
+          <a:p>
+            <a:r>
+              <a:rPr lang="es-AR" dirty="0" smtClean="0"/>
               <a:t>i</a:t>
             </a:r>
             <a:r>
@@ -6197,16 +6515,51 @@
           </a:p>
         </p:txBody>
       </p:sp>
+      <p:sp>
+        <p:nvSpPr>
+          <p:cNvPr id="93" name="TextBox 92"/>
+          <p:cNvSpPr txBox="1"/>
+          <p:nvPr/>
+        </p:nvSpPr>
+        <p:spPr>
+          <a:xfrm>
+            <a:off x="4505671" y="5879068"/>
+            <a:ext cx="752129" cy="369332"/>
+          </a:xfrm>
+          <a:prstGeom prst="rect">
+            <a:avLst/>
+          </a:prstGeom>
+          <a:noFill/>
+        </p:spPr>
+        <p:txBody>
+          <a:bodyPr wrap="none" rtlCol="0">
+            <a:spAutoFit/>
+          </a:bodyPr>
+          <a:lstStyle/>
+          <a:p>
+            <a:r>
+              <a:rPr lang="es-AR" dirty="0" smtClean="0"/>
+              <a:t>F(i</a:t>
+            </a:r>
+            <a:r>
+              <a:rPr lang="en-US" dirty="0" smtClean="0"/>
+              <a:t>', j')</a:t>
+            </a:r>
+          </a:p>
+        </p:txBody>
+      </p:sp>
       <p:cxnSp>
         <p:nvCxnSpPr>
-          <p:cNvPr id="30" name="Straight Arrow Connector 29"/>
-          <p:cNvCxnSpPr/>
+          <p:cNvPr id="100" name="Straight Arrow Connector 99"/>
+          <p:cNvCxnSpPr>
+            <a:stCxn id="5" idx="1"/>
+          </p:cNvCxnSpPr>
           <p:nvPr/>
         </p:nvCxnSpPr>
         <p:spPr>
-          <a:xfrm rot="5400000" flipH="1" flipV="1">
-            <a:off x="4419600" y="4343400"/>
-            <a:ext cx="838200" cy="381000"/>
+          <a:xfrm rot="16200000" flipV="1">
+            <a:off x="4191000" y="4495800"/>
+            <a:ext cx="403318" cy="403318"/>
           </a:xfrm>
           <a:prstGeom prst="straightConnector1">
             <a:avLst/>
@@ -6235,14 +6588,14 @@
       </p:cxnSp>
       <p:sp>
         <p:nvSpPr>
-          <p:cNvPr id="31" name="TextBox 30"/>
+          <p:cNvPr id="102" name="TextBox 101"/>
           <p:cNvSpPr txBox="1"/>
           <p:nvPr/>
         </p:nvSpPr>
         <p:spPr>
           <a:xfrm>
-            <a:off x="4953000" y="4191000"/>
-            <a:ext cx="615810" cy="369332"/>
+            <a:off x="3810000" y="4202668"/>
+            <a:ext cx="699230" cy="369332"/>
           </a:xfrm>
           <a:prstGeom prst="rect">
             <a:avLst/>
@@ -6257,30 +6610,33 @@
           <a:p>
             <a:r>
               <a:rPr lang="es-AR" dirty="0" smtClean="0"/>
-              <a:t>F</a:t>
+              <a:t>F(i</a:t>
             </a:r>
             <a:r>
               <a:rPr lang="en-US" dirty="0" smtClean="0"/>
-              <a:t>S2 </a:t>
+              <a:t>, </a:t>
             </a:r>
             <a:r>
               <a:rPr lang="en-US" dirty="0" err="1" smtClean="0"/>
               <a:t>i</a:t>
             </a:r>
-            <a:endParaRPr lang="en-US" dirty="0" smtClean="0"/>
+            <a:r>
+              <a:rPr lang="en-US" dirty="0" smtClean="0"/>
+              <a:t>')</a:t>
+            </a:r>
           </a:p>
         </p:txBody>
       </p:sp>
       <p:cxnSp>
         <p:nvCxnSpPr>
-          <p:cNvPr id="32" name="Straight Arrow Connector 31"/>
+          <p:cNvPr id="104" name="Straight Arrow Connector 103"/>
           <p:cNvCxnSpPr/>
           <p:nvPr/>
         </p:nvCxnSpPr>
         <p:spPr>
-          <a:xfrm flipV="1">
-            <a:off x="4648200" y="4836153"/>
-            <a:ext cx="684381" cy="116847"/>
+          <a:xfrm rot="-120000" flipV="1">
+            <a:off x="3276600" y="5105400"/>
+            <a:ext cx="533400" cy="76200"/>
           </a:xfrm>
           <a:prstGeom prst="straightConnector1">
             <a:avLst/>
@@ -6309,14 +6665,14 @@
       </p:cxnSp>
       <p:sp>
         <p:nvSpPr>
-          <p:cNvPr id="33" name="TextBox 32"/>
+          <p:cNvPr id="109" name="TextBox 108"/>
           <p:cNvSpPr txBox="1"/>
           <p:nvPr/>
         </p:nvSpPr>
         <p:spPr>
           <a:xfrm>
-            <a:off x="5105400" y="4876800"/>
-            <a:ext cx="615810" cy="369332"/>
+            <a:off x="3352800" y="5105400"/>
+            <a:ext cx="915828" cy="369332"/>
           </a:xfrm>
           <a:prstGeom prst="rect">
             <a:avLst/>
@@ -6330,43 +6686,14 @@
           <a:lstStyle/>
           <a:p>
             <a:r>
-              <a:rPr lang="en-US" dirty="0" smtClean="0"/>
-              <a:t>FS1 </a:t>
-            </a:r>
-            <a:r>
-              <a:rPr lang="en-US" dirty="0" err="1" smtClean="0"/>
-              <a:t>i</a:t>
+              <a:rPr lang="es-AR" dirty="0" smtClean="0"/>
+              <a:t>F </a:t>
+            </a:r>
+            <a:r>
+              <a:rPr lang="es-AR" dirty="0" err="1" smtClean="0"/>
+              <a:t>desire</a:t>
             </a:r>
             <a:endParaRPr lang="en-US" dirty="0"/>
-          </a:p>
-        </p:txBody>
-      </p:sp>
-      <p:sp>
-        <p:nvSpPr>
-          <p:cNvPr id="48" name="TextBox 47"/>
-          <p:cNvSpPr txBox="1"/>
-          <p:nvPr/>
-        </p:nvSpPr>
-        <p:spPr>
-          <a:xfrm>
-            <a:off x="0" y="11668"/>
-            <a:ext cx="3048000" cy="369332"/>
-          </a:xfrm>
-          <a:prstGeom prst="rect">
-            <a:avLst/>
-          </a:prstGeom>
-          <a:noFill/>
-        </p:spPr>
-        <p:txBody>
-          <a:bodyPr wrap="square" rtlCol="0">
-            <a:spAutoFit/>
-          </a:bodyPr>
-          <a:lstStyle/>
-          <a:p>
-            <a:r>
-              <a:rPr lang="en-US" dirty="0" smtClean="0"/>
-              <a:t>pedestrian-internal-forces.png</a:t>
-            </a:r>
           </a:p>
         </p:txBody>
       </p:sp>
@@ -6397,13 +6724,13 @@
       </p:grpSpPr>
       <p:sp>
         <p:nvSpPr>
-          <p:cNvPr id="5" name="Oval 4"/>
+          <p:cNvPr id="14" name="Oval 13"/>
           <p:cNvSpPr/>
           <p:nvPr/>
         </p:nvSpPr>
         <p:spPr>
           <a:xfrm>
-            <a:off x="3352800" y="3276600"/>
+            <a:off x="5248277" y="4038600"/>
             <a:ext cx="152400" cy="152400"/>
           </a:xfrm>
           <a:prstGeom prst="ellipse">
@@ -6436,13 +6763,13 @@
       </p:sp>
       <p:sp>
         <p:nvSpPr>
-          <p:cNvPr id="6" name="Oval 5"/>
+          <p:cNvPr id="15" name="Oval 14"/>
           <p:cNvSpPr/>
           <p:nvPr/>
         </p:nvSpPr>
         <p:spPr>
           <a:xfrm>
-            <a:off x="1066797" y="2297668"/>
+            <a:off x="2733677" y="3897868"/>
             <a:ext cx="1219200" cy="1219200"/>
           </a:xfrm>
           <a:prstGeom prst="ellipse">
@@ -6473,46 +6800,18 @@
           </a:p>
         </p:txBody>
       </p:sp>
-      <p:sp>
-        <p:nvSpPr>
-          <p:cNvPr id="11" name="TextBox 10"/>
-          <p:cNvSpPr txBox="1"/>
-          <p:nvPr/>
-        </p:nvSpPr>
-        <p:spPr>
-          <a:xfrm>
-            <a:off x="0" y="11668"/>
-            <a:ext cx="3048000" cy="369332"/>
-          </a:xfrm>
-          <a:prstGeom prst="rect">
-            <a:avLst/>
-          </a:prstGeom>
-          <a:noFill/>
-        </p:spPr>
-        <p:txBody>
-          <a:bodyPr wrap="square" rtlCol="0">
-            <a:spAutoFit/>
-          </a:bodyPr>
-          <a:lstStyle/>
-          <a:p>
-            <a:r>
-              <a:rPr lang="en-US" dirty="0" smtClean="0"/>
-              <a:t>geometry.png</a:t>
-            </a:r>
-            <a:endParaRPr lang="en-US" dirty="0" smtClean="0"/>
-          </a:p>
-        </p:txBody>
-      </p:sp>
       <p:cxnSp>
         <p:nvCxnSpPr>
-          <p:cNvPr id="13" name="Straight Connector 12"/>
-          <p:cNvCxnSpPr/>
+          <p:cNvPr id="16" name="Straight Connector 15"/>
+          <p:cNvCxnSpPr>
+            <a:endCxn id="14" idx="2"/>
+          </p:cNvCxnSpPr>
           <p:nvPr/>
         </p:nvCxnSpPr>
         <p:spPr>
-          <a:xfrm>
-            <a:off x="2286000" y="3048000"/>
-            <a:ext cx="1089115" cy="294150"/>
+          <a:xfrm flipV="1">
+            <a:off x="3952877" y="4114800"/>
+            <a:ext cx="1298448" cy="233172"/>
           </a:xfrm>
           <a:prstGeom prst="line">
             <a:avLst/>
@@ -6521,7 +6820,7 @@
             <a:solidFill>
               <a:schemeClr val="tx1"/>
             </a:solidFill>
-            <a:prstDash val="solid"/>
+            <a:prstDash val="sysDash"/>
           </a:ln>
         </p:spPr>
         <p:style>
@@ -6541,130 +6840,13 @@
       </p:cxnSp>
       <p:sp>
         <p:nvSpPr>
-          <p:cNvPr id="23" name="Oval 22"/>
-          <p:cNvSpPr/>
-          <p:nvPr/>
-        </p:nvSpPr>
-        <p:spPr>
-          <a:xfrm>
-            <a:off x="2743200" y="4583668"/>
-            <a:ext cx="152400" cy="152400"/>
-          </a:xfrm>
-          <a:prstGeom prst="ellipse">
-            <a:avLst/>
-          </a:prstGeom>
-          <a:noFill/>
-        </p:spPr>
-        <p:style>
-          <a:lnRef idx="2">
-            <a:schemeClr val="accent1"/>
-          </a:lnRef>
-          <a:fillRef idx="1">
-            <a:schemeClr val="lt1"/>
-          </a:fillRef>
-          <a:effectRef idx="0">
-            <a:schemeClr val="accent1"/>
-          </a:effectRef>
-          <a:fontRef idx="minor">
-            <a:schemeClr val="dk1"/>
-          </a:fontRef>
-        </p:style>
-        <p:txBody>
-          <a:bodyPr rtlCol="0" anchor="ctr"/>
-          <a:lstStyle/>
-          <a:p>
-            <a:pPr algn="ctr"/>
-            <a:endParaRPr lang="en-US"/>
-          </a:p>
-        </p:txBody>
-      </p:sp>
-      <p:sp>
-        <p:nvSpPr>
-          <p:cNvPr id="24" name="Oval 23"/>
-          <p:cNvSpPr/>
-          <p:nvPr/>
-        </p:nvSpPr>
-        <p:spPr>
-          <a:xfrm>
-            <a:off x="4114800" y="4050268"/>
-            <a:ext cx="1219200" cy="1219200"/>
-          </a:xfrm>
-          <a:prstGeom prst="ellipse">
-            <a:avLst/>
-          </a:prstGeom>
-          <a:noFill/>
-        </p:spPr>
-        <p:style>
-          <a:lnRef idx="2">
-            <a:schemeClr val="accent1"/>
-          </a:lnRef>
-          <a:fillRef idx="1">
-            <a:schemeClr val="lt1"/>
-          </a:fillRef>
-          <a:effectRef idx="0">
-            <a:schemeClr val="accent1"/>
-          </a:effectRef>
-          <a:fontRef idx="minor">
-            <a:schemeClr val="dk1"/>
-          </a:fontRef>
-        </p:style>
-        <p:txBody>
-          <a:bodyPr rtlCol="0" anchor="ctr"/>
-          <a:lstStyle/>
-          <a:p>
-            <a:pPr algn="ctr"/>
-            <a:endParaRPr lang="en-US"/>
-          </a:p>
-        </p:txBody>
-      </p:sp>
-      <p:cxnSp>
-        <p:nvCxnSpPr>
-          <p:cNvPr id="25" name="Straight Connector 24"/>
-          <p:cNvCxnSpPr>
-            <a:stCxn id="24" idx="2"/>
-            <a:endCxn id="23" idx="6"/>
-          </p:cNvCxnSpPr>
-          <p:nvPr/>
-        </p:nvCxnSpPr>
-        <p:spPr>
-          <a:xfrm rot="10800000">
-            <a:off x="2895600" y="4659868"/>
-            <a:ext cx="1219200" cy="1588"/>
-          </a:xfrm>
-          <a:prstGeom prst="line">
-            <a:avLst/>
-          </a:prstGeom>
-          <a:ln>
-            <a:solidFill>
-              <a:schemeClr val="tx1"/>
-            </a:solidFill>
-            <a:prstDash val="solid"/>
-          </a:ln>
-        </p:spPr>
-        <p:style>
-          <a:lnRef idx="1">
-            <a:schemeClr val="accent1"/>
-          </a:lnRef>
-          <a:fillRef idx="0">
-            <a:schemeClr val="accent1"/>
-          </a:fillRef>
-          <a:effectRef idx="0">
-            <a:schemeClr val="accent1"/>
-          </a:effectRef>
-          <a:fontRef idx="minor">
-            <a:schemeClr val="tx1"/>
-          </a:fontRef>
-        </p:style>
-      </p:cxnSp>
-      <p:sp>
-        <p:nvSpPr>
-          <p:cNvPr id="57" name="TextBox 56"/>
+          <p:cNvPr id="20" name="TextBox 19"/>
           <p:cNvSpPr txBox="1"/>
           <p:nvPr/>
         </p:nvSpPr>
         <p:spPr>
           <a:xfrm>
-            <a:off x="1563624" y="2743200"/>
+            <a:off x="3800477" y="4888468"/>
             <a:ext cx="237566" cy="369332"/>
           </a:xfrm>
           <a:prstGeom prst="rect">
@@ -6688,14 +6870,14 @@
       </p:sp>
       <p:cxnSp>
         <p:nvCxnSpPr>
-          <p:cNvPr id="66" name="Straight Connector 65"/>
+          <p:cNvPr id="21" name="Straight Connector 20"/>
           <p:cNvCxnSpPr/>
           <p:nvPr/>
         </p:nvCxnSpPr>
         <p:spPr>
           <a:xfrm rot="16200000" flipH="1">
-            <a:off x="7048501" y="3009899"/>
-            <a:ext cx="1447800" cy="2"/>
+            <a:off x="3979411" y="1268867"/>
+            <a:ext cx="3233055" cy="2828922"/>
           </a:xfrm>
           <a:prstGeom prst="line">
             <a:avLst/>
@@ -6724,16 +6906,16 @@
       </p:cxnSp>
       <p:cxnSp>
         <p:nvCxnSpPr>
-          <p:cNvPr id="79" name="Straight Connector 78"/>
+          <p:cNvPr id="22" name="Straight Connector 21"/>
           <p:cNvCxnSpPr>
-            <a:stCxn id="6" idx="6"/>
+            <a:stCxn id="15" idx="7"/>
           </p:cNvCxnSpPr>
           <p:nvPr/>
         </p:nvCxnSpPr>
         <p:spPr>
-          <a:xfrm>
-            <a:off x="2285997" y="2907268"/>
-            <a:ext cx="5486400" cy="1588"/>
+          <a:xfrm rot="5400000" flipH="1" flipV="1">
+            <a:off x="3864437" y="2463976"/>
+            <a:ext cx="1522333" cy="1702548"/>
           </a:xfrm>
           <a:prstGeom prst="line">
             <a:avLst/>
@@ -6762,13 +6944,13 @@
       </p:cxnSp>
       <p:sp>
         <p:nvSpPr>
-          <p:cNvPr id="82" name="TextBox 81"/>
+          <p:cNvPr id="23" name="TextBox 22"/>
           <p:cNvSpPr txBox="1"/>
           <p:nvPr/>
         </p:nvSpPr>
         <p:spPr>
           <a:xfrm>
-            <a:off x="7542106" y="2602468"/>
+            <a:off x="5170383" y="2362200"/>
             <a:ext cx="306494" cy="369332"/>
           </a:xfrm>
           <a:prstGeom prst="rect">
@@ -6792,14 +6974,14 @@
       </p:sp>
       <p:sp>
         <p:nvSpPr>
-          <p:cNvPr id="90" name="TextBox 89"/>
+          <p:cNvPr id="28" name="TextBox 27"/>
           <p:cNvSpPr txBox="1"/>
           <p:nvPr/>
         </p:nvSpPr>
         <p:spPr>
           <a:xfrm>
-            <a:off x="4617720" y="4480560"/>
-            <a:ext cx="239168" cy="369332"/>
+            <a:off x="5324477" y="4114800"/>
+            <a:ext cx="288862" cy="369332"/>
           </a:xfrm>
           <a:prstGeom prst="rect">
             <a:avLst/>
@@ -6814,66 +6996,6 @@
           <a:p>
             <a:r>
               <a:rPr lang="es-AR" dirty="0" smtClean="0"/>
-              <a:t>j</a:t>
-            </a:r>
-            <a:endParaRPr lang="en-US" dirty="0"/>
-          </a:p>
-        </p:txBody>
-      </p:sp>
-      <p:sp>
-        <p:nvSpPr>
-          <p:cNvPr id="91" name="TextBox 90"/>
-          <p:cNvSpPr txBox="1"/>
-          <p:nvPr/>
-        </p:nvSpPr>
-        <p:spPr>
-          <a:xfrm>
-            <a:off x="2819400" y="4659868"/>
-            <a:ext cx="290464" cy="369332"/>
-          </a:xfrm>
-          <a:prstGeom prst="rect">
-            <a:avLst/>
-          </a:prstGeom>
-          <a:noFill/>
-        </p:spPr>
-        <p:txBody>
-          <a:bodyPr wrap="none" rtlCol="0">
-            <a:spAutoFit/>
-          </a:bodyPr>
-          <a:lstStyle/>
-          <a:p>
-            <a:r>
-              <a:rPr lang="en-US" dirty="0" smtClean="0"/>
-              <a:t>j'</a:t>
-            </a:r>
-            <a:endParaRPr lang="en-US" dirty="0"/>
-          </a:p>
-        </p:txBody>
-      </p:sp>
-      <p:sp>
-        <p:nvSpPr>
-          <p:cNvPr id="92" name="TextBox 91"/>
-          <p:cNvSpPr txBox="1"/>
-          <p:nvPr/>
-        </p:nvSpPr>
-        <p:spPr>
-          <a:xfrm>
-            <a:off x="3444938" y="3212068"/>
-            <a:ext cx="288862" cy="369332"/>
-          </a:xfrm>
-          <a:prstGeom prst="rect">
-            <a:avLst/>
-          </a:prstGeom>
-          <a:noFill/>
-        </p:spPr>
-        <p:txBody>
-          <a:bodyPr wrap="none" rtlCol="0">
-            <a:spAutoFit/>
-          </a:bodyPr>
-          <a:lstStyle/>
-          <a:p>
-            <a:r>
-              <a:rPr lang="es-AR" dirty="0" smtClean="0"/>
               <a:t>i</a:t>
             </a:r>
             <a:r>
@@ -6884,87 +7006,25 @@
           </a:p>
         </p:txBody>
       </p:sp>
-      <p:sp>
-        <p:nvSpPr>
-          <p:cNvPr id="45" name="TextBox 44"/>
-          <p:cNvSpPr txBox="1"/>
-          <p:nvPr/>
-        </p:nvSpPr>
-        <p:spPr>
-          <a:xfrm>
-            <a:off x="2895600" y="2971800"/>
-            <a:ext cx="304800" cy="369332"/>
-          </a:xfrm>
-          <a:prstGeom prst="rect">
-            <a:avLst/>
-          </a:prstGeom>
-          <a:noFill/>
-        </p:spPr>
-        <p:txBody>
-          <a:bodyPr wrap="square" rtlCol="0">
-            <a:spAutoFit/>
-          </a:bodyPr>
-          <a:lstStyle/>
-          <a:p>
-            <a:r>
-              <a:rPr lang="en-US" b="1" dirty="0" smtClean="0"/>
-              <a:t>r</a:t>
-            </a:r>
-            <a:endParaRPr lang="en-US" b="1" dirty="0"/>
-          </a:p>
-        </p:txBody>
-      </p:sp>
-      <p:sp>
-        <p:nvSpPr>
-          <p:cNvPr id="46" name="TextBox 45"/>
-          <p:cNvSpPr txBox="1"/>
-          <p:nvPr/>
-        </p:nvSpPr>
-        <p:spPr>
-          <a:xfrm>
-            <a:off x="4114800" y="2590800"/>
-            <a:ext cx="306494" cy="369332"/>
-          </a:xfrm>
-          <a:prstGeom prst="rect">
-            <a:avLst/>
-          </a:prstGeom>
-          <a:noFill/>
-        </p:spPr>
-        <p:txBody>
-          <a:bodyPr wrap="none" rtlCol="0">
-            <a:spAutoFit/>
-          </a:bodyPr>
-          <a:lstStyle/>
-          <a:p>
-            <a:r>
-              <a:rPr lang="en-US" b="1" dirty="0" smtClean="0"/>
-              <a:t>u</a:t>
-            </a:r>
-            <a:endParaRPr lang="en-US" b="1" dirty="0"/>
-          </a:p>
-        </p:txBody>
-      </p:sp>
       <p:cxnSp>
         <p:nvCxnSpPr>
-          <p:cNvPr id="47" name="Straight Connector 46"/>
-          <p:cNvCxnSpPr>
-            <a:stCxn id="5" idx="6"/>
-          </p:cNvCxnSpPr>
+          <p:cNvPr id="30" name="Straight Arrow Connector 29"/>
+          <p:cNvCxnSpPr/>
           <p:nvPr/>
         </p:nvCxnSpPr>
         <p:spPr>
-          <a:xfrm flipV="1">
-            <a:off x="3505200" y="2895600"/>
-            <a:ext cx="4267200" cy="457200"/>
-          </a:xfrm>
-          <a:prstGeom prst="line">
-            <a:avLst/>
-          </a:prstGeom>
-          <a:ln>
+          <a:xfrm rot="10800000">
+            <a:off x="4714877" y="3733800"/>
+            <a:ext cx="609600" cy="381000"/>
+          </a:xfrm>
+          <a:prstGeom prst="straightConnector1">
+            <a:avLst/>
+          </a:prstGeom>
+          <a:ln w="19050">
             <a:solidFill>
-              <a:schemeClr val="tx1"/>
+              <a:srgbClr val="00B050"/>
             </a:solidFill>
-            <a:prstDash val="dash"/>
+            <a:tailEnd type="arrow"/>
           </a:ln>
         </p:spPr>
         <p:style>
@@ -6984,14 +7044,14 @@
       </p:cxnSp>
       <p:sp>
         <p:nvSpPr>
-          <p:cNvPr id="50" name="TextBox 49"/>
+          <p:cNvPr id="31" name="TextBox 30"/>
           <p:cNvSpPr txBox="1"/>
           <p:nvPr/>
         </p:nvSpPr>
         <p:spPr>
           <a:xfrm>
-            <a:off x="4267200" y="2971800"/>
-            <a:ext cx="356188" cy="369332"/>
+            <a:off x="4747789" y="3516868"/>
+            <a:ext cx="510011" cy="369332"/>
           </a:xfrm>
           <a:prstGeom prst="rect">
             <a:avLst/>
@@ -7005,35 +7065,36 @@
           <a:lstStyle/>
           <a:p>
             <a:r>
-              <a:rPr lang="en-US" b="1" dirty="0" smtClean="0"/>
-              <a:t>w</a:t>
-            </a:r>
-            <a:endParaRPr lang="en-US" b="1" dirty="0"/>
+              <a:rPr lang="es-AR" dirty="0" smtClean="0"/>
+              <a:t>F</a:t>
+            </a:r>
+            <a:r>
+              <a:rPr lang="en-US" dirty="0" smtClean="0"/>
+              <a:t>S1</a:t>
+            </a:r>
+            <a:endParaRPr lang="en-US" dirty="0" smtClean="0"/>
           </a:p>
         </p:txBody>
       </p:sp>
       <p:cxnSp>
         <p:nvCxnSpPr>
-          <p:cNvPr id="51" name="Straight Connector 50"/>
-          <p:cNvCxnSpPr>
-            <a:stCxn id="23" idx="0"/>
-            <a:endCxn id="5" idx="4"/>
-          </p:cNvCxnSpPr>
+          <p:cNvPr id="32" name="Straight Arrow Connector 31"/>
+          <p:cNvCxnSpPr/>
           <p:nvPr/>
         </p:nvCxnSpPr>
         <p:spPr>
-          <a:xfrm rot="5400000" flipH="1" flipV="1">
-            <a:off x="2546866" y="3701534"/>
-            <a:ext cx="1154668" cy="609600"/>
-          </a:xfrm>
-          <a:prstGeom prst="line">
-            <a:avLst/>
-          </a:prstGeom>
-          <a:ln>
+          <a:xfrm rot="10800000" flipV="1">
+            <a:off x="4800601" y="4114800"/>
+            <a:ext cx="523877" cy="76199"/>
+          </a:xfrm>
+          <a:prstGeom prst="straightConnector1">
+            <a:avLst/>
+          </a:prstGeom>
+          <a:ln w="19050">
             <a:solidFill>
-              <a:schemeClr val="tx1"/>
+              <a:schemeClr val="accent6"/>
             </a:solidFill>
-            <a:prstDash val="dash"/>
+            <a:tailEnd type="arrow"/>
           </a:ln>
         </p:spPr>
         <p:style>
@@ -7051,39 +7112,143 @@
           </a:fontRef>
         </p:style>
       </p:cxnSp>
+      <p:sp>
+        <p:nvSpPr>
+          <p:cNvPr id="33" name="TextBox 32"/>
+          <p:cNvSpPr txBox="1"/>
+          <p:nvPr/>
+        </p:nvSpPr>
+        <p:spPr>
+          <a:xfrm>
+            <a:off x="4648200" y="4126468"/>
+            <a:ext cx="510011" cy="369332"/>
+          </a:xfrm>
+          <a:prstGeom prst="rect">
+            <a:avLst/>
+          </a:prstGeom>
+          <a:noFill/>
+        </p:spPr>
+        <p:txBody>
+          <a:bodyPr wrap="none" rtlCol="0">
+            <a:spAutoFit/>
+          </a:bodyPr>
+          <a:lstStyle/>
+          <a:p>
+            <a:r>
+              <a:rPr lang="en-US" dirty="0" smtClean="0"/>
+              <a:t>FS2</a:t>
+            </a:r>
+            <a:endParaRPr lang="en-US" dirty="0"/>
+          </a:p>
+        </p:txBody>
+      </p:sp>
+      <p:sp>
+        <p:nvSpPr>
+          <p:cNvPr id="48" name="TextBox 47"/>
+          <p:cNvSpPr txBox="1"/>
+          <p:nvPr/>
+        </p:nvSpPr>
+        <p:spPr>
+          <a:xfrm>
+            <a:off x="0" y="11668"/>
+            <a:ext cx="3048000" cy="369332"/>
+          </a:xfrm>
+          <a:prstGeom prst="rect">
+            <a:avLst/>
+          </a:prstGeom>
+          <a:noFill/>
+        </p:spPr>
+        <p:txBody>
+          <a:bodyPr wrap="square" rtlCol="0">
+            <a:spAutoFit/>
+          </a:bodyPr>
+          <a:lstStyle/>
+          <a:p>
+            <a:r>
+              <a:rPr lang="en-US" dirty="0" smtClean="0"/>
+              <a:t>pedestrian-internal-forces.png</a:t>
+            </a:r>
+          </a:p>
+        </p:txBody>
+      </p:sp>
+      <p:sp>
+        <p:nvSpPr>
+          <p:cNvPr id="18" name="Oval 17"/>
+          <p:cNvSpPr/>
+          <p:nvPr/>
+        </p:nvSpPr>
+        <p:spPr>
+          <a:xfrm>
+            <a:off x="1971677" y="3124200"/>
+            <a:ext cx="2743200" cy="2743200"/>
+          </a:xfrm>
+          <a:prstGeom prst="ellipse">
+            <a:avLst/>
+          </a:prstGeom>
+          <a:noFill/>
+          <a:ln w="12700">
+            <a:solidFill>
+              <a:schemeClr val="bg1">
+                <a:lumMod val="65000"/>
+              </a:schemeClr>
+            </a:solidFill>
+            <a:prstDash val="lgDash"/>
+          </a:ln>
+        </p:spPr>
+        <p:style>
+          <a:lnRef idx="2">
+            <a:schemeClr val="accent1"/>
+          </a:lnRef>
+          <a:fillRef idx="1">
+            <a:schemeClr val="lt1"/>
+          </a:fillRef>
+          <a:effectRef idx="0">
+            <a:schemeClr val="accent1"/>
+          </a:effectRef>
+          <a:fontRef idx="minor">
+            <a:schemeClr val="dk1"/>
+          </a:fontRef>
+        </p:style>
+        <p:txBody>
+          <a:bodyPr rtlCol="0" anchor="ctr"/>
+          <a:lstStyle/>
+          <a:p>
+            <a:pPr algn="ctr"/>
+            <a:endParaRPr lang="en-US"/>
+          </a:p>
+        </p:txBody>
+      </p:sp>
       <p:cxnSp>
         <p:nvCxnSpPr>
-          <p:cNvPr id="55" name="Straight Connector 54"/>
+          <p:cNvPr id="39" name="Straight Arrow Connector 38"/>
           <p:cNvCxnSpPr>
-            <a:stCxn id="24" idx="1"/>
-            <a:endCxn id="5" idx="4"/>
+            <a:stCxn id="15" idx="2"/>
+            <a:endCxn id="18" idx="2"/>
           </p:cNvCxnSpPr>
           <p:nvPr/>
         </p:nvCxnSpPr>
         <p:spPr>
-          <a:xfrm rot="16200000" flipV="1">
-            <a:off x="3461266" y="3396734"/>
-            <a:ext cx="799816" cy="864348"/>
-          </a:xfrm>
-          <a:prstGeom prst="line">
+          <a:xfrm rot="10800000">
+            <a:off x="1971677" y="4495800"/>
+            <a:ext cx="762000" cy="11668"/>
+          </a:xfrm>
+          <a:prstGeom prst="straightConnector1">
             <a:avLst/>
           </a:prstGeom>
           <a:ln>
-            <a:solidFill>
-              <a:schemeClr val="tx1"/>
-            </a:solidFill>
-            <a:prstDash val="dash"/>
+            <a:headEnd type="arrow"/>
+            <a:tailEnd type="arrow"/>
           </a:ln>
         </p:spPr>
         <p:style>
           <a:lnRef idx="1">
-            <a:schemeClr val="accent1"/>
+            <a:schemeClr val="dk1"/>
           </a:lnRef>
           <a:fillRef idx="0">
-            <a:schemeClr val="accent1"/>
+            <a:schemeClr val="dk1"/>
           </a:fillRef>
           <a:effectRef idx="0">
-            <a:schemeClr val="accent1"/>
+            <a:schemeClr val="dk1"/>
           </a:effectRef>
           <a:fontRef idx="minor">
             <a:schemeClr val="tx1"/>
@@ -7092,74 +7257,14 @@
       </p:cxnSp>
       <p:sp>
         <p:nvSpPr>
-          <p:cNvPr id="61" name="TextBox 60"/>
+          <p:cNvPr id="41" name="TextBox 40"/>
           <p:cNvSpPr txBox="1"/>
           <p:nvPr/>
         </p:nvSpPr>
         <p:spPr>
           <a:xfrm>
-            <a:off x="2971800" y="3657600"/>
-            <a:ext cx="304800" cy="369332"/>
-          </a:xfrm>
-          <a:prstGeom prst="rect">
-            <a:avLst/>
-          </a:prstGeom>
-          <a:noFill/>
-        </p:spPr>
-        <p:txBody>
-          <a:bodyPr wrap="square" rtlCol="0">
-            <a:spAutoFit/>
-          </a:bodyPr>
-          <a:lstStyle/>
-          <a:p>
-            <a:r>
-              <a:rPr lang="en-US" b="1" dirty="0" smtClean="0"/>
-              <a:t>s</a:t>
-            </a:r>
-            <a:endParaRPr lang="en-US" b="1" dirty="0"/>
-          </a:p>
-        </p:txBody>
-      </p:sp>
-      <p:sp>
-        <p:nvSpPr>
-          <p:cNvPr id="62" name="TextBox 61"/>
-          <p:cNvSpPr txBox="1"/>
-          <p:nvPr/>
-        </p:nvSpPr>
-        <p:spPr>
-          <a:xfrm>
-            <a:off x="3886200" y="3593068"/>
-            <a:ext cx="304800" cy="369332"/>
-          </a:xfrm>
-          <a:prstGeom prst="rect">
-            <a:avLst/>
-          </a:prstGeom>
-          <a:noFill/>
-        </p:spPr>
-        <p:txBody>
-          <a:bodyPr wrap="square" rtlCol="0">
-            <a:spAutoFit/>
-          </a:bodyPr>
-          <a:lstStyle/>
-          <a:p>
-            <a:r>
-              <a:rPr lang="en-US" b="1" dirty="0" smtClean="0"/>
-              <a:t>t</a:t>
-            </a:r>
-            <a:endParaRPr lang="en-US" b="1" dirty="0"/>
-          </a:p>
-        </p:txBody>
-      </p:sp>
-      <p:sp>
-        <p:nvSpPr>
-          <p:cNvPr id="77" name="TextBox 76"/>
-          <p:cNvSpPr txBox="1"/>
-          <p:nvPr/>
-        </p:nvSpPr>
-        <p:spPr>
-          <a:xfrm>
-            <a:off x="6821510" y="3581400"/>
-            <a:ext cx="1179490" cy="369332"/>
+            <a:off x="2133600" y="4191000"/>
+            <a:ext cx="407484" cy="323165"/>
           </a:xfrm>
           <a:prstGeom prst="rect">
             <a:avLst/>
@@ -7173,14 +7278,10 @@
           <a:lstStyle/>
           <a:p>
             <a:r>
-              <a:rPr lang="en-US" dirty="0" smtClean="0"/>
-              <a:t>Objective </a:t>
-            </a:r>
-            <a:r>
-              <a:rPr lang="en-US" dirty="0" err="1" smtClean="0"/>
-              <a:t>i</a:t>
-            </a:r>
-            <a:endParaRPr lang="en-US" dirty="0"/>
+              <a:rPr lang="en-US" sz="1500" dirty="0" smtClean="0"/>
+              <a:t>RD</a:t>
+            </a:r>
+            <a:endParaRPr lang="en-US" sz="1500" dirty="0"/>
           </a:p>
         </p:txBody>
       </p:sp>

</xml_diff>

<commit_message>
arreglo error en el largo del vector RD en archivo pedestrain-internal-forces
</commit_message>
<xml_diff>
--- a/doc/informe/pictures.pptx
+++ b/doc/informe/pictures.pptx
@@ -199,7 +199,7 @@
             <a:fld id="{845A57F8-9FFB-4742-8CFD-3414C37FBF35}" type="datetimeFigureOut">
               <a:rPr lang="en-US" smtClean="0"/>
               <a:pPr/>
-              <a:t>11/12/2014</a:t>
+              <a:t>05/2/2015</a:t>
             </a:fld>
             <a:endParaRPr lang="en-US"/>
           </a:p>
@@ -975,7 +975,7 @@
             <a:fld id="{0BF94AD7-59A1-45F9-ACA2-67E78D40517C}" type="datetimeFigureOut">
               <a:rPr lang="en-US" smtClean="0"/>
               <a:pPr/>
-              <a:t>11/12/2014</a:t>
+              <a:t>05/2/2015</a:t>
             </a:fld>
             <a:endParaRPr lang="en-US"/>
           </a:p>
@@ -1142,7 +1142,7 @@
             <a:fld id="{0BF94AD7-59A1-45F9-ACA2-67E78D40517C}" type="datetimeFigureOut">
               <a:rPr lang="en-US" smtClean="0"/>
               <a:pPr/>
-              <a:t>11/12/2014</a:t>
+              <a:t>05/2/2015</a:t>
             </a:fld>
             <a:endParaRPr lang="en-US"/>
           </a:p>
@@ -1319,7 +1319,7 @@
             <a:fld id="{0BF94AD7-59A1-45F9-ACA2-67E78D40517C}" type="datetimeFigureOut">
               <a:rPr lang="en-US" smtClean="0"/>
               <a:pPr/>
-              <a:t>11/12/2014</a:t>
+              <a:t>05/2/2015</a:t>
             </a:fld>
             <a:endParaRPr lang="en-US"/>
           </a:p>
@@ -1486,7 +1486,7 @@
             <a:fld id="{0BF94AD7-59A1-45F9-ACA2-67E78D40517C}" type="datetimeFigureOut">
               <a:rPr lang="en-US" smtClean="0"/>
               <a:pPr/>
-              <a:t>11/12/2014</a:t>
+              <a:t>05/2/2015</a:t>
             </a:fld>
             <a:endParaRPr lang="en-US"/>
           </a:p>
@@ -1729,7 +1729,7 @@
             <a:fld id="{0BF94AD7-59A1-45F9-ACA2-67E78D40517C}" type="datetimeFigureOut">
               <a:rPr lang="en-US" smtClean="0"/>
               <a:pPr/>
-              <a:t>11/12/2014</a:t>
+              <a:t>05/2/2015</a:t>
             </a:fld>
             <a:endParaRPr lang="en-US"/>
           </a:p>
@@ -2014,7 +2014,7 @@
             <a:fld id="{0BF94AD7-59A1-45F9-ACA2-67E78D40517C}" type="datetimeFigureOut">
               <a:rPr lang="en-US" smtClean="0"/>
               <a:pPr/>
-              <a:t>11/12/2014</a:t>
+              <a:t>05/2/2015</a:t>
             </a:fld>
             <a:endParaRPr lang="en-US"/>
           </a:p>
@@ -2433,7 +2433,7 @@
             <a:fld id="{0BF94AD7-59A1-45F9-ACA2-67E78D40517C}" type="datetimeFigureOut">
               <a:rPr lang="en-US" smtClean="0"/>
               <a:pPr/>
-              <a:t>11/12/2014</a:t>
+              <a:t>05/2/2015</a:t>
             </a:fld>
             <a:endParaRPr lang="en-US"/>
           </a:p>
@@ -2548,7 +2548,7 @@
             <a:fld id="{0BF94AD7-59A1-45F9-ACA2-67E78D40517C}" type="datetimeFigureOut">
               <a:rPr lang="en-US" smtClean="0"/>
               <a:pPr/>
-              <a:t>11/12/2014</a:t>
+              <a:t>05/2/2015</a:t>
             </a:fld>
             <a:endParaRPr lang="en-US"/>
           </a:p>
@@ -2640,7 +2640,7 @@
             <a:fld id="{0BF94AD7-59A1-45F9-ACA2-67E78D40517C}" type="datetimeFigureOut">
               <a:rPr lang="en-US" smtClean="0"/>
               <a:pPr/>
-              <a:t>11/12/2014</a:t>
+              <a:t>05/2/2015</a:t>
             </a:fld>
             <a:endParaRPr lang="en-US"/>
           </a:p>
@@ -2914,7 +2914,7 @@
             <a:fld id="{0BF94AD7-59A1-45F9-ACA2-67E78D40517C}" type="datetimeFigureOut">
               <a:rPr lang="en-US" smtClean="0"/>
               <a:pPr/>
-              <a:t>11/12/2014</a:t>
+              <a:t>05/2/2015</a:t>
             </a:fld>
             <a:endParaRPr lang="en-US"/>
           </a:p>
@@ -3164,7 +3164,7 @@
             <a:fld id="{0BF94AD7-59A1-45F9-ACA2-67E78D40517C}" type="datetimeFigureOut">
               <a:rPr lang="en-US" smtClean="0"/>
               <a:pPr/>
-              <a:t>11/12/2014</a:t>
+              <a:t>05/2/2015</a:t>
             </a:fld>
             <a:endParaRPr lang="en-US"/>
           </a:p>
@@ -3374,7 +3374,7 @@
             <a:fld id="{0BF94AD7-59A1-45F9-ACA2-67E78D40517C}" type="datetimeFigureOut">
               <a:rPr lang="en-US" smtClean="0"/>
               <a:pPr/>
-              <a:t>11/12/2014</a:t>
+              <a:t>05/2/2015</a:t>
             </a:fld>
             <a:endParaRPr lang="en-US"/>
           </a:p>
@@ -7072,7 +7072,6 @@
               <a:rPr lang="en-US" dirty="0" smtClean="0"/>
               <a:t>S1</a:t>
             </a:r>
-            <a:endParaRPr lang="en-US" dirty="0" smtClean="0"/>
           </a:p>
         </p:txBody>
       </p:sp>
@@ -7222,15 +7221,14 @@
         <p:nvCxnSpPr>
           <p:cNvPr id="39" name="Straight Arrow Connector 38"/>
           <p:cNvCxnSpPr>
-            <a:stCxn id="15" idx="2"/>
             <a:endCxn id="18" idx="2"/>
           </p:cNvCxnSpPr>
           <p:nvPr/>
         </p:nvCxnSpPr>
         <p:spPr>
           <a:xfrm rot="10800000">
-            <a:off x="1971677" y="4495800"/>
-            <a:ext cx="762000" cy="11668"/>
+            <a:off x="1971678" y="4495800"/>
+            <a:ext cx="1381123" cy="21148"/>
           </a:xfrm>
           <a:prstGeom prst="straightConnector1">
             <a:avLst/>

</xml_diff>

<commit_message>
la imgen habia quedado con un text superponiendose
</commit_message>
<xml_diff>
--- a/doc/informe/pictures.pptx
+++ b/doc/informe/pictures.pptx
@@ -7070,7 +7070,7 @@
             </a:r>
             <a:r>
               <a:rPr lang="en-US" dirty="0" smtClean="0"/>
-              <a:t>S1</a:t>
+              <a:t>S2</a:t>
             </a:r>
           </a:p>
         </p:txBody>
@@ -7135,7 +7135,7 @@
           <a:p>
             <a:r>
               <a:rPr lang="en-US" dirty="0" smtClean="0"/>
-              <a:t>FS2</a:t>
+              <a:t>FS1</a:t>
             </a:r>
             <a:endParaRPr lang="en-US" dirty="0"/>
           </a:p>

</xml_diff>

<commit_message>
todos los pedstrians ahora tienen un sold color en vez de circulos sin color.
</commit_message>
<xml_diff>
--- a/doc/informe/pictures.pptx
+++ b/doc/informe/pictures.pptx
@@ -199,7 +199,7 @@
             <a:fld id="{845A57F8-9FFB-4742-8CFD-3414C37FBF35}" type="datetimeFigureOut">
               <a:rPr lang="en-US" smtClean="0"/>
               <a:pPr/>
-              <a:t>05/2/2015</a:t>
+              <a:t>15/2/2015</a:t>
             </a:fld>
             <a:endParaRPr lang="en-US"/>
           </a:p>
@@ -975,7 +975,7 @@
             <a:fld id="{0BF94AD7-59A1-45F9-ACA2-67E78D40517C}" type="datetimeFigureOut">
               <a:rPr lang="en-US" smtClean="0"/>
               <a:pPr/>
-              <a:t>05/2/2015</a:t>
+              <a:t>15/2/2015</a:t>
             </a:fld>
             <a:endParaRPr lang="en-US"/>
           </a:p>
@@ -1142,7 +1142,7 @@
             <a:fld id="{0BF94AD7-59A1-45F9-ACA2-67E78D40517C}" type="datetimeFigureOut">
               <a:rPr lang="en-US" smtClean="0"/>
               <a:pPr/>
-              <a:t>05/2/2015</a:t>
+              <a:t>15/2/2015</a:t>
             </a:fld>
             <a:endParaRPr lang="en-US"/>
           </a:p>
@@ -1319,7 +1319,7 @@
             <a:fld id="{0BF94AD7-59A1-45F9-ACA2-67E78D40517C}" type="datetimeFigureOut">
               <a:rPr lang="en-US" smtClean="0"/>
               <a:pPr/>
-              <a:t>05/2/2015</a:t>
+              <a:t>15/2/2015</a:t>
             </a:fld>
             <a:endParaRPr lang="en-US"/>
           </a:p>
@@ -1486,7 +1486,7 @@
             <a:fld id="{0BF94AD7-59A1-45F9-ACA2-67E78D40517C}" type="datetimeFigureOut">
               <a:rPr lang="en-US" smtClean="0"/>
               <a:pPr/>
-              <a:t>05/2/2015</a:t>
+              <a:t>15/2/2015</a:t>
             </a:fld>
             <a:endParaRPr lang="en-US"/>
           </a:p>
@@ -1729,7 +1729,7 @@
             <a:fld id="{0BF94AD7-59A1-45F9-ACA2-67E78D40517C}" type="datetimeFigureOut">
               <a:rPr lang="en-US" smtClean="0"/>
               <a:pPr/>
-              <a:t>05/2/2015</a:t>
+              <a:t>15/2/2015</a:t>
             </a:fld>
             <a:endParaRPr lang="en-US"/>
           </a:p>
@@ -2014,7 +2014,7 @@
             <a:fld id="{0BF94AD7-59A1-45F9-ACA2-67E78D40517C}" type="datetimeFigureOut">
               <a:rPr lang="en-US" smtClean="0"/>
               <a:pPr/>
-              <a:t>05/2/2015</a:t>
+              <a:t>15/2/2015</a:t>
             </a:fld>
             <a:endParaRPr lang="en-US"/>
           </a:p>
@@ -2433,7 +2433,7 @@
             <a:fld id="{0BF94AD7-59A1-45F9-ACA2-67E78D40517C}" type="datetimeFigureOut">
               <a:rPr lang="en-US" smtClean="0"/>
               <a:pPr/>
-              <a:t>05/2/2015</a:t>
+              <a:t>15/2/2015</a:t>
             </a:fld>
             <a:endParaRPr lang="en-US"/>
           </a:p>
@@ -2548,7 +2548,7 @@
             <a:fld id="{0BF94AD7-59A1-45F9-ACA2-67E78D40517C}" type="datetimeFigureOut">
               <a:rPr lang="en-US" smtClean="0"/>
               <a:pPr/>
-              <a:t>05/2/2015</a:t>
+              <a:t>15/2/2015</a:t>
             </a:fld>
             <a:endParaRPr lang="en-US"/>
           </a:p>
@@ -2640,7 +2640,7 @@
             <a:fld id="{0BF94AD7-59A1-45F9-ACA2-67E78D40517C}" type="datetimeFigureOut">
               <a:rPr lang="en-US" smtClean="0"/>
               <a:pPr/>
-              <a:t>05/2/2015</a:t>
+              <a:t>15/2/2015</a:t>
             </a:fld>
             <a:endParaRPr lang="en-US"/>
           </a:p>
@@ -2914,7 +2914,7 @@
             <a:fld id="{0BF94AD7-59A1-45F9-ACA2-67E78D40517C}" type="datetimeFigureOut">
               <a:rPr lang="en-US" smtClean="0"/>
               <a:pPr/>
-              <a:t>05/2/2015</a:t>
+              <a:t>15/2/2015</a:t>
             </a:fld>
             <a:endParaRPr lang="en-US"/>
           </a:p>
@@ -3164,7 +3164,7 @@
             <a:fld id="{0BF94AD7-59A1-45F9-ACA2-67E78D40517C}" type="datetimeFigureOut">
               <a:rPr lang="en-US" smtClean="0"/>
               <a:pPr/>
-              <a:t>05/2/2015</a:t>
+              <a:t>15/2/2015</a:t>
             </a:fld>
             <a:endParaRPr lang="en-US"/>
           </a:p>
@@ -3374,7 +3374,7 @@
             <a:fld id="{0BF94AD7-59A1-45F9-ACA2-67E78D40517C}" type="datetimeFigureOut">
               <a:rPr lang="en-US" smtClean="0"/>
               <a:pPr/>
-              <a:t>05/2/2015</a:t>
+              <a:t>15/2/2015</a:t>
             </a:fld>
             <a:endParaRPr lang="en-US"/>
           </a:p>
@@ -3759,20 +3759,21 @@
           <a:prstGeom prst="ellipse">
             <a:avLst/>
           </a:prstGeom>
-          <a:noFill/>
         </p:spPr>
         <p:style>
           <a:lnRef idx="2">
-            <a:schemeClr val="accent1"/>
+            <a:schemeClr val="accent1">
+              <a:shade val="50000"/>
+            </a:schemeClr>
           </a:lnRef>
           <a:fillRef idx="1">
-            <a:schemeClr val="lt1"/>
+            <a:schemeClr val="accent1"/>
           </a:fillRef>
           <a:effectRef idx="0">
             <a:schemeClr val="accent1"/>
           </a:effectRef>
           <a:fontRef idx="minor">
-            <a:schemeClr val="dk1"/>
+            <a:schemeClr val="lt1"/>
           </a:fontRef>
         </p:style>
         <p:txBody>
@@ -3798,20 +3799,21 @@
           <a:prstGeom prst="ellipse">
             <a:avLst/>
           </a:prstGeom>
-          <a:noFill/>
         </p:spPr>
         <p:style>
           <a:lnRef idx="2">
-            <a:schemeClr val="accent1"/>
+            <a:schemeClr val="accent1">
+              <a:shade val="50000"/>
+            </a:schemeClr>
           </a:lnRef>
           <a:fillRef idx="1">
-            <a:schemeClr val="lt1"/>
+            <a:schemeClr val="accent1"/>
           </a:fillRef>
           <a:effectRef idx="0">
             <a:schemeClr val="accent1"/>
           </a:effectRef>
           <a:fontRef idx="minor">
-            <a:schemeClr val="dk1"/>
+            <a:schemeClr val="lt1"/>
           </a:fontRef>
         </p:style>
         <p:txBody>
@@ -3840,13 +3842,13 @@
         </p:spPr>
         <p:style>
           <a:lnRef idx="1">
-            <a:schemeClr val="accent1"/>
+            <a:schemeClr val="accent6"/>
           </a:lnRef>
           <a:fillRef idx="0">
-            <a:schemeClr val="accent1"/>
+            <a:schemeClr val="accent6"/>
           </a:fillRef>
           <a:effectRef idx="0">
-            <a:schemeClr val="accent1"/>
+            <a:schemeClr val="accent6"/>
           </a:effectRef>
           <a:fontRef idx="minor">
             <a:schemeClr val="tx1"/>
@@ -3861,8 +3863,8 @@
         </p:nvSpPr>
         <p:spPr>
           <a:xfrm>
-            <a:off x="4876800" y="2743200"/>
-            <a:ext cx="762000" cy="369332"/>
+            <a:off x="4800600" y="2667000"/>
+            <a:ext cx="762000" cy="384721"/>
           </a:xfrm>
           <a:prstGeom prst="rect">
             <a:avLst/>
@@ -3876,10 +3878,14 @@
           <a:lstStyle/>
           <a:p>
             <a:r>
-              <a:rPr lang="en-US" dirty="0" err="1" smtClean="0"/>
-              <a:t>rij</a:t>
-            </a:r>
-            <a:endParaRPr lang="en-US" dirty="0"/>
+              <a:rPr lang="en-US" sz="1900" dirty="0" err="1" smtClean="0"/>
+              <a:t>r</a:t>
+            </a:r>
+            <a:r>
+              <a:rPr lang="en-US" sz="1900" baseline="-25000" dirty="0" err="1" smtClean="0"/>
+              <a:t>ij</a:t>
+            </a:r>
+            <a:endParaRPr lang="en-US" sz="1900" baseline="-25000" dirty="0"/>
           </a:p>
         </p:txBody>
       </p:sp>
@@ -4008,10 +4014,14 @@
           <a:lstStyle/>
           <a:p>
             <a:r>
-              <a:rPr lang="en-US" dirty="0" err="1" smtClean="0"/>
-              <a:t>eij</a:t>
-            </a:r>
-            <a:endParaRPr lang="en-US" dirty="0"/>
+              <a:rPr lang="en-US" b="1" dirty="0" err="1" smtClean="0"/>
+              <a:t>e</a:t>
+            </a:r>
+            <a:r>
+              <a:rPr lang="en-US" baseline="-25000" dirty="0" err="1" smtClean="0"/>
+              <a:t>ij</a:t>
+            </a:r>
+            <a:endParaRPr lang="en-US" baseline="-25000" dirty="0"/>
           </a:p>
         </p:txBody>
       </p:sp>
@@ -4083,20 +4093,21 @@
           <a:prstGeom prst="ellipse">
             <a:avLst/>
           </a:prstGeom>
-          <a:noFill/>
         </p:spPr>
         <p:style>
           <a:lnRef idx="2">
-            <a:schemeClr val="accent1"/>
+            <a:schemeClr val="accent1">
+              <a:shade val="50000"/>
+            </a:schemeClr>
           </a:lnRef>
           <a:fillRef idx="1">
-            <a:schemeClr val="lt1"/>
+            <a:schemeClr val="accent1"/>
           </a:fillRef>
           <a:effectRef idx="0">
             <a:schemeClr val="accent1"/>
           </a:effectRef>
           <a:fontRef idx="minor">
-            <a:schemeClr val="dk1"/>
+            <a:schemeClr val="lt1"/>
           </a:fontRef>
         </p:style>
         <p:txBody>
@@ -4122,20 +4133,21 @@
           <a:prstGeom prst="ellipse">
             <a:avLst/>
           </a:prstGeom>
-          <a:noFill/>
         </p:spPr>
         <p:style>
           <a:lnRef idx="2">
-            <a:schemeClr val="accent1"/>
+            <a:schemeClr val="accent1">
+              <a:shade val="50000"/>
+            </a:schemeClr>
           </a:lnRef>
           <a:fillRef idx="1">
-            <a:schemeClr val="lt1"/>
+            <a:schemeClr val="accent1"/>
           </a:fillRef>
           <a:effectRef idx="0">
             <a:schemeClr val="accent1"/>
           </a:effectRef>
           <a:fontRef idx="minor">
-            <a:schemeClr val="dk1"/>
+            <a:schemeClr val="lt1"/>
           </a:fontRef>
         </p:style>
         <p:txBody>
@@ -4223,7 +4235,7 @@
         <p:spPr>
           <a:xfrm>
             <a:off x="4343400" y="2971800"/>
-            <a:ext cx="990600" cy="369332"/>
+            <a:ext cx="457200" cy="369332"/>
           </a:xfrm>
           <a:prstGeom prst="rect">
             <a:avLst/>
@@ -4237,10 +4249,14 @@
           <a:lstStyle/>
           <a:p>
             <a:r>
-              <a:rPr lang="en-US" dirty="0" err="1" smtClean="0"/>
-              <a:t>eij</a:t>
-            </a:r>
-            <a:endParaRPr lang="en-US" dirty="0"/>
+              <a:rPr lang="en-US" b="1" dirty="0" err="1" smtClean="0"/>
+              <a:t>e</a:t>
+            </a:r>
+            <a:r>
+              <a:rPr lang="en-US" baseline="-25000" dirty="0" err="1" smtClean="0"/>
+              <a:t>ij</a:t>
+            </a:r>
+            <a:endParaRPr lang="en-US" baseline="-25000" dirty="0"/>
           </a:p>
         </p:txBody>
       </p:sp>
@@ -4288,8 +4304,8 @@
         </p:nvSpPr>
         <p:spPr>
           <a:xfrm>
-            <a:off x="2895600" y="1295400"/>
-            <a:ext cx="1371600" cy="369332"/>
+            <a:off x="2743200" y="1295400"/>
+            <a:ext cx="533400" cy="369332"/>
           </a:xfrm>
           <a:prstGeom prst="rect">
             <a:avLst/>
@@ -4303,14 +4319,14 @@
           <a:lstStyle/>
           <a:p>
             <a:r>
-              <a:rPr lang="en-US" dirty="0" smtClean="0"/>
-              <a:t>F </a:t>
-            </a:r>
-            <a:r>
-              <a:rPr lang="en-US" dirty="0" err="1" smtClean="0"/>
+              <a:rPr lang="en-US" b="1" dirty="0" err="1" smtClean="0"/>
+              <a:t>F</a:t>
+            </a:r>
+            <a:r>
+              <a:rPr lang="en-US" baseline="-25000" dirty="0" err="1" smtClean="0"/>
               <a:t>sij</a:t>
             </a:r>
-            <a:endParaRPr lang="en-US" dirty="0"/>
+            <a:endParaRPr lang="en-US" baseline="-25000" dirty="0"/>
           </a:p>
         </p:txBody>
       </p:sp>
@@ -4353,20 +4369,21 @@
           <a:prstGeom prst="ellipse">
             <a:avLst/>
           </a:prstGeom>
-          <a:noFill/>
         </p:spPr>
         <p:style>
           <a:lnRef idx="2">
-            <a:schemeClr val="accent1"/>
+            <a:schemeClr val="accent1">
+              <a:shade val="50000"/>
+            </a:schemeClr>
           </a:lnRef>
           <a:fillRef idx="1">
-            <a:schemeClr val="lt1"/>
+            <a:schemeClr val="accent1"/>
           </a:fillRef>
           <a:effectRef idx="0">
             <a:schemeClr val="accent1"/>
           </a:effectRef>
           <a:fontRef idx="minor">
-            <a:schemeClr val="dk1"/>
+            <a:schemeClr val="lt1"/>
           </a:fontRef>
         </p:style>
         <p:txBody>
@@ -4518,7 +4535,7 @@
         <p:spPr>
           <a:xfrm>
             <a:off x="3962400" y="2971800"/>
-            <a:ext cx="912942" cy="369332"/>
+            <a:ext cx="671081" cy="369332"/>
           </a:xfrm>
           <a:prstGeom prst="rect">
             <a:avLst/>
@@ -4532,14 +4549,14 @@
           <a:lstStyle/>
           <a:p>
             <a:r>
-              <a:rPr lang="en-US" dirty="0"/>
+              <a:rPr lang="en-US" b="1" dirty="0" err="1" smtClean="0"/>
               <a:t>e</a:t>
             </a:r>
             <a:r>
-              <a:rPr lang="en-US" dirty="0" smtClean="0"/>
-              <a:t> target</a:t>
-            </a:r>
-            <a:endParaRPr lang="en-US" dirty="0"/>
+              <a:rPr lang="en-US" baseline="-25000" dirty="0" err="1" smtClean="0"/>
+              <a:t>target</a:t>
+            </a:r>
+            <a:endParaRPr lang="en-US" baseline="-25000" dirty="0"/>
           </a:p>
         </p:txBody>
       </p:sp>
@@ -4552,7 +4569,7 @@
         <p:spPr>
           <a:xfrm>
             <a:off x="4191000" y="3886200"/>
-            <a:ext cx="288862" cy="369332"/>
+            <a:ext cx="293670" cy="369332"/>
           </a:xfrm>
           <a:prstGeom prst="rect">
             <a:avLst/>
@@ -4566,10 +4583,10 @@
           <a:lstStyle/>
           <a:p>
             <a:r>
-              <a:rPr lang="en-US" dirty="0" smtClean="0"/>
+              <a:rPr lang="en-US" b="1" dirty="0" smtClean="0"/>
               <a:t>v</a:t>
             </a:r>
-            <a:endParaRPr lang="en-US" dirty="0"/>
+            <a:endParaRPr lang="en-US" b="1" dirty="0"/>
           </a:p>
         </p:txBody>
       </p:sp>
@@ -4612,59 +4629,59 @@
           <a:prstGeom prst="ellipse">
             <a:avLst/>
           </a:prstGeom>
-          <a:noFill/>
+        </p:spPr>
+        <p:style>
+          <a:lnRef idx="1">
+            <a:schemeClr val="accent1"/>
+          </a:lnRef>
+          <a:fillRef idx="3">
+            <a:schemeClr val="accent1"/>
+          </a:fillRef>
+          <a:effectRef idx="2">
+            <a:schemeClr val="accent1"/>
+          </a:effectRef>
+          <a:fontRef idx="minor">
+            <a:schemeClr val="lt1"/>
+          </a:fontRef>
+        </p:style>
+        <p:txBody>
+          <a:bodyPr rtlCol="0" anchor="ctr"/>
+          <a:lstStyle/>
+          <a:p>
+            <a:pPr algn="ctr"/>
+            <a:endParaRPr lang="en-US"/>
+          </a:p>
+        </p:txBody>
+      </p:sp>
+      <p:sp>
+        <p:nvSpPr>
+          <p:cNvPr id="6" name="Oval 5"/>
+          <p:cNvSpPr/>
+          <p:nvPr/>
+        </p:nvSpPr>
+        <p:spPr>
+          <a:xfrm>
+            <a:off x="2057400" y="2057400"/>
+            <a:ext cx="1524000" cy="1524000"/>
+          </a:xfrm>
+          <a:prstGeom prst="ellipse">
+            <a:avLst/>
+          </a:prstGeom>
         </p:spPr>
         <p:style>
           <a:lnRef idx="2">
-            <a:schemeClr val="accent1"/>
+            <a:schemeClr val="accent1">
+              <a:shade val="50000"/>
+            </a:schemeClr>
           </a:lnRef>
           <a:fillRef idx="1">
-            <a:schemeClr val="lt1"/>
+            <a:schemeClr val="accent1"/>
           </a:fillRef>
           <a:effectRef idx="0">
             <a:schemeClr val="accent1"/>
           </a:effectRef>
           <a:fontRef idx="minor">
-            <a:schemeClr val="dk1"/>
-          </a:fontRef>
-        </p:style>
-        <p:txBody>
-          <a:bodyPr rtlCol="0" anchor="ctr"/>
-          <a:lstStyle/>
-          <a:p>
-            <a:pPr algn="ctr"/>
-            <a:endParaRPr lang="en-US"/>
-          </a:p>
-        </p:txBody>
-      </p:sp>
-      <p:sp>
-        <p:nvSpPr>
-          <p:cNvPr id="6" name="Oval 5"/>
-          <p:cNvSpPr/>
-          <p:nvPr/>
-        </p:nvSpPr>
-        <p:spPr>
-          <a:xfrm>
-            <a:off x="2057400" y="2057400"/>
-            <a:ext cx="1524000" cy="1524000"/>
-          </a:xfrm>
-          <a:prstGeom prst="ellipse">
-            <a:avLst/>
-          </a:prstGeom>
-          <a:noFill/>
-        </p:spPr>
-        <p:style>
-          <a:lnRef idx="2">
-            <a:schemeClr val="accent1"/>
-          </a:lnRef>
-          <a:fillRef idx="1">
             <a:schemeClr val="lt1"/>
-          </a:fillRef>
-          <a:effectRef idx="0">
-            <a:schemeClr val="accent1"/>
-          </a:effectRef>
-          <a:fontRef idx="minor">
-            <a:schemeClr val="dk1"/>
           </a:fontRef>
         </p:style>
         <p:txBody>
@@ -5145,59 +5162,59 @@
           <a:prstGeom prst="ellipse">
             <a:avLst/>
           </a:prstGeom>
-          <a:noFill/>
+        </p:spPr>
+        <p:style>
+          <a:lnRef idx="1">
+            <a:schemeClr val="accent1"/>
+          </a:lnRef>
+          <a:fillRef idx="3">
+            <a:schemeClr val="accent1"/>
+          </a:fillRef>
+          <a:effectRef idx="2">
+            <a:schemeClr val="accent1"/>
+          </a:effectRef>
+          <a:fontRef idx="minor">
+            <a:schemeClr val="lt1"/>
+          </a:fontRef>
+        </p:style>
+        <p:txBody>
+          <a:bodyPr rtlCol="0" anchor="ctr"/>
+          <a:lstStyle/>
+          <a:p>
+            <a:pPr algn="ctr"/>
+            <a:endParaRPr lang="en-US"/>
+          </a:p>
+        </p:txBody>
+      </p:sp>
+      <p:sp>
+        <p:nvSpPr>
+          <p:cNvPr id="6" name="Oval 5"/>
+          <p:cNvSpPr/>
+          <p:nvPr/>
+        </p:nvSpPr>
+        <p:spPr>
+          <a:xfrm>
+            <a:off x="1066797" y="2297668"/>
+            <a:ext cx="1219200" cy="1219200"/>
+          </a:xfrm>
+          <a:prstGeom prst="ellipse">
+            <a:avLst/>
+          </a:prstGeom>
         </p:spPr>
         <p:style>
           <a:lnRef idx="2">
-            <a:schemeClr val="accent1"/>
+            <a:schemeClr val="accent1">
+              <a:shade val="50000"/>
+            </a:schemeClr>
           </a:lnRef>
           <a:fillRef idx="1">
-            <a:schemeClr val="lt1"/>
+            <a:schemeClr val="accent1"/>
           </a:fillRef>
           <a:effectRef idx="0">
             <a:schemeClr val="accent1"/>
           </a:effectRef>
           <a:fontRef idx="minor">
-            <a:schemeClr val="dk1"/>
-          </a:fontRef>
-        </p:style>
-        <p:txBody>
-          <a:bodyPr rtlCol="0" anchor="ctr"/>
-          <a:lstStyle/>
-          <a:p>
-            <a:pPr algn="ctr"/>
-            <a:endParaRPr lang="en-US"/>
-          </a:p>
-        </p:txBody>
-      </p:sp>
-      <p:sp>
-        <p:nvSpPr>
-          <p:cNvPr id="6" name="Oval 5"/>
-          <p:cNvSpPr/>
-          <p:nvPr/>
-        </p:nvSpPr>
-        <p:spPr>
-          <a:xfrm>
-            <a:off x="1066797" y="2297668"/>
-            <a:ext cx="1219200" cy="1219200"/>
-          </a:xfrm>
-          <a:prstGeom prst="ellipse">
-            <a:avLst/>
-          </a:prstGeom>
-          <a:noFill/>
-        </p:spPr>
-        <p:style>
-          <a:lnRef idx="2">
-            <a:schemeClr val="accent1"/>
-          </a:lnRef>
-          <a:fillRef idx="1">
             <a:schemeClr val="lt1"/>
-          </a:fillRef>
-          <a:effectRef idx="0">
-            <a:schemeClr val="accent1"/>
-          </a:effectRef>
-          <a:fontRef idx="minor">
-            <a:schemeClr val="dk1"/>
           </a:fontRef>
         </p:style>
         <p:txBody>
@@ -5252,7 +5269,7 @@
           <a:prstGeom prst="line">
             <a:avLst/>
           </a:prstGeom>
-          <a:ln>
+          <a:ln w="12700">
             <a:solidFill>
               <a:schemeClr val="tx1"/>
             </a:solidFill>
@@ -5288,59 +5305,59 @@
           <a:prstGeom prst="ellipse">
             <a:avLst/>
           </a:prstGeom>
-          <a:noFill/>
+        </p:spPr>
+        <p:style>
+          <a:lnRef idx="1">
+            <a:schemeClr val="accent1"/>
+          </a:lnRef>
+          <a:fillRef idx="3">
+            <a:schemeClr val="accent1"/>
+          </a:fillRef>
+          <a:effectRef idx="2">
+            <a:schemeClr val="accent1"/>
+          </a:effectRef>
+          <a:fontRef idx="minor">
+            <a:schemeClr val="lt1"/>
+          </a:fontRef>
+        </p:style>
+        <p:txBody>
+          <a:bodyPr rtlCol="0" anchor="ctr"/>
+          <a:lstStyle/>
+          <a:p>
+            <a:pPr algn="ctr"/>
+            <a:endParaRPr lang="en-US"/>
+          </a:p>
+        </p:txBody>
+      </p:sp>
+      <p:sp>
+        <p:nvSpPr>
+          <p:cNvPr id="24" name="Oval 23"/>
+          <p:cNvSpPr/>
+          <p:nvPr/>
+        </p:nvSpPr>
+        <p:spPr>
+          <a:xfrm>
+            <a:off x="4114800" y="4050268"/>
+            <a:ext cx="1219200" cy="1219200"/>
+          </a:xfrm>
+          <a:prstGeom prst="ellipse">
+            <a:avLst/>
+          </a:prstGeom>
         </p:spPr>
         <p:style>
           <a:lnRef idx="2">
-            <a:schemeClr val="accent1"/>
+            <a:schemeClr val="accent1">
+              <a:shade val="50000"/>
+            </a:schemeClr>
           </a:lnRef>
           <a:fillRef idx="1">
-            <a:schemeClr val="lt1"/>
+            <a:schemeClr val="accent1"/>
           </a:fillRef>
           <a:effectRef idx="0">
             <a:schemeClr val="accent1"/>
           </a:effectRef>
           <a:fontRef idx="minor">
-            <a:schemeClr val="dk1"/>
-          </a:fontRef>
-        </p:style>
-        <p:txBody>
-          <a:bodyPr rtlCol="0" anchor="ctr"/>
-          <a:lstStyle/>
-          <a:p>
-            <a:pPr algn="ctr"/>
-            <a:endParaRPr lang="en-US"/>
-          </a:p>
-        </p:txBody>
-      </p:sp>
-      <p:sp>
-        <p:nvSpPr>
-          <p:cNvPr id="24" name="Oval 23"/>
-          <p:cNvSpPr/>
-          <p:nvPr/>
-        </p:nvSpPr>
-        <p:spPr>
-          <a:xfrm>
-            <a:off x="4114800" y="4050268"/>
-            <a:ext cx="1219200" cy="1219200"/>
-          </a:xfrm>
-          <a:prstGeom prst="ellipse">
-            <a:avLst/>
-          </a:prstGeom>
-          <a:noFill/>
-        </p:spPr>
-        <p:style>
-          <a:lnRef idx="2">
-            <a:schemeClr val="accent1"/>
-          </a:lnRef>
-          <a:fillRef idx="1">
             <a:schemeClr val="lt1"/>
-          </a:fillRef>
-          <a:effectRef idx="0">
-            <a:schemeClr val="accent1"/>
-          </a:effectRef>
-          <a:fontRef idx="minor">
-            <a:schemeClr val="dk1"/>
           </a:fontRef>
         </p:style>
         <p:txBody>
@@ -5369,7 +5386,7 @@
           <a:prstGeom prst="line">
             <a:avLst/>
           </a:prstGeom>
-          <a:ln>
+          <a:ln w="12700">
             <a:solidFill>
               <a:schemeClr val="tx1"/>
             </a:solidFill>
@@ -5503,8 +5520,8 @@
         </p:nvSpPr>
         <p:spPr>
           <a:xfrm>
-            <a:off x="7542106" y="2602468"/>
-            <a:ext cx="306494" cy="369332"/>
+            <a:off x="7467600" y="2590800"/>
+            <a:ext cx="364202" cy="369332"/>
           </a:xfrm>
           <a:prstGeom prst="rect">
             <a:avLst/>
@@ -5518,10 +5535,14 @@
           <a:lstStyle/>
           <a:p>
             <a:r>
-              <a:rPr lang="es-AR" dirty="0" smtClean="0"/>
-              <a:t>o</a:t>
-            </a:r>
-            <a:endParaRPr lang="en-US" dirty="0"/>
+              <a:rPr lang="es-AR" b="1" dirty="0" smtClean="0"/>
+              <a:t>x</a:t>
+            </a:r>
+            <a:r>
+              <a:rPr lang="es-AR" sz="1700" b="1" baseline="-25000" dirty="0" smtClean="0"/>
+              <a:t>0</a:t>
+            </a:r>
+            <a:endParaRPr lang="en-US" sz="1700" b="1" baseline="-25000" dirty="0"/>
           </a:p>
         </p:txBody>
       </p:sp>
@@ -5894,7 +5915,7 @@
         <p:spPr>
           <a:xfrm>
             <a:off x="6821510" y="3581400"/>
-            <a:ext cx="1179490" cy="369332"/>
+            <a:ext cx="1108958" cy="369332"/>
           </a:xfrm>
           <a:prstGeom prst="rect">
             <a:avLst/>
@@ -5908,14 +5929,14 @@
           <a:lstStyle/>
           <a:p>
             <a:r>
-              <a:rPr lang="en-US" dirty="0" smtClean="0"/>
-              <a:t>Objective </a:t>
-            </a:r>
-            <a:r>
               <a:rPr lang="en-US" dirty="0" err="1" smtClean="0"/>
+              <a:t>Objective</a:t>
+            </a:r>
+            <a:r>
+              <a:rPr lang="en-US" baseline="-25000" dirty="0" err="1" smtClean="0"/>
               <a:t>i</a:t>
             </a:r>
-            <a:endParaRPr lang="en-US" dirty="0"/>
+            <a:endParaRPr lang="en-US" baseline="-25000" dirty="0"/>
           </a:p>
         </p:txBody>
       </p:sp>
@@ -5958,59 +5979,59 @@
           <a:prstGeom prst="ellipse">
             <a:avLst/>
           </a:prstGeom>
-          <a:noFill/>
+        </p:spPr>
+        <p:style>
+          <a:lnRef idx="1">
+            <a:schemeClr val="accent1"/>
+          </a:lnRef>
+          <a:fillRef idx="3">
+            <a:schemeClr val="accent1"/>
+          </a:fillRef>
+          <a:effectRef idx="2">
+            <a:schemeClr val="accent1"/>
+          </a:effectRef>
+          <a:fontRef idx="minor">
+            <a:schemeClr val="lt1"/>
+          </a:fontRef>
+        </p:style>
+        <p:txBody>
+          <a:bodyPr rtlCol="0" anchor="ctr"/>
+          <a:lstStyle/>
+          <a:p>
+            <a:pPr algn="ctr"/>
+            <a:endParaRPr lang="en-US"/>
+          </a:p>
+        </p:txBody>
+      </p:sp>
+      <p:sp>
+        <p:nvSpPr>
+          <p:cNvPr id="6" name="Oval 5"/>
+          <p:cNvSpPr/>
+          <p:nvPr/>
+        </p:nvSpPr>
+        <p:spPr>
+          <a:xfrm>
+            <a:off x="2057400" y="4736068"/>
+            <a:ext cx="1219200" cy="1219200"/>
+          </a:xfrm>
+          <a:prstGeom prst="ellipse">
+            <a:avLst/>
+          </a:prstGeom>
         </p:spPr>
         <p:style>
           <a:lnRef idx="2">
-            <a:schemeClr val="accent1"/>
+            <a:schemeClr val="accent1">
+              <a:shade val="50000"/>
+            </a:schemeClr>
           </a:lnRef>
           <a:fillRef idx="1">
-            <a:schemeClr val="lt1"/>
+            <a:schemeClr val="accent1"/>
           </a:fillRef>
           <a:effectRef idx="0">
             <a:schemeClr val="accent1"/>
           </a:effectRef>
           <a:fontRef idx="minor">
-            <a:schemeClr val="dk1"/>
-          </a:fontRef>
-        </p:style>
-        <p:txBody>
-          <a:bodyPr rtlCol="0" anchor="ctr"/>
-          <a:lstStyle/>
-          <a:p>
-            <a:pPr algn="ctr"/>
-            <a:endParaRPr lang="en-US"/>
-          </a:p>
-        </p:txBody>
-      </p:sp>
-      <p:sp>
-        <p:nvSpPr>
-          <p:cNvPr id="6" name="Oval 5"/>
-          <p:cNvSpPr/>
-          <p:nvPr/>
-        </p:nvSpPr>
-        <p:spPr>
-          <a:xfrm>
-            <a:off x="2057400" y="4736068"/>
-            <a:ext cx="1219200" cy="1219200"/>
-          </a:xfrm>
-          <a:prstGeom prst="ellipse">
-            <a:avLst/>
-          </a:prstGeom>
-          <a:noFill/>
-        </p:spPr>
-        <p:style>
-          <a:lnRef idx="2">
-            <a:schemeClr val="accent1"/>
-          </a:lnRef>
-          <a:fillRef idx="1">
             <a:schemeClr val="lt1"/>
-          </a:fillRef>
-          <a:effectRef idx="0">
-            <a:schemeClr val="accent1"/>
-          </a:effectRef>
-          <a:fontRef idx="minor">
-            <a:schemeClr val="dk1"/>
           </a:fontRef>
         </p:style>
         <p:txBody>
@@ -6103,59 +6124,59 @@
           <a:prstGeom prst="ellipse">
             <a:avLst/>
           </a:prstGeom>
-          <a:noFill/>
+        </p:spPr>
+        <p:style>
+          <a:lnRef idx="1">
+            <a:schemeClr val="accent1"/>
+          </a:lnRef>
+          <a:fillRef idx="3">
+            <a:schemeClr val="accent1"/>
+          </a:fillRef>
+          <a:effectRef idx="2">
+            <a:schemeClr val="accent1"/>
+          </a:effectRef>
+          <a:fontRef idx="minor">
+            <a:schemeClr val="lt1"/>
+          </a:fontRef>
+        </p:style>
+        <p:txBody>
+          <a:bodyPr rtlCol="0" anchor="ctr"/>
+          <a:lstStyle/>
+          <a:p>
+            <a:pPr algn="ctr"/>
+            <a:endParaRPr lang="en-US"/>
+          </a:p>
+        </p:txBody>
+      </p:sp>
+      <p:sp>
+        <p:nvSpPr>
+          <p:cNvPr id="24" name="Oval 23"/>
+          <p:cNvSpPr/>
+          <p:nvPr/>
+        </p:nvSpPr>
+        <p:spPr>
+          <a:xfrm>
+            <a:off x="2971800" y="1219200"/>
+            <a:ext cx="1219200" cy="1219200"/>
+          </a:xfrm>
+          <a:prstGeom prst="ellipse">
+            <a:avLst/>
+          </a:prstGeom>
         </p:spPr>
         <p:style>
           <a:lnRef idx="2">
-            <a:schemeClr val="accent1"/>
+            <a:schemeClr val="accent1">
+              <a:shade val="50000"/>
+            </a:schemeClr>
           </a:lnRef>
           <a:fillRef idx="1">
-            <a:schemeClr val="lt1"/>
+            <a:schemeClr val="accent1"/>
           </a:fillRef>
           <a:effectRef idx="0">
             <a:schemeClr val="accent1"/>
           </a:effectRef>
           <a:fontRef idx="minor">
-            <a:schemeClr val="dk1"/>
-          </a:fontRef>
-        </p:style>
-        <p:txBody>
-          <a:bodyPr rtlCol="0" anchor="ctr"/>
-          <a:lstStyle/>
-          <a:p>
-            <a:pPr algn="ctr"/>
-            <a:endParaRPr lang="en-US"/>
-          </a:p>
-        </p:txBody>
-      </p:sp>
-      <p:sp>
-        <p:nvSpPr>
-          <p:cNvPr id="24" name="Oval 23"/>
-          <p:cNvSpPr/>
-          <p:nvPr/>
-        </p:nvSpPr>
-        <p:spPr>
-          <a:xfrm>
-            <a:off x="2971800" y="1219200"/>
-            <a:ext cx="1219200" cy="1219200"/>
-          </a:xfrm>
-          <a:prstGeom prst="ellipse">
-            <a:avLst/>
-          </a:prstGeom>
-          <a:noFill/>
-        </p:spPr>
-        <p:style>
-          <a:lnRef idx="2">
-            <a:schemeClr val="accent1"/>
-          </a:lnRef>
-          <a:fillRef idx="1">
             <a:schemeClr val="lt1"/>
-          </a:fillRef>
-          <a:effectRef idx="0">
-            <a:schemeClr val="accent1"/>
-          </a:effectRef>
-          <a:fontRef idx="minor">
-            <a:schemeClr val="dk1"/>
           </a:fontRef>
         </p:style>
         <p:txBody>
@@ -6319,7 +6340,7 @@
         <p:spPr>
           <a:xfrm>
             <a:off x="5715000" y="1828800"/>
-            <a:ext cx="1179490" cy="369332"/>
+            <a:ext cx="1108958" cy="369332"/>
           </a:xfrm>
           <a:prstGeom prst="rect">
             <a:avLst/>
@@ -6337,10 +6358,10 @@
               <a:t>Objective</a:t>
             </a:r>
             <a:r>
-              <a:rPr lang="es-AR" dirty="0" smtClean="0"/>
-              <a:t> i</a:t>
-            </a:r>
-            <a:endParaRPr lang="en-US" dirty="0"/>
+              <a:rPr lang="es-AR" baseline="-25000" dirty="0" err="1" smtClean="0"/>
+              <a:t>i</a:t>
+            </a:r>
+            <a:endParaRPr lang="en-US" baseline="-25000" dirty="0"/>
           </a:p>
         </p:txBody>
       </p:sp>
@@ -6524,7 +6545,7 @@
         <p:spPr>
           <a:xfrm>
             <a:off x="4505671" y="5879068"/>
-            <a:ext cx="752129" cy="369332"/>
+            <a:ext cx="596638" cy="369332"/>
           </a:xfrm>
           <a:prstGeom prst="rect">
             <a:avLst/>
@@ -6538,11 +6559,15 @@
           <a:lstStyle/>
           <a:p>
             <a:r>
-              <a:rPr lang="es-AR" dirty="0" smtClean="0"/>
-              <a:t>F(i</a:t>
-            </a:r>
-            <a:r>
-              <a:rPr lang="en-US" dirty="0" smtClean="0"/>
+              <a:rPr lang="es-AR" b="1" dirty="0" smtClean="0"/>
+              <a:t>F</a:t>
+            </a:r>
+            <a:r>
+              <a:rPr lang="es-AR" baseline="-25000" dirty="0" smtClean="0"/>
+              <a:t>(i</a:t>
+            </a:r>
+            <a:r>
+              <a:rPr lang="en-US" baseline="-25000" dirty="0" smtClean="0"/>
               <a:t>', j')</a:t>
             </a:r>
           </a:p>
@@ -6595,7 +6620,7 @@
         <p:spPr>
           <a:xfrm>
             <a:off x="3810000" y="4202668"/>
-            <a:ext cx="699230" cy="369332"/>
+            <a:ext cx="561372" cy="369332"/>
           </a:xfrm>
           <a:prstGeom prst="rect">
             <a:avLst/>
@@ -6609,19 +6634,23 @@
           <a:lstStyle/>
           <a:p>
             <a:r>
-              <a:rPr lang="es-AR" dirty="0" smtClean="0"/>
-              <a:t>F(i</a:t>
-            </a:r>
-            <a:r>
-              <a:rPr lang="en-US" dirty="0" smtClean="0"/>
+              <a:rPr lang="es-AR" b="1" dirty="0" smtClean="0"/>
+              <a:t>F</a:t>
+            </a:r>
+            <a:r>
+              <a:rPr lang="es-AR" baseline="-25000" dirty="0" smtClean="0"/>
+              <a:t>(i</a:t>
+            </a:r>
+            <a:r>
+              <a:rPr lang="en-US" baseline="-25000" dirty="0" smtClean="0"/>
               <a:t>, </a:t>
             </a:r>
             <a:r>
-              <a:rPr lang="en-US" dirty="0" err="1" smtClean="0"/>
+              <a:rPr lang="en-US" baseline="-25000" dirty="0" err="1" smtClean="0"/>
               <a:t>i</a:t>
             </a:r>
             <a:r>
-              <a:rPr lang="en-US" dirty="0" smtClean="0"/>
+              <a:rPr lang="en-US" baseline="-25000" dirty="0" smtClean="0"/>
               <a:t>')</a:t>
             </a:r>
           </a:p>
@@ -6672,7 +6701,7 @@
         <p:spPr>
           <a:xfrm>
             <a:off x="3352800" y="5105400"/>
-            <a:ext cx="915828" cy="369332"/>
+            <a:ext cx="671530" cy="369332"/>
           </a:xfrm>
           <a:prstGeom prst="rect">
             <a:avLst/>
@@ -6686,14 +6715,14 @@
           <a:lstStyle/>
           <a:p>
             <a:r>
-              <a:rPr lang="es-AR" dirty="0" smtClean="0"/>
-              <a:t>F </a:t>
-            </a:r>
-            <a:r>
-              <a:rPr lang="es-AR" dirty="0" err="1" smtClean="0"/>
+              <a:rPr lang="es-AR" b="1" dirty="0" err="1" smtClean="0"/>
+              <a:t>F</a:t>
+            </a:r>
+            <a:r>
+              <a:rPr lang="es-AR" baseline="-25000" dirty="0" err="1" smtClean="0"/>
               <a:t>desire</a:t>
             </a:r>
-            <a:endParaRPr lang="en-US" dirty="0"/>
+            <a:endParaRPr lang="en-US" baseline="-25000" dirty="0"/>
           </a:p>
         </p:txBody>
       </p:sp>
@@ -6736,59 +6765,59 @@
           <a:prstGeom prst="ellipse">
             <a:avLst/>
           </a:prstGeom>
-          <a:noFill/>
+        </p:spPr>
+        <p:style>
+          <a:lnRef idx="1">
+            <a:schemeClr val="accent1"/>
+          </a:lnRef>
+          <a:fillRef idx="3">
+            <a:schemeClr val="accent1"/>
+          </a:fillRef>
+          <a:effectRef idx="2">
+            <a:schemeClr val="accent1"/>
+          </a:effectRef>
+          <a:fontRef idx="minor">
+            <a:schemeClr val="lt1"/>
+          </a:fontRef>
+        </p:style>
+        <p:txBody>
+          <a:bodyPr rtlCol="0" anchor="ctr"/>
+          <a:lstStyle/>
+          <a:p>
+            <a:pPr algn="ctr"/>
+            <a:endParaRPr lang="en-US"/>
+          </a:p>
+        </p:txBody>
+      </p:sp>
+      <p:sp>
+        <p:nvSpPr>
+          <p:cNvPr id="15" name="Oval 14"/>
+          <p:cNvSpPr/>
+          <p:nvPr/>
+        </p:nvSpPr>
+        <p:spPr>
+          <a:xfrm>
+            <a:off x="2733677" y="3897868"/>
+            <a:ext cx="1219200" cy="1219200"/>
+          </a:xfrm>
+          <a:prstGeom prst="ellipse">
+            <a:avLst/>
+          </a:prstGeom>
         </p:spPr>
         <p:style>
           <a:lnRef idx="2">
-            <a:schemeClr val="accent1"/>
+            <a:schemeClr val="accent1">
+              <a:shade val="50000"/>
+            </a:schemeClr>
           </a:lnRef>
           <a:fillRef idx="1">
-            <a:schemeClr val="lt1"/>
+            <a:schemeClr val="accent1"/>
           </a:fillRef>
           <a:effectRef idx="0">
             <a:schemeClr val="accent1"/>
           </a:effectRef>
           <a:fontRef idx="minor">
-            <a:schemeClr val="dk1"/>
-          </a:fontRef>
-        </p:style>
-        <p:txBody>
-          <a:bodyPr rtlCol="0" anchor="ctr"/>
-          <a:lstStyle/>
-          <a:p>
-            <a:pPr algn="ctr"/>
-            <a:endParaRPr lang="en-US"/>
-          </a:p>
-        </p:txBody>
-      </p:sp>
-      <p:sp>
-        <p:nvSpPr>
-          <p:cNvPr id="15" name="Oval 14"/>
-          <p:cNvSpPr/>
-          <p:nvPr/>
-        </p:nvSpPr>
-        <p:spPr>
-          <a:xfrm>
-            <a:off x="2733677" y="3897868"/>
-            <a:ext cx="1219200" cy="1219200"/>
-          </a:xfrm>
-          <a:prstGeom prst="ellipse">
-            <a:avLst/>
-          </a:prstGeom>
-          <a:noFill/>
-        </p:spPr>
-        <p:style>
-          <a:lnRef idx="2">
-            <a:schemeClr val="accent1"/>
-          </a:lnRef>
-          <a:fillRef idx="1">
             <a:schemeClr val="lt1"/>
-          </a:fillRef>
-          <a:effectRef idx="0">
-            <a:schemeClr val="accent1"/>
-          </a:effectRef>
-          <a:fontRef idx="minor">
-            <a:schemeClr val="dk1"/>
           </a:fontRef>
         </p:style>
         <p:txBody>
@@ -6950,8 +6979,8 @@
         </p:nvSpPr>
         <p:spPr>
           <a:xfrm>
-            <a:off x="5170383" y="2362200"/>
-            <a:ext cx="306494" cy="369332"/>
+            <a:off x="5105400" y="2286000"/>
+            <a:ext cx="369012" cy="369332"/>
           </a:xfrm>
           <a:prstGeom prst="rect">
             <a:avLst/>
@@ -6965,10 +6994,14 @@
           <a:lstStyle/>
           <a:p>
             <a:r>
-              <a:rPr lang="es-AR" dirty="0" smtClean="0"/>
-              <a:t>o</a:t>
-            </a:r>
-            <a:endParaRPr lang="en-US" dirty="0"/>
+              <a:rPr lang="es-AR" b="1" dirty="0" smtClean="0"/>
+              <a:t>x</a:t>
+            </a:r>
+            <a:r>
+              <a:rPr lang="es-AR" b="1" baseline="-25000" dirty="0" smtClean="0"/>
+              <a:t>0</a:t>
+            </a:r>
+            <a:endParaRPr lang="en-US" b="1" baseline="-25000" dirty="0" smtClean="0"/>
           </a:p>
         </p:txBody>
       </p:sp>
@@ -7051,7 +7084,7 @@
         <p:spPr>
           <a:xfrm>
             <a:off x="4747789" y="3516868"/>
-            <a:ext cx="510011" cy="369332"/>
+            <a:ext cx="439544" cy="369332"/>
           </a:xfrm>
           <a:prstGeom prst="rect">
             <a:avLst/>
@@ -7065,11 +7098,11 @@
           <a:lstStyle/>
           <a:p>
             <a:r>
-              <a:rPr lang="es-AR" dirty="0" smtClean="0"/>
+              <a:rPr lang="es-AR" b="1" dirty="0" smtClean="0"/>
               <a:t>F</a:t>
             </a:r>
             <a:r>
-              <a:rPr lang="en-US" dirty="0" smtClean="0"/>
+              <a:rPr lang="en-US" baseline="-25000" dirty="0" smtClean="0"/>
               <a:t>S2</a:t>
             </a:r>
           </a:p>
@@ -7120,7 +7153,7 @@
         <p:spPr>
           <a:xfrm>
             <a:off x="4648200" y="4126468"/>
-            <a:ext cx="510011" cy="369332"/>
+            <a:ext cx="436273" cy="369332"/>
           </a:xfrm>
           <a:prstGeom prst="rect">
             <a:avLst/>
@@ -7134,10 +7167,14 @@
           <a:lstStyle/>
           <a:p>
             <a:r>
-              <a:rPr lang="en-US" dirty="0" smtClean="0"/>
-              <a:t>FS1</a:t>
-            </a:r>
-            <a:endParaRPr lang="en-US" dirty="0"/>
+              <a:rPr lang="en-US" b="1" dirty="0" smtClean="0"/>
+              <a:t>F</a:t>
+            </a:r>
+            <a:r>
+              <a:rPr lang="en-US" baseline="-25000" dirty="0" smtClean="0"/>
+              <a:t>S1</a:t>
+            </a:r>
+            <a:endParaRPr lang="en-US" baseline="-25000" dirty="0"/>
           </a:p>
         </p:txBody>
       </p:sp>

</xml_diff>

<commit_message>
elimino varios archivos tex con cosas viejas. Actualizo imagenes. Actualizo informe.
</commit_message>
<xml_diff>
--- a/doc/informe/pictures.pptx
+++ b/doc/informe/pictures.pptx
@@ -199,7 +199,7 @@
             <a:fld id="{845A57F8-9FFB-4742-8CFD-3414C37FBF35}" type="datetimeFigureOut">
               <a:rPr lang="en-US" smtClean="0"/>
               <a:pPr/>
-              <a:t>15/2/2015</a:t>
+              <a:t>08/6/2015</a:t>
             </a:fld>
             <a:endParaRPr lang="en-US"/>
           </a:p>
@@ -975,7 +975,7 @@
             <a:fld id="{0BF94AD7-59A1-45F9-ACA2-67E78D40517C}" type="datetimeFigureOut">
               <a:rPr lang="en-US" smtClean="0"/>
               <a:pPr/>
-              <a:t>15/2/2015</a:t>
+              <a:t>08/6/2015</a:t>
             </a:fld>
             <a:endParaRPr lang="en-US"/>
           </a:p>
@@ -1142,7 +1142,7 @@
             <a:fld id="{0BF94AD7-59A1-45F9-ACA2-67E78D40517C}" type="datetimeFigureOut">
               <a:rPr lang="en-US" smtClean="0"/>
               <a:pPr/>
-              <a:t>15/2/2015</a:t>
+              <a:t>08/6/2015</a:t>
             </a:fld>
             <a:endParaRPr lang="en-US"/>
           </a:p>
@@ -1319,7 +1319,7 @@
             <a:fld id="{0BF94AD7-59A1-45F9-ACA2-67E78D40517C}" type="datetimeFigureOut">
               <a:rPr lang="en-US" smtClean="0"/>
               <a:pPr/>
-              <a:t>15/2/2015</a:t>
+              <a:t>08/6/2015</a:t>
             </a:fld>
             <a:endParaRPr lang="en-US"/>
           </a:p>
@@ -1486,7 +1486,7 @@
             <a:fld id="{0BF94AD7-59A1-45F9-ACA2-67E78D40517C}" type="datetimeFigureOut">
               <a:rPr lang="en-US" smtClean="0"/>
               <a:pPr/>
-              <a:t>15/2/2015</a:t>
+              <a:t>08/6/2015</a:t>
             </a:fld>
             <a:endParaRPr lang="en-US"/>
           </a:p>
@@ -1729,7 +1729,7 @@
             <a:fld id="{0BF94AD7-59A1-45F9-ACA2-67E78D40517C}" type="datetimeFigureOut">
               <a:rPr lang="en-US" smtClean="0"/>
               <a:pPr/>
-              <a:t>15/2/2015</a:t>
+              <a:t>08/6/2015</a:t>
             </a:fld>
             <a:endParaRPr lang="en-US"/>
           </a:p>
@@ -2014,7 +2014,7 @@
             <a:fld id="{0BF94AD7-59A1-45F9-ACA2-67E78D40517C}" type="datetimeFigureOut">
               <a:rPr lang="en-US" smtClean="0"/>
               <a:pPr/>
-              <a:t>15/2/2015</a:t>
+              <a:t>08/6/2015</a:t>
             </a:fld>
             <a:endParaRPr lang="en-US"/>
           </a:p>
@@ -2433,7 +2433,7 @@
             <a:fld id="{0BF94AD7-59A1-45F9-ACA2-67E78D40517C}" type="datetimeFigureOut">
               <a:rPr lang="en-US" smtClean="0"/>
               <a:pPr/>
-              <a:t>15/2/2015</a:t>
+              <a:t>08/6/2015</a:t>
             </a:fld>
             <a:endParaRPr lang="en-US"/>
           </a:p>
@@ -2548,7 +2548,7 @@
             <a:fld id="{0BF94AD7-59A1-45F9-ACA2-67E78D40517C}" type="datetimeFigureOut">
               <a:rPr lang="en-US" smtClean="0"/>
               <a:pPr/>
-              <a:t>15/2/2015</a:t>
+              <a:t>08/6/2015</a:t>
             </a:fld>
             <a:endParaRPr lang="en-US"/>
           </a:p>
@@ -2640,7 +2640,7 @@
             <a:fld id="{0BF94AD7-59A1-45F9-ACA2-67E78D40517C}" type="datetimeFigureOut">
               <a:rPr lang="en-US" smtClean="0"/>
               <a:pPr/>
-              <a:t>15/2/2015</a:t>
+              <a:t>08/6/2015</a:t>
             </a:fld>
             <a:endParaRPr lang="en-US"/>
           </a:p>
@@ -2914,7 +2914,7 @@
             <a:fld id="{0BF94AD7-59A1-45F9-ACA2-67E78D40517C}" type="datetimeFigureOut">
               <a:rPr lang="en-US" smtClean="0"/>
               <a:pPr/>
-              <a:t>15/2/2015</a:t>
+              <a:t>08/6/2015</a:t>
             </a:fld>
             <a:endParaRPr lang="en-US"/>
           </a:p>
@@ -3164,7 +3164,7 @@
             <a:fld id="{0BF94AD7-59A1-45F9-ACA2-67E78D40517C}" type="datetimeFigureOut">
               <a:rPr lang="en-US" smtClean="0"/>
               <a:pPr/>
-              <a:t>15/2/2015</a:t>
+              <a:t>08/6/2015</a:t>
             </a:fld>
             <a:endParaRPr lang="en-US"/>
           </a:p>
@@ -3374,7 +3374,7 @@
             <a:fld id="{0BF94AD7-59A1-45F9-ACA2-67E78D40517C}" type="datetimeFigureOut">
               <a:rPr lang="en-US" smtClean="0"/>
               <a:pPr/>
-              <a:t>15/2/2015</a:t>
+              <a:t>08/6/2015</a:t>
             </a:fld>
             <a:endParaRPr lang="en-US"/>
           </a:p>
@@ -7317,6 +7317,77 @@
               <a:t>RD</a:t>
             </a:r>
             <a:endParaRPr lang="en-US" sz="1500" dirty="0"/>
+          </a:p>
+        </p:txBody>
+      </p:sp>
+      <p:sp>
+        <p:nvSpPr>
+          <p:cNvPr id="19" name="TextBox 18"/>
+          <p:cNvSpPr txBox="1"/>
+          <p:nvPr/>
+        </p:nvSpPr>
+        <p:spPr>
+          <a:xfrm>
+            <a:off x="4038600" y="3886200"/>
+            <a:ext cx="340158" cy="369332"/>
+          </a:xfrm>
+          <a:prstGeom prst="rect">
+            <a:avLst/>
+          </a:prstGeom>
+          <a:noFill/>
+        </p:spPr>
+        <p:txBody>
+          <a:bodyPr wrap="none" rtlCol="0">
+            <a:spAutoFit/>
+          </a:bodyPr>
+          <a:lstStyle/>
+          <a:p>
+            <a:r>
+              <a:rPr lang="el-GR" b="1" dirty="0" smtClean="0"/>
+              <a:t>Θ</a:t>
+            </a:r>
+            <a:endParaRPr lang="el-GR" b="1" dirty="0" smtClean="0"/>
+          </a:p>
+        </p:txBody>
+      </p:sp>
+      <p:sp>
+        <p:nvSpPr>
+          <p:cNvPr id="26" name="Arc 25"/>
+          <p:cNvSpPr/>
+          <p:nvPr/>
+        </p:nvSpPr>
+        <p:spPr>
+          <a:xfrm>
+            <a:off x="3657600" y="3810000"/>
+            <a:ext cx="685800" cy="838200"/>
+          </a:xfrm>
+          <a:prstGeom prst="arc">
+            <a:avLst>
+              <a:gd name="adj1" fmla="val 16891749"/>
+              <a:gd name="adj2" fmla="val 400570"/>
+            </a:avLst>
+          </a:prstGeom>
+        </p:spPr>
+        <p:style>
+          <a:lnRef idx="1">
+            <a:schemeClr val="accent1"/>
+          </a:lnRef>
+          <a:fillRef idx="0">
+            <a:schemeClr val="accent1"/>
+          </a:fillRef>
+          <a:effectRef idx="0">
+            <a:schemeClr val="accent1"/>
+          </a:effectRef>
+          <a:fontRef idx="minor">
+            <a:schemeClr val="tx1"/>
+          </a:fontRef>
+        </p:style>
+        <p:txBody>
+          <a:bodyPr rtlCol="0" anchor="ctr"/>
+          <a:lstStyle/>
+          <a:p>
+            <a:pPr algn="ctr"/>
+            <a:endParaRPr lang="en-US"/>
           </a:p>
         </p:txBody>
       </p:sp>

</xml_diff>